<commit_message>
Quick review and edits to slide deck 3
</commit_message>
<xml_diff>
--- a/tutorial-03-benefits.pptx
+++ b/tutorial-03-benefits.pptx
@@ -217,7 +217,7 @@
           <a:p>
             <a:fld id="{775CE290-E0F5-444C-B849-A8F17CD4104C}" type="datetimeFigureOut">
               <a:rPr lang="en-US" smtClean="0"/>
-              <a:t>9/8/14</a:t>
+              <a:t>9/9/14</a:t>
             </a:fld>
             <a:endParaRPr lang="en-US"/>
           </a:p>
@@ -383,7 +383,7 @@
           <a:p>
             <a:fld id="{AD53A24C-4135-094C-957B-35852E7EDFA4}" type="datetimeFigureOut">
               <a:rPr lang="en-US" smtClean="0"/>
-              <a:t>9/8/14</a:t>
+              <a:t>9/9/14</a:t>
             </a:fld>
             <a:endParaRPr lang="en-US"/>
           </a:p>
@@ -940,7 +940,7 @@
           <a:p>
             <a:fld id="{B594EA25-E4F4-3746-A0BA-A11E27330E0F}" type="datetime2">
               <a:rPr lang="en-US" smtClean="0"/>
-              <a:t>Monday, September 8, 14</a:t>
+              <a:t>Tuesday, September 9, 14</a:t>
             </a:fld>
             <a:endParaRPr lang="en-US"/>
           </a:p>
@@ -1243,7 +1243,7 @@
                 <a:latin typeface="Times New Roman"/>
                 <a:cs typeface="Times New Roman"/>
               </a:rPr>
-              <a:t>September 8, 2014</a:t>
+              <a:t>September 9, 2014</a:t>
             </a:fld>
             <a:endParaRPr lang="en-US" dirty="0">
               <a:latin typeface="Times New Roman"/>
@@ -1530,7 +1530,7 @@
           <a:p>
             <a:fld id="{EA699BF9-66CB-F244-8E74-7B1BE1C77046}" type="datetime2">
               <a:rPr lang="en-US" smtClean="0"/>
-              <a:t>Monday, September 8, 14</a:t>
+              <a:t>Tuesday, September 9, 14</a:t>
             </a:fld>
             <a:endParaRPr lang="en-US"/>
           </a:p>
@@ -1841,7 +1841,7 @@
           <a:p>
             <a:fld id="{D300BE84-9843-8B4F-B3C8-647B06AC46C9}" type="datetime2">
               <a:rPr lang="en-US" smtClean="0"/>
-              <a:t>Monday, September 8, 14</a:t>
+              <a:t>Tuesday, September 9, 14</a:t>
             </a:fld>
             <a:endParaRPr lang="en-US"/>
           </a:p>
@@ -2012,7 +2012,7 @@
           <a:p>
             <a:fld id="{C460AE39-2092-A945-8296-F25085B9A0F1}" type="datetime2">
               <a:rPr lang="en-US" smtClean="0"/>
-              <a:t>Monday, September 8, 14</a:t>
+              <a:t>Tuesday, September 9, 14</a:t>
             </a:fld>
             <a:endParaRPr lang="en-US"/>
           </a:p>
@@ -2193,7 +2193,7 @@
           <a:p>
             <a:fld id="{63BC7E9D-3218-5E49-A867-E087AB2F4618}" type="datetime2">
               <a:rPr lang="en-US" smtClean="0"/>
-              <a:t>Monday, September 8, 14</a:t>
+              <a:t>Tuesday, September 9, 14</a:t>
             </a:fld>
             <a:endParaRPr lang="en-US"/>
           </a:p>
@@ -2364,7 +2364,7 @@
           <a:p>
             <a:fld id="{34621E95-60A9-FF44-9869-513D9D7A859F}" type="datetime2">
               <a:rPr lang="en-US" smtClean="0"/>
-              <a:t>Monday, September 8, 14</a:t>
+              <a:t>Tuesday, September 9, 14</a:t>
             </a:fld>
             <a:endParaRPr lang="en-US"/>
           </a:p>
@@ -2483,7 +2483,7 @@
           <a:p>
             <a:fld id="{BD5AFB16-13FE-DF4A-8CB7-09756A57B2EA}" type="datetime2">
               <a:rPr lang="en-US" smtClean="0"/>
-              <a:t>Monday, September 8, 14</a:t>
+              <a:t>Tuesday, September 9, 14</a:t>
             </a:fld>
             <a:endParaRPr lang="en-US" dirty="0"/>
           </a:p>
@@ -2970,7 +2970,7 @@
           <a:p>
             <a:fld id="{1BDEC705-8EA9-6C46-8E3B-2CAC7E2C0F7D}" type="datetime2">
               <a:rPr lang="en-US" smtClean="0"/>
-              <a:t>Monday, September 8, 14</a:t>
+              <a:t>Tuesday, September 9, 14</a:t>
             </a:fld>
             <a:endParaRPr lang="en-US"/>
           </a:p>
@@ -3301,7 +3301,7 @@
           <a:p>
             <a:fld id="{BF613BD3-C5FD-9543-B738-679BF38D8C83}" type="datetime2">
               <a:rPr lang="en-US" smtClean="0"/>
-              <a:t>Monday, September 8, 14</a:t>
+              <a:t>Tuesday, September 9, 14</a:t>
             </a:fld>
             <a:endParaRPr lang="en-US" dirty="0"/>
           </a:p>
@@ -3780,7 +3780,7 @@
           <a:p>
             <a:fld id="{4B5E4F0C-9A9C-5448-99FD-D30288B385C9}" type="datetime2">
               <a:rPr lang="en-US" smtClean="0"/>
-              <a:t>Monday, September 8, 14</a:t>
+              <a:t>Tuesday, September 9, 14</a:t>
             </a:fld>
             <a:endParaRPr lang="en-US"/>
           </a:p>
@@ -4076,7 +4076,7 @@
           <a:p>
             <a:fld id="{30545249-FD76-6844-B252-CAB05FC2DAA8}" type="datetime2">
               <a:rPr lang="en-US" smtClean="0"/>
-              <a:t>Monday, September 8, 14</a:t>
+              <a:t>Tuesday, September 9, 14</a:t>
             </a:fld>
             <a:endParaRPr lang="en-US" dirty="0"/>
           </a:p>
@@ -4320,7 +4320,7 @@
           <a:p>
             <a:fld id="{CC859171-EEDD-0B48-A5C0-E7218AE20EA7}" type="datetime2">
               <a:rPr lang="en-US" smtClean="0"/>
-              <a:t>Monday, September 8, 14</a:t>
+              <a:t>Tuesday, September 9, 14</a:t>
             </a:fld>
             <a:endParaRPr lang="en-US"/>
           </a:p>
@@ -4416,7 +4416,7 @@
           <a:p>
             <a:fld id="{C32F9216-0342-7440-9504-BD6C1382BF27}" type="datetime2">
               <a:rPr lang="en-US" smtClean="0"/>
-              <a:t>Monday, September 8, 14</a:t>
+              <a:t>Tuesday, September 9, 14</a:t>
             </a:fld>
             <a:endParaRPr lang="en-US"/>
           </a:p>
@@ -4687,7 +4687,7 @@
           <a:p>
             <a:fld id="{D36DC8F2-AD63-E841-8C23-5DC3A41041BE}" type="datetime2">
               <a:rPr lang="en-US" smtClean="0"/>
-              <a:t>Monday, September 8, 14</a:t>
+              <a:t>Tuesday, September 9, 14</a:t>
             </a:fld>
             <a:endParaRPr lang="en-US" dirty="0"/>
           </a:p>
@@ -5406,7 +5406,7 @@
           <a:p>
             <a:fld id="{3D0A2231-87AC-6D4C-985F-023319A7D9A2}" type="datetime2">
               <a:rPr lang="en-US" smtClean="0"/>
-              <a:t>Monday, September 8, 14</a:t>
+              <a:t>Tuesday, September 9, 14</a:t>
             </a:fld>
             <a:endParaRPr lang="en-US"/>
           </a:p>
@@ -5617,7 +5617,18 @@
           <a:p>
             <a:r>
               <a:rPr lang="en-US" dirty="0"/>
-              <a:t>Objects connote and promote locality Message-driven execution is</a:t>
+              <a:t>Objects connote and promote locality </a:t>
+            </a:r>
+            <a:endParaRPr lang="en-US" dirty="0" smtClean="0"/>
+          </a:p>
+          <a:p>
+            <a:r>
+              <a:rPr lang="en-US" dirty="0" smtClean="0"/>
+              <a:t>Message</a:t>
+            </a:r>
+            <a:r>
+              <a:rPr lang="en-US" dirty="0"/>
+              <a:t>-driven execution is</a:t>
             </a:r>
           </a:p>
           <a:p>
@@ -5691,7 +5702,7 @@
         </p:blipFill>
         <p:spPr>
           <a:xfrm>
-            <a:off x="1774175" y="3317084"/>
+            <a:off x="1788286" y="3317084"/>
             <a:ext cx="5625213" cy="2976029"/>
           </a:xfrm>
           <a:prstGeom prst="rect">
@@ -5716,7 +5727,7 @@
           <a:p>
             <a:fld id="{E58A4F2C-2200-ED4A-9DB9-0DB4CBA2E030}" type="datetime2">
               <a:rPr lang="en-US" smtClean="0"/>
-              <a:t>Monday, September 8, 14</a:t>
+              <a:t>Tuesday, September 9, 14</a:t>
             </a:fld>
             <a:endParaRPr lang="en-US"/>
           </a:p>
@@ -5998,7 +6009,7 @@
           <a:p>
             <a:fld id="{4EE35300-9DFE-4346-913D-721DDA4BD2A3}" type="datetime2">
               <a:rPr lang="en-US" smtClean="0"/>
-              <a:t>Monday, September 8, 14</a:t>
+              <a:t>Tuesday, September 9, 14</a:t>
             </a:fld>
             <a:endParaRPr lang="en-US"/>
           </a:p>
@@ -6138,7 +6149,7 @@
         <p:spPr>
           <a:xfrm>
             <a:off x="457200" y="858632"/>
-            <a:ext cx="8229600" cy="1340478"/>
+            <a:ext cx="8339780" cy="1340478"/>
           </a:xfrm>
         </p:spPr>
         <p:txBody>
@@ -6165,7 +6176,15 @@
           <a:p>
             <a:r>
               <a:rPr lang="en-US" dirty="0"/>
-              <a:t>AMPI version (Eduardo Rodrigues, with Mendes and J. Panetta)</a:t>
+              <a:t>AMPI version (Eduardo </a:t>
+            </a:r>
+            <a:r>
+              <a:rPr lang="en-US" dirty="0" smtClean="0"/>
+              <a:t>Rodrigues, </a:t>
+            </a:r>
+            <a:r>
+              <a:rPr lang="en-US" dirty="0"/>
+              <a:t>with Mendes and J. Panetta)</a:t>
             </a:r>
           </a:p>
         </p:txBody>
@@ -6217,7 +6236,7 @@
           <a:p>
             <a:fld id="{C13EA300-EA66-1343-9066-E0183F0018C5}" type="datetime2">
               <a:rPr lang="en-US" smtClean="0"/>
-              <a:t>Monday, September 8, 14</a:t>
+              <a:t>Tuesday, September 9, 14</a:t>
             </a:fld>
             <a:endParaRPr lang="en-US"/>
           </a:p>
@@ -6400,7 +6419,7 @@
           <a:p>
             <a:fld id="{B8E9AC39-BAC8-4C4D-91EA-75B05D74A927}" type="datetime2">
               <a:rPr lang="en-US" smtClean="0"/>
-              <a:t>Monday, September 8, 14</a:t>
+              <a:t>Tuesday, September 9, 14</a:t>
             </a:fld>
             <a:endParaRPr lang="en-US" dirty="0"/>
           </a:p>
@@ -6557,7 +6576,7 @@
           <a:p>
             <a:fld id="{16ED75C1-9B79-0248-BB86-A995101BD306}" type="datetime2">
               <a:rPr lang="en-US" smtClean="0"/>
-              <a:t>Monday, September 8, 14</a:t>
+              <a:t>Tuesday, September 9, 14</a:t>
             </a:fld>
             <a:endParaRPr lang="en-US"/>
           </a:p>
@@ -6721,7 +6740,7 @@
           <a:p>
             <a:fld id="{20CD0AA6-FDB4-7844-BBB3-16F49EC09C2E}" type="datetime2">
               <a:rPr lang="en-US" smtClean="0"/>
-              <a:t>Monday, September 8, 14</a:t>
+              <a:t>Tuesday, September 9, 14</a:t>
             </a:fld>
             <a:endParaRPr lang="en-US"/>
           </a:p>
@@ -6944,7 +6963,7 @@
           <a:p>
             <a:fld id="{D0738005-8C4B-6840-B2A8-B45C31C8FC31}" type="datetime2">
               <a:rPr lang="en-US" smtClean="0"/>
-              <a:t>Monday, September 8, 14</a:t>
+              <a:t>Tuesday, September 9, 14</a:t>
             </a:fld>
             <a:endParaRPr lang="en-US" dirty="0"/>
           </a:p>
@@ -7082,7 +7101,7 @@
           <a:p>
             <a:fld id="{1C3AE6AD-0418-2148-92AF-416EF55EE1AC}" type="datetime2">
               <a:rPr lang="en-US" smtClean="0"/>
-              <a:t>Monday, September 8, 14</a:t>
+              <a:t>Tuesday, September 9, 14</a:t>
             </a:fld>
             <a:endParaRPr lang="en-US"/>
           </a:p>
@@ -7310,7 +7329,7 @@
           <a:p>
             <a:fld id="{02594B8D-7ED3-994B-82CA-0C7CA241AA96}" type="datetime2">
               <a:rPr lang="en-US" smtClean="0"/>
-              <a:t>Monday, September 8, 14</a:t>
+              <a:t>Tuesday, September 9, 14</a:t>
             </a:fld>
             <a:endParaRPr lang="en-US"/>
           </a:p>
@@ -7727,7 +7746,7 @@
           <a:p>
             <a:fld id="{EB25C7AB-79BD-7546-8695-AC7A18D717BD}" type="datetime2">
               <a:rPr lang="en-US" smtClean="0"/>
-              <a:t>Monday, September 8, 14</a:t>
+              <a:t>Tuesday, September 9, 14</a:t>
             </a:fld>
             <a:endParaRPr lang="en-US"/>
           </a:p>
@@ -8146,7 +8165,7 @@
           <a:p>
             <a:fld id="{31770848-78B3-3248-A0EA-E38D39173DD4}" type="datetime2">
               <a:rPr lang="en-US" smtClean="0"/>
-              <a:t>Monday, September 8, 14</a:t>
+              <a:t>Tuesday, September 9, 14</a:t>
             </a:fld>
             <a:endParaRPr lang="en-US" dirty="0"/>
           </a:p>
@@ -8374,9 +8393,16 @@
             <p:ph sz="quarter" idx="13"/>
           </p:nvPr>
         </p:nvSpPr>
-        <p:spPr/>
-        <p:txBody>
-          <a:bodyPr/>
+        <p:spPr>
+          <a:xfrm>
+            <a:off x="254000" y="909977"/>
+            <a:ext cx="8763000" cy="1118512"/>
+          </a:xfrm>
+        </p:spPr>
+        <p:txBody>
+          <a:bodyPr>
+            <a:normAutofit/>
+          </a:bodyPr>
           <a:lstStyle/>
           <a:p>
             <a:pPr marL="0" indent="0">
@@ -8435,7 +8461,7 @@
           <a:p>
             <a:fld id="{642F8AD5-95CC-6A4A-AFBA-25C92AE8BEE2}" type="datetime2">
               <a:rPr lang="en-US" smtClean="0"/>
-              <a:t>Monday, September 8, 14</a:t>
+              <a:t>Tuesday, September 9, 14</a:t>
             </a:fld>
             <a:endParaRPr lang="en-US" dirty="0"/>
           </a:p>
@@ -8623,7 +8649,7 @@
           <a:p>
             <a:fld id="{DD491DF7-D282-8942-9FFE-6B96B15E5D03}" type="datetime2">
               <a:rPr lang="en-US" smtClean="0"/>
-              <a:t>Monday, September 8, 14</a:t>
+              <a:t>Tuesday, September 9, 14</a:t>
             </a:fld>
             <a:endParaRPr lang="en-US"/>
           </a:p>
@@ -8863,7 +8889,7 @@
           <a:p>
             <a:fld id="{F1060730-38E4-9A4D-91E5-4BB6949294EA}" type="datetime2">
               <a:rPr lang="en-US" smtClean="0"/>
-              <a:t>Monday, September 8, 14</a:t>
+              <a:t>Tuesday, September 9, 14</a:t>
             </a:fld>
             <a:endParaRPr lang="en-US" dirty="0"/>
           </a:p>
@@ -9016,12 +9042,12 @@
               <a:t>must ensure it can deliver method invocations to the objects, </a:t>
             </a:r>
             <a:r>
-              <a:rPr lang="en-US" dirty="0" err="1"/>
-              <a:t>whereever</a:t>
+              <a:rPr lang="en-US" dirty="0" smtClean="0"/>
+              <a:t>wherever </a:t>
             </a:r>
             <a:r>
               <a:rPr lang="en-US" dirty="0"/>
-              <a:t> they go</a:t>
+              <a:t>they go</a:t>
             </a:r>
           </a:p>
           <a:p>
@@ -9058,7 +9084,7 @@
           <a:p>
             <a:fld id="{69D75089-F018-8D47-8011-38D5D6797767}" type="datetime2">
               <a:rPr lang="en-US" smtClean="0"/>
-              <a:t>Monday, September 8, 14</a:t>
+              <a:t>Tuesday, September 9, 14</a:t>
             </a:fld>
             <a:endParaRPr lang="en-US"/>
           </a:p>
@@ -9108,7 +9134,7 @@
               <a:pPr/>
               <a:t>8</a:t>
             </a:fld>
-            <a:endParaRPr lang="en-US"/>
+            <a:endParaRPr lang="en-US" dirty="0"/>
           </a:p>
         </p:txBody>
       </p:sp>
@@ -9540,7 +9566,7 @@
           <a:p>
             <a:fld id="{DB7419AD-EE4A-E14E-B12A-28C4E0B85F4D}" type="datetime2">
               <a:rPr lang="en-US" smtClean="0"/>
-              <a:t>Monday, September 8, 14</a:t>
+              <a:t>Tuesday, September 9, 14</a:t>
             </a:fld>
             <a:endParaRPr lang="en-US" dirty="0"/>
           </a:p>

</xml_diff>

<commit_message>
tut 3: combine stencil example slides
</commit_message>
<xml_diff>
--- a/tutorial-03-benefits.pptx
+++ b/tutorial-03-benefits.pptx
@@ -5,29 +5,28 @@
     <p:sldMasterId id="2147483974" r:id="rId1"/>
   </p:sldMasterIdLst>
   <p:notesMasterIdLst>
-    <p:notesMasterId r:id="rId19"/>
+    <p:notesMasterId r:id="rId18"/>
   </p:notesMasterIdLst>
   <p:handoutMasterIdLst>
-    <p:handoutMasterId r:id="rId20"/>
+    <p:handoutMasterId r:id="rId19"/>
   </p:handoutMasterIdLst>
   <p:sldIdLst>
     <p:sldId id="322" r:id="rId2"/>
-    <p:sldId id="323" r:id="rId3"/>
-    <p:sldId id="324" r:id="rId4"/>
-    <p:sldId id="345" r:id="rId5"/>
-    <p:sldId id="331" r:id="rId6"/>
-    <p:sldId id="332" r:id="rId7"/>
-    <p:sldId id="333" r:id="rId8"/>
-    <p:sldId id="334" r:id="rId9"/>
-    <p:sldId id="335" r:id="rId10"/>
-    <p:sldId id="336" r:id="rId11"/>
-    <p:sldId id="337" r:id="rId12"/>
-    <p:sldId id="340" r:id="rId13"/>
-    <p:sldId id="329" r:id="rId14"/>
-    <p:sldId id="341" r:id="rId15"/>
-    <p:sldId id="342" r:id="rId16"/>
-    <p:sldId id="343" r:id="rId17"/>
-    <p:sldId id="346" r:id="rId18"/>
+    <p:sldId id="347" r:id="rId3"/>
+    <p:sldId id="349" r:id="rId4"/>
+    <p:sldId id="331" r:id="rId5"/>
+    <p:sldId id="332" r:id="rId6"/>
+    <p:sldId id="333" r:id="rId7"/>
+    <p:sldId id="334" r:id="rId8"/>
+    <p:sldId id="335" r:id="rId9"/>
+    <p:sldId id="336" r:id="rId10"/>
+    <p:sldId id="337" r:id="rId11"/>
+    <p:sldId id="340" r:id="rId12"/>
+    <p:sldId id="329" r:id="rId13"/>
+    <p:sldId id="341" r:id="rId14"/>
+    <p:sldId id="342" r:id="rId15"/>
+    <p:sldId id="343" r:id="rId16"/>
+    <p:sldId id="346" r:id="rId17"/>
   </p:sldIdLst>
   <p:sldSz cx="9144000" cy="6858000" type="screen4x3"/>
   <p:notesSz cx="6858000" cy="9144000"/>
@@ -217,7 +216,7 @@
           <a:p>
             <a:fld id="{775CE290-E0F5-444C-B849-A8F17CD4104C}" type="datetimeFigureOut">
               <a:rPr lang="en-US" smtClean="0"/>
-              <a:t>9/12/14</a:t>
+              <a:t>11/16/14</a:t>
             </a:fld>
             <a:endParaRPr lang="en-US"/>
           </a:p>
@@ -383,7 +382,7 @@
           <a:p>
             <a:fld id="{AD53A24C-4135-094C-957B-35852E7EDFA4}" type="datetimeFigureOut">
               <a:rPr lang="en-US" smtClean="0"/>
-              <a:t>9/12/14</a:t>
+              <a:t>11/16/14</a:t>
             </a:fld>
             <a:endParaRPr lang="en-US"/>
           </a:p>
@@ -729,7 +728,7 @@
           <a:p>
             <a:fld id="{DF7F4D5E-EC34-BC40-81FA-0B854D990F5C}" type="slidenum">
               <a:rPr lang="en-US" smtClean="0"/>
-              <a:t>10</a:t>
+              <a:t>9</a:t>
             </a:fld>
             <a:endParaRPr lang="en-US"/>
           </a:p>
@@ -940,7 +939,7 @@
           <a:p>
             <a:fld id="{8FF3A859-BE85-5540-BC7F-70D2CBAF8154}" type="datetime2">
               <a:rPr lang="en-US" smtClean="0"/>
-              <a:t>Friday, September 12, 14</a:t>
+              <a:t>Sunday, November 16, 14</a:t>
             </a:fld>
             <a:endParaRPr lang="en-US"/>
           </a:p>
@@ -1243,7 +1242,7 @@
                 <a:latin typeface="Times New Roman"/>
                 <a:cs typeface="Times New Roman"/>
               </a:rPr>
-              <a:t>September 12, 2014</a:t>
+              <a:t>November 16, 2014</a:t>
             </a:fld>
             <a:endParaRPr lang="en-US" dirty="0">
               <a:latin typeface="Times New Roman"/>
@@ -1517,7 +1516,7 @@
                 <a:latin typeface="Times New Roman"/>
                 <a:cs typeface="Times New Roman"/>
               </a:rPr>
-              <a:t>September 12, 2014</a:t>
+              <a:t>November 16, 2014</a:t>
             </a:fld>
             <a:endParaRPr lang="en-US" dirty="0">
               <a:latin typeface="Times New Roman"/>
@@ -1752,7 +1751,7 @@
           <a:p>
             <a:fld id="{41CEFBAA-252D-A648-BAD8-4E94BE0EDDEA}" type="datetime2">
               <a:rPr lang="en-US" smtClean="0"/>
-              <a:t>Friday, September 12, 14</a:t>
+              <a:t>Sunday, November 16, 14</a:t>
             </a:fld>
             <a:endParaRPr lang="en-US"/>
           </a:p>
@@ -2063,7 +2062,7 @@
           <a:p>
             <a:fld id="{4AF7AAD2-5F2A-D342-B4C0-03A6552DA99F}" type="datetime2">
               <a:rPr lang="en-US" smtClean="0"/>
-              <a:t>Friday, September 12, 14</a:t>
+              <a:t>Sunday, November 16, 14</a:t>
             </a:fld>
             <a:endParaRPr lang="en-US"/>
           </a:p>
@@ -2234,7 +2233,7 @@
           <a:p>
             <a:fld id="{1CBE50D1-DA85-EE4D-A1F2-89B94C0FA5DB}" type="datetime2">
               <a:rPr lang="en-US" smtClean="0"/>
-              <a:t>Friday, September 12, 14</a:t>
+              <a:t>Sunday, November 16, 14</a:t>
             </a:fld>
             <a:endParaRPr lang="en-US"/>
           </a:p>
@@ -2415,7 +2414,7 @@
           <a:p>
             <a:fld id="{546F55FB-E3B6-E74E-B53D-71469D2EBDD4}" type="datetime2">
               <a:rPr lang="en-US" smtClean="0"/>
-              <a:t>Friday, September 12, 14</a:t>
+              <a:t>Sunday, November 16, 14</a:t>
             </a:fld>
             <a:endParaRPr lang="en-US"/>
           </a:p>
@@ -2669,7 +2668,7 @@
           <a:p>
             <a:fld id="{C9082BD8-7A8C-F949-AD06-5F16E39B6240}" type="datetime2">
               <a:rPr lang="en-US" smtClean="0"/>
-              <a:t>Friday, September 12, 14</a:t>
+              <a:t>Sunday, November 16, 14</a:t>
             </a:fld>
             <a:endParaRPr lang="en-US"/>
           </a:p>
@@ -2972,7 +2971,7 @@
                 <a:latin typeface="Times New Roman"/>
                 <a:cs typeface="Times New Roman"/>
               </a:rPr>
-              <a:t>September 12, 2014</a:t>
+              <a:t>November 16, 2014</a:t>
             </a:fld>
             <a:endParaRPr lang="en-US" dirty="0">
               <a:latin typeface="Times New Roman"/>
@@ -3098,7 +3097,7 @@
           <a:p>
             <a:fld id="{AE65AA2A-E6A2-FD4C-BE73-804BCA7231CE}" type="datetime2">
               <a:rPr lang="en-US" smtClean="0"/>
-              <a:t>Friday, September 12, 14</a:t>
+              <a:t>Sunday, November 16, 14</a:t>
             </a:fld>
             <a:endParaRPr lang="en-US" dirty="0"/>
           </a:p>
@@ -3627,7 +3626,7 @@
           <a:p>
             <a:fld id="{159830AE-FF43-7149-AB39-D496E1AB8AB0}" type="datetime2">
               <a:rPr lang="en-US" smtClean="0"/>
-              <a:t>Friday, September 12, 14</a:t>
+              <a:t>Sunday, November 16, 14</a:t>
             </a:fld>
             <a:endParaRPr lang="en-US" dirty="0"/>
           </a:p>
@@ -3923,7 +3922,7 @@
           <a:p>
             <a:fld id="{FBCC44F2-9EBA-7147-913F-4353D08E9DAD}" type="datetime2">
               <a:rPr lang="en-US" smtClean="0"/>
-              <a:t>Friday, September 12, 14</a:t>
+              <a:t>Sunday, November 16, 14</a:t>
             </a:fld>
             <a:endParaRPr lang="en-US"/>
           </a:p>
@@ -4042,7 +4041,7 @@
           <a:p>
             <a:fld id="{FD535670-51A7-C740-9EE9-A29C33E3A416}" type="datetime2">
               <a:rPr lang="en-US" smtClean="0"/>
-              <a:t>Friday, September 12, 14</a:t>
+              <a:t>Sunday, November 16, 14</a:t>
             </a:fld>
             <a:endParaRPr lang="en-US" dirty="0"/>
           </a:p>
@@ -4529,7 +4528,7 @@
           <a:p>
             <a:fld id="{8813FFBC-DD15-384D-9E12-FB4E543B5401}" type="datetime2">
               <a:rPr lang="en-US" smtClean="0"/>
-              <a:t>Friday, September 12, 14</a:t>
+              <a:t>Sunday, November 16, 14</a:t>
             </a:fld>
             <a:endParaRPr lang="en-US"/>
           </a:p>
@@ -4860,7 +4859,7 @@
           <a:p>
             <a:fld id="{43F997CE-1B8A-A344-8351-4BF8AF798964}" type="datetime2">
               <a:rPr lang="en-US" smtClean="0"/>
-              <a:t>Friday, September 12, 14</a:t>
+              <a:t>Sunday, November 16, 14</a:t>
             </a:fld>
             <a:endParaRPr lang="en-US" dirty="0"/>
           </a:p>
@@ -5339,7 +5338,7 @@
           <a:p>
             <a:fld id="{5A5FDE6B-9DAB-C245-8675-7D276E9214BE}" type="datetime2">
               <a:rPr lang="en-US" smtClean="0"/>
-              <a:t>Friday, September 12, 14</a:t>
+              <a:t>Sunday, November 16, 14</a:t>
             </a:fld>
             <a:endParaRPr lang="en-US"/>
           </a:p>
@@ -5635,7 +5634,7 @@
           <a:p>
             <a:fld id="{882A0E4B-129A-5147-A7DE-E77CC3B6DD8B}" type="datetime2">
               <a:rPr lang="en-US" smtClean="0"/>
-              <a:t>Friday, September 12, 14</a:t>
+              <a:t>Sunday, November 16, 14</a:t>
             </a:fld>
             <a:endParaRPr lang="en-US" dirty="0"/>
           </a:p>
@@ -5878,7 +5877,7 @@
           <a:p>
             <a:fld id="{F02F99AC-48EA-3D44-B4C6-29C2F5209569}" type="datetime2">
               <a:rPr lang="en-US" smtClean="0"/>
-              <a:t>Friday, September 12, 14</a:t>
+              <a:t>Sunday, November 16, 14</a:t>
             </a:fld>
             <a:endParaRPr lang="en-US"/>
           </a:p>
@@ -5974,7 +5973,7 @@
           <a:p>
             <a:fld id="{75167BAC-BDEB-D246-88A6-C1E9646D95A3}" type="datetime2">
               <a:rPr lang="en-US" smtClean="0"/>
-              <a:t>Friday, September 12, 14</a:t>
+              <a:t>Sunday, November 16, 14</a:t>
             </a:fld>
             <a:endParaRPr lang="en-US"/>
           </a:p>
@@ -6289,7 +6288,7 @@
           <a:p>
             <a:fld id="{82F93B5A-2D6D-8D46-84D5-A2066467ACFB}" type="datetime2">
               <a:rPr lang="en-US" smtClean="0"/>
-              <a:t>Friday, September 12, 14</a:t>
+              <a:t>Sunday, November 16, 14</a:t>
             </a:fld>
             <a:endParaRPr lang="en-US" dirty="0"/>
           </a:p>
@@ -7122,123 +7121,182 @@
         <p:spPr/>
         <p:txBody>
           <a:bodyPr>
-            <a:normAutofit fontScale="90000"/>
+            <a:normAutofit/>
           </a:bodyPr>
           <a:lstStyle/>
           <a:p>
             <a:r>
+              <a:rPr lang="en-US" dirty="0" smtClean="0"/>
+              <a:t>Load Balancing</a:t>
+            </a:r>
+            <a:endParaRPr lang="en-US" dirty="0"/>
+          </a:p>
+        </p:txBody>
+      </p:sp>
+      <p:sp>
+        <p:nvSpPr>
+          <p:cNvPr id="3" name="Content Placeholder 2"/>
+          <p:cNvSpPr>
+            <a:spLocks noGrp="1"/>
+          </p:cNvSpPr>
+          <p:nvPr>
+            <p:ph idx="1"/>
+          </p:nvPr>
+        </p:nvSpPr>
+        <p:spPr/>
+        <p:txBody>
+          <a:bodyPr>
+            <a:normAutofit/>
+          </a:bodyPr>
+          <a:lstStyle/>
+          <a:p>
+            <a:r>
               <a:rPr lang="en-US" dirty="0"/>
-              <a:t>Utility for Multi-cores, Many-cores, Accelerators</a:t>
-            </a:r>
-          </a:p>
-        </p:txBody>
-      </p:sp>
-      <p:sp>
-        <p:nvSpPr>
-          <p:cNvPr id="3" name="Content Placeholder 2"/>
-          <p:cNvSpPr>
-            <a:spLocks noGrp="1"/>
-          </p:cNvSpPr>
-          <p:nvPr>
-            <p:ph idx="1"/>
-          </p:nvPr>
-        </p:nvSpPr>
-        <p:spPr>
-          <a:xfrm>
-            <a:off x="261865" y="846082"/>
-            <a:ext cx="8615360" cy="2347160"/>
-          </a:xfrm>
-        </p:spPr>
+              <a:t>Static</a:t>
+            </a:r>
+          </a:p>
+          <a:p>
+            <a:pPr lvl="1"/>
+            <a:r>
+              <a:rPr lang="en-US" dirty="0" smtClean="0"/>
+              <a:t>Irregular </a:t>
+            </a:r>
+            <a:r>
+              <a:rPr lang="en-US" dirty="0"/>
+              <a:t>applications</a:t>
+            </a:r>
+          </a:p>
+          <a:p>
+            <a:pPr lvl="1"/>
+            <a:r>
+              <a:rPr lang="en-US" dirty="0" smtClean="0"/>
+              <a:t>Programmer </a:t>
+            </a:r>
+            <a:r>
+              <a:rPr lang="en-US" dirty="0"/>
+              <a:t>shouldn’t have to figure out ideal mapping</a:t>
+            </a:r>
+          </a:p>
+          <a:p>
+            <a:r>
+              <a:rPr lang="en-US" dirty="0"/>
+              <a:t>Dynamic</a:t>
+            </a:r>
+          </a:p>
+          <a:p>
+            <a:pPr lvl="1"/>
+            <a:r>
+              <a:rPr lang="en-US" dirty="0" smtClean="0"/>
+              <a:t>Applications </a:t>
+            </a:r>
+            <a:r>
+              <a:rPr lang="en-US" dirty="0"/>
+              <a:t>are increasingly using adaptive strategies </a:t>
+            </a:r>
+            <a:endParaRPr lang="en-US" dirty="0" smtClean="0"/>
+          </a:p>
+          <a:p>
+            <a:pPr lvl="1"/>
+            <a:r>
+              <a:rPr lang="en-US" dirty="0" smtClean="0"/>
+              <a:t>Abrupt </a:t>
+            </a:r>
+            <a:r>
+              <a:rPr lang="en-US" dirty="0"/>
+              <a:t>refinements</a:t>
+            </a:r>
+          </a:p>
+          <a:p>
+            <a:pPr lvl="1"/>
+            <a:r>
+              <a:rPr lang="en-US" dirty="0" smtClean="0"/>
+              <a:t>Continuous </a:t>
+            </a:r>
+            <a:r>
+              <a:rPr lang="en-US" dirty="0"/>
+              <a:t>migration of work: e.g. particles in MD</a:t>
+            </a:r>
+          </a:p>
+          <a:p>
+            <a:r>
+              <a:rPr lang="en-US" dirty="0"/>
+              <a:t>Challenges</a:t>
+            </a:r>
+          </a:p>
+          <a:p>
+            <a:pPr lvl="1"/>
+            <a:r>
+              <a:rPr lang="en-US" dirty="0" smtClean="0"/>
+              <a:t>Performance </a:t>
+            </a:r>
+            <a:r>
+              <a:rPr lang="en-US" dirty="0"/>
+              <a:t>limited by most overloaded processor</a:t>
+            </a:r>
+          </a:p>
+          <a:p>
+            <a:pPr lvl="1"/>
+            <a:r>
+              <a:rPr lang="en-US" dirty="0" smtClean="0"/>
+              <a:t>The </a:t>
+            </a:r>
+            <a:r>
+              <a:rPr lang="en-US" dirty="0"/>
+              <a:t>chance that one processor is severely overloaded gets higher </a:t>
+            </a:r>
+            <a:r>
+              <a:rPr lang="en-US" dirty="0" smtClean="0"/>
+              <a:t>as #</a:t>
+            </a:r>
+            <a:r>
+              <a:rPr lang="en-US" dirty="0"/>
+              <a:t>processors </a:t>
+            </a:r>
+            <a:r>
+              <a:rPr lang="en-US" dirty="0" smtClean="0"/>
+              <a:t>increases</a:t>
+            </a:r>
+          </a:p>
+          <a:p>
+            <a:pPr marL="274320" lvl="1" indent="0">
+              <a:buNone/>
+            </a:pPr>
+            <a:endParaRPr lang="en-US" dirty="0" smtClean="0"/>
+          </a:p>
+          <a:p>
+            <a:pPr marL="274320" lvl="1" indent="0">
+              <a:buNone/>
+            </a:pPr>
+            <a:r>
+              <a:rPr lang="en-US" sz="2400" b="1" dirty="0" err="1" smtClean="0"/>
+              <a:t>Migratable</a:t>
+            </a:r>
+            <a:r>
+              <a:rPr lang="en-US" sz="2400" b="1" dirty="0" smtClean="0"/>
+              <a:t> </a:t>
+            </a:r>
+            <a:r>
+              <a:rPr lang="en-US" sz="2400" b="1" dirty="0"/>
+              <a:t>Objects Empower Automated Load Balancing!</a:t>
+            </a:r>
+          </a:p>
+        </p:txBody>
+      </p:sp>
+      <p:sp>
+        <p:nvSpPr>
+          <p:cNvPr id="5" name="Footer Placeholder 4"/>
+          <p:cNvSpPr>
+            <a:spLocks noGrp="1"/>
+          </p:cNvSpPr>
+          <p:nvPr>
+            <p:ph type="ftr" sz="quarter" idx="11"/>
+          </p:nvPr>
+        </p:nvSpPr>
+        <p:spPr/>
         <p:txBody>
           <a:bodyPr/>
           <a:lstStyle/>
           <a:p>
-            <a:r>
-              <a:rPr lang="en-US" dirty="0"/>
-              <a:t>Objects connote and promote locality </a:t>
-            </a:r>
-            <a:endParaRPr lang="en-US" dirty="0" smtClean="0"/>
-          </a:p>
-          <a:p>
-            <a:r>
-              <a:rPr lang="en-US" dirty="0" smtClean="0"/>
-              <a:t>Message</a:t>
-            </a:r>
-            <a:r>
-              <a:rPr lang="en-US" dirty="0"/>
-              <a:t>-driven execution is</a:t>
-            </a:r>
-          </a:p>
-          <a:p>
-            <a:pPr lvl="1"/>
-            <a:r>
-              <a:rPr lang="en-US" dirty="0" smtClean="0"/>
-              <a:t>A </a:t>
-            </a:r>
-            <a:r>
-              <a:rPr lang="en-US" dirty="0"/>
-              <a:t>strong principle of prediction for data and code use </a:t>
-            </a:r>
-            <a:endParaRPr lang="en-US" dirty="0" smtClean="0"/>
-          </a:p>
-          <a:p>
-            <a:pPr lvl="1"/>
-            <a:r>
-              <a:rPr lang="en-US" dirty="0" smtClean="0"/>
-              <a:t>Much </a:t>
-            </a:r>
-            <a:r>
-              <a:rPr lang="en-US" dirty="0"/>
-              <a:t>stronger than principle of locality</a:t>
-            </a:r>
-          </a:p>
-          <a:p>
-            <a:pPr lvl="2"/>
-            <a:r>
-              <a:rPr lang="en-US" dirty="0" smtClean="0"/>
-              <a:t>Can </a:t>
-            </a:r>
-            <a:r>
-              <a:rPr lang="en-US" dirty="0"/>
-              <a:t>be used to scale memory wall</a:t>
-            </a:r>
-          </a:p>
-          <a:p>
-            <a:pPr lvl="2"/>
-            <a:r>
-              <a:rPr lang="en-US" dirty="0" smtClean="0"/>
-              <a:t>Prefetching </a:t>
-            </a:r>
-            <a:r>
-              <a:rPr lang="en-US" dirty="0"/>
-              <a:t>of needed data, </a:t>
-            </a:r>
-            <a:r>
-              <a:rPr lang="en-US" dirty="0" err="1"/>
-              <a:t>e.g</a:t>
-            </a:r>
-            <a:r>
-              <a:rPr lang="en-US" dirty="0"/>
-              <a:t>, into scratch pad memories</a:t>
-            </a:r>
-          </a:p>
-        </p:txBody>
-      </p:sp>
-      <p:sp>
-        <p:nvSpPr>
-          <p:cNvPr id="6" name="Footer Placeholder 5"/>
-          <p:cNvSpPr>
-            <a:spLocks noGrp="1"/>
-          </p:cNvSpPr>
-          <p:nvPr>
-            <p:ph type="ftr" sz="quarter" idx="11"/>
-          </p:nvPr>
-        </p:nvSpPr>
-        <p:spPr/>
-        <p:txBody>
-          <a:bodyPr/>
-          <a:lstStyle/>
-          <a:p>
             <a:pPr algn="r"/>
             <a:r>
               <a:rPr lang="en-US" smtClean="0"/>
@@ -7250,7 +7308,7 @@
       </p:sp>
       <p:sp>
         <p:nvSpPr>
-          <p:cNvPr id="7" name="Slide Number Placeholder 6"/>
+          <p:cNvPr id="6" name="Slide Number Placeholder 5"/>
           <p:cNvSpPr>
             <a:spLocks noGrp="1"/>
           </p:cNvSpPr>
@@ -7272,34 +7330,10 @@
           </a:p>
         </p:txBody>
       </p:sp>
-      <p:pic>
-        <p:nvPicPr>
-          <p:cNvPr id="4" name="Picture 3"/>
-          <p:cNvPicPr>
-            <a:picLocks noChangeAspect="1"/>
-          </p:cNvPicPr>
-          <p:nvPr/>
-        </p:nvPicPr>
-        <p:blipFill>
-          <a:blip r:embed="rId3"/>
-          <a:stretch>
-            <a:fillRect/>
-          </a:stretch>
-        </p:blipFill>
-        <p:spPr>
-          <a:xfrm>
-            <a:off x="1788286" y="3317084"/>
-            <a:ext cx="5625213" cy="2976029"/>
-          </a:xfrm>
-          <a:prstGeom prst="rect">
-            <a:avLst/>
-          </a:prstGeom>
-        </p:spPr>
-      </p:pic>
     </p:spTree>
     <p:extLst>
       <p:ext uri="{BB962C8B-B14F-4D97-AF65-F5344CB8AC3E}">
-        <p14:creationId xmlns:p14="http://schemas.microsoft.com/office/powerpoint/2010/main" val="576997588"/>
+        <p14:creationId xmlns:p14="http://schemas.microsoft.com/office/powerpoint/2010/main" val="2100563249"/>
       </p:ext>
     </p:extLst>
   </p:cSld>
@@ -7346,265 +7380,6 @@
         <p:spPr/>
         <p:txBody>
           <a:bodyPr>
-            <a:normAutofit/>
-          </a:bodyPr>
-          <a:lstStyle/>
-          <a:p>
-            <a:r>
-              <a:rPr lang="en-US" dirty="0" smtClean="0"/>
-              <a:t>Load Balancing</a:t>
-            </a:r>
-            <a:endParaRPr lang="en-US" dirty="0"/>
-          </a:p>
-        </p:txBody>
-      </p:sp>
-      <p:sp>
-        <p:nvSpPr>
-          <p:cNvPr id="3" name="Content Placeholder 2"/>
-          <p:cNvSpPr>
-            <a:spLocks noGrp="1"/>
-          </p:cNvSpPr>
-          <p:nvPr>
-            <p:ph idx="1"/>
-          </p:nvPr>
-        </p:nvSpPr>
-        <p:spPr/>
-        <p:txBody>
-          <a:bodyPr>
-            <a:normAutofit/>
-          </a:bodyPr>
-          <a:lstStyle/>
-          <a:p>
-            <a:r>
-              <a:rPr lang="en-US" dirty="0"/>
-              <a:t>Static</a:t>
-            </a:r>
-          </a:p>
-          <a:p>
-            <a:pPr lvl="1"/>
-            <a:r>
-              <a:rPr lang="en-US" dirty="0" smtClean="0"/>
-              <a:t>Irregular </a:t>
-            </a:r>
-            <a:r>
-              <a:rPr lang="en-US" dirty="0"/>
-              <a:t>applications</a:t>
-            </a:r>
-          </a:p>
-          <a:p>
-            <a:pPr lvl="1"/>
-            <a:r>
-              <a:rPr lang="en-US" dirty="0" smtClean="0"/>
-              <a:t>Programmer </a:t>
-            </a:r>
-            <a:r>
-              <a:rPr lang="en-US" dirty="0"/>
-              <a:t>shouldn’t have to figure out ideal mapping</a:t>
-            </a:r>
-          </a:p>
-          <a:p>
-            <a:r>
-              <a:rPr lang="en-US" dirty="0"/>
-              <a:t>Dynamic</a:t>
-            </a:r>
-          </a:p>
-          <a:p>
-            <a:pPr lvl="1"/>
-            <a:r>
-              <a:rPr lang="en-US" dirty="0" smtClean="0"/>
-              <a:t>Applications </a:t>
-            </a:r>
-            <a:r>
-              <a:rPr lang="en-US" dirty="0"/>
-              <a:t>are increasingly using adaptive strategies </a:t>
-            </a:r>
-            <a:endParaRPr lang="en-US" dirty="0" smtClean="0"/>
-          </a:p>
-          <a:p>
-            <a:pPr lvl="1"/>
-            <a:r>
-              <a:rPr lang="en-US" dirty="0" smtClean="0"/>
-              <a:t>Abrupt </a:t>
-            </a:r>
-            <a:r>
-              <a:rPr lang="en-US" dirty="0"/>
-              <a:t>refinements</a:t>
-            </a:r>
-          </a:p>
-          <a:p>
-            <a:pPr lvl="1"/>
-            <a:r>
-              <a:rPr lang="en-US" dirty="0" smtClean="0"/>
-              <a:t>Continuous </a:t>
-            </a:r>
-            <a:r>
-              <a:rPr lang="en-US" dirty="0"/>
-              <a:t>migration of work: e.g. particles in MD</a:t>
-            </a:r>
-          </a:p>
-          <a:p>
-            <a:r>
-              <a:rPr lang="en-US" dirty="0"/>
-              <a:t>Challenges</a:t>
-            </a:r>
-          </a:p>
-          <a:p>
-            <a:pPr lvl="1"/>
-            <a:r>
-              <a:rPr lang="en-US" dirty="0" smtClean="0"/>
-              <a:t>Performance </a:t>
-            </a:r>
-            <a:r>
-              <a:rPr lang="en-US" dirty="0"/>
-              <a:t>limited by most overloaded processor</a:t>
-            </a:r>
-          </a:p>
-          <a:p>
-            <a:pPr lvl="1"/>
-            <a:r>
-              <a:rPr lang="en-US" dirty="0" smtClean="0"/>
-              <a:t>The </a:t>
-            </a:r>
-            <a:r>
-              <a:rPr lang="en-US" dirty="0"/>
-              <a:t>chance that one processor is severely overloaded gets higher </a:t>
-            </a:r>
-            <a:r>
-              <a:rPr lang="en-US" dirty="0" smtClean="0"/>
-              <a:t>as #</a:t>
-            </a:r>
-            <a:r>
-              <a:rPr lang="en-US" dirty="0"/>
-              <a:t>processors </a:t>
-            </a:r>
-            <a:r>
-              <a:rPr lang="en-US" dirty="0" smtClean="0"/>
-              <a:t>increases</a:t>
-            </a:r>
-          </a:p>
-          <a:p>
-            <a:pPr marL="274320" lvl="1" indent="0">
-              <a:buNone/>
-            </a:pPr>
-            <a:endParaRPr lang="en-US" dirty="0" smtClean="0"/>
-          </a:p>
-          <a:p>
-            <a:pPr marL="274320" lvl="1" indent="0">
-              <a:buNone/>
-            </a:pPr>
-            <a:r>
-              <a:rPr lang="en-US" sz="2400" b="1" dirty="0" err="1" smtClean="0"/>
-              <a:t>Migratable</a:t>
-            </a:r>
-            <a:r>
-              <a:rPr lang="en-US" sz="2400" b="1" dirty="0" smtClean="0"/>
-              <a:t> </a:t>
-            </a:r>
-            <a:r>
-              <a:rPr lang="en-US" sz="2400" b="1" dirty="0"/>
-              <a:t>Objects Empower Automated Load Balancing!</a:t>
-            </a:r>
-          </a:p>
-        </p:txBody>
-      </p:sp>
-      <p:sp>
-        <p:nvSpPr>
-          <p:cNvPr id="5" name="Footer Placeholder 4"/>
-          <p:cNvSpPr>
-            <a:spLocks noGrp="1"/>
-          </p:cNvSpPr>
-          <p:nvPr>
-            <p:ph type="ftr" sz="quarter" idx="11"/>
-          </p:nvPr>
-        </p:nvSpPr>
-        <p:spPr/>
-        <p:txBody>
-          <a:bodyPr/>
-          <a:lstStyle/>
-          <a:p>
-            <a:pPr algn="r"/>
-            <a:r>
-              <a:rPr lang="en-US" smtClean="0"/>
-              <a:t>Laxmikant Kalé and PPL (UIUC) – Parallel Migratable Objects </a:t>
-            </a:r>
-            <a:endParaRPr lang="en-US" dirty="0"/>
-          </a:p>
-        </p:txBody>
-      </p:sp>
-      <p:sp>
-        <p:nvSpPr>
-          <p:cNvPr id="6" name="Slide Number Placeholder 5"/>
-          <p:cNvSpPr>
-            <a:spLocks noGrp="1"/>
-          </p:cNvSpPr>
-          <p:nvPr>
-            <p:ph type="sldNum" sz="quarter" idx="12"/>
-          </p:nvPr>
-        </p:nvSpPr>
-        <p:spPr/>
-        <p:txBody>
-          <a:bodyPr/>
-          <a:lstStyle/>
-          <a:p>
-            <a:fld id="{0CFEC368-1D7A-4F81-ABF6-AE0E36BAF64C}" type="slidenum">
-              <a:rPr lang="en-US" smtClean="0"/>
-              <a:pPr/>
-              <a:t>11</a:t>
-            </a:fld>
-            <a:endParaRPr lang="en-US"/>
-          </a:p>
-        </p:txBody>
-      </p:sp>
-    </p:spTree>
-    <p:extLst>
-      <p:ext uri="{BB962C8B-B14F-4D97-AF65-F5344CB8AC3E}">
-        <p14:creationId xmlns:p14="http://schemas.microsoft.com/office/powerpoint/2010/main" val="2100563249"/>
-      </p:ext>
-    </p:extLst>
-  </p:cSld>
-  <p:clrMapOvr>
-    <a:masterClrMapping/>
-  </p:clrMapOvr>
-  <p:timing>
-    <p:tnLst>
-      <p:par>
-        <p:cTn xmlns:p14="http://schemas.microsoft.com/office/powerpoint/2010/main" id="1" dur="indefinite" restart="never" nodeType="tmRoot"/>
-      </p:par>
-    </p:tnLst>
-  </p:timing>
-</p:sld>
-</file>
-
-<file path=ppt/slides/slide12.xml><?xml version="1.0" encoding="utf-8"?>
-<p:sld xmlns:a="http://schemas.openxmlformats.org/drawingml/2006/main" xmlns:r="http://schemas.openxmlformats.org/officeDocument/2006/relationships" xmlns:p="http://schemas.openxmlformats.org/presentationml/2006/main">
-  <p:cSld>
-    <p:spTree>
-      <p:nvGrpSpPr>
-        <p:cNvPr id="1" name=""/>
-        <p:cNvGrpSpPr/>
-        <p:nvPr/>
-      </p:nvGrpSpPr>
-      <p:grpSpPr>
-        <a:xfrm>
-          <a:off x="0" y="0"/>
-          <a:ext cx="0" cy="0"/>
-          <a:chOff x="0" y="0"/>
-          <a:chExt cx="0" cy="0"/>
-        </a:xfrm>
-      </p:grpSpPr>
-      <p:sp>
-        <p:nvSpPr>
-          <p:cNvPr id="2" name="Title 1"/>
-          <p:cNvSpPr>
-            <a:spLocks noGrp="1"/>
-          </p:cNvSpPr>
-          <p:nvPr>
-            <p:ph type="title"/>
-          </p:nvPr>
-        </p:nvSpPr>
-        <p:spPr/>
-        <p:txBody>
-          <a:bodyPr>
             <a:normAutofit fontScale="90000"/>
           </a:bodyPr>
           <a:lstStyle/>
@@ -7731,7 +7506,7 @@
             <a:fld id="{0CFEC368-1D7A-4F81-ABF6-AE0E36BAF64C}" type="slidenum">
               <a:rPr lang="en-US" smtClean="0"/>
               <a:pPr/>
-              <a:t>12</a:t>
+              <a:t>11</a:t>
             </a:fld>
             <a:endParaRPr lang="en-US"/>
           </a:p>
@@ -7787,7 +7562,7 @@
 </p:sld>
 </file>
 
-<file path=ppt/slides/slide13.xml><?xml version="1.0" encoding="utf-8"?>
+<file path=ppt/slides/slide12.xml><?xml version="1.0" encoding="utf-8"?>
 <p:sld xmlns:a="http://schemas.openxmlformats.org/drawingml/2006/main" xmlns:r="http://schemas.openxmlformats.org/officeDocument/2006/relationships" xmlns:p="http://schemas.openxmlformats.org/presentationml/2006/main">
   <p:cSld>
     <p:spTree>
@@ -7921,7 +7696,7 @@
             <a:fld id="{0CFEC368-1D7A-4F81-ABF6-AE0E36BAF64C}" type="slidenum">
               <a:rPr lang="en-US" smtClean="0"/>
               <a:pPr/>
-              <a:t>13</a:t>
+              <a:t>12</a:t>
             </a:fld>
             <a:endParaRPr lang="en-US" dirty="0"/>
           </a:p>
@@ -7931,6 +7706,140 @@
     <p:extLst>
       <p:ext uri="{BB962C8B-B14F-4D97-AF65-F5344CB8AC3E}">
         <p14:creationId xmlns:p14="http://schemas.microsoft.com/office/powerpoint/2010/main" val="1328886773"/>
+      </p:ext>
+    </p:extLst>
+  </p:cSld>
+  <p:clrMapOvr>
+    <a:masterClrMapping/>
+  </p:clrMapOvr>
+  <p:timing>
+    <p:tnLst>
+      <p:par>
+        <p:cTn xmlns:p14="http://schemas.microsoft.com/office/powerpoint/2010/main" id="1" dur="indefinite" restart="never" nodeType="tmRoot"/>
+      </p:par>
+    </p:tnLst>
+  </p:timing>
+</p:sld>
+</file>
+
+<file path=ppt/slides/slide13.xml><?xml version="1.0" encoding="utf-8"?>
+<p:sld xmlns:a="http://schemas.openxmlformats.org/drawingml/2006/main" xmlns:r="http://schemas.openxmlformats.org/officeDocument/2006/relationships" xmlns:p="http://schemas.openxmlformats.org/presentationml/2006/main">
+  <p:cSld>
+    <p:spTree>
+      <p:nvGrpSpPr>
+        <p:cNvPr id="1" name=""/>
+        <p:cNvGrpSpPr/>
+        <p:nvPr/>
+      </p:nvGrpSpPr>
+      <p:grpSpPr>
+        <a:xfrm>
+          <a:off x="0" y="0"/>
+          <a:ext cx="0" cy="0"/>
+          <a:chOff x="0" y="0"/>
+          <a:chExt cx="0" cy="0"/>
+        </a:xfrm>
+      </p:grpSpPr>
+      <p:sp>
+        <p:nvSpPr>
+          <p:cNvPr id="2" name="Title 1"/>
+          <p:cNvSpPr>
+            <a:spLocks noGrp="1"/>
+          </p:cNvSpPr>
+          <p:nvPr>
+            <p:ph type="title"/>
+          </p:nvPr>
+        </p:nvSpPr>
+        <p:spPr/>
+        <p:txBody>
+          <a:bodyPr>
+            <a:normAutofit/>
+          </a:bodyPr>
+          <a:lstStyle/>
+          <a:p>
+            <a:r>
+              <a:rPr lang="en-US" dirty="0"/>
+              <a:t>Baseline: 64 objects on 64 processors</a:t>
+            </a:r>
+          </a:p>
+        </p:txBody>
+      </p:sp>
+      <p:pic>
+        <p:nvPicPr>
+          <p:cNvPr id="4" name="Content Placeholder 3" descr="usageNonVirtual.png"/>
+          <p:cNvPicPr>
+            <a:picLocks noGrp="1" noChangeAspect="1"/>
+          </p:cNvPicPr>
+          <p:nvPr>
+            <p:ph idx="1"/>
+          </p:nvPr>
+        </p:nvPicPr>
+        <p:blipFill>
+          <a:blip r:embed="rId2">
+            <a:extLst>
+              <a:ext uri="{28A0092B-C50C-407E-A947-70E740481C1C}">
+                <a14:useLocalDpi xmlns:a14="http://schemas.microsoft.com/office/drawing/2010/main" val="0"/>
+              </a:ext>
+            </a:extLst>
+          </a:blip>
+          <a:srcRect l="-4587" r="-4587"/>
+          <a:stretch>
+            <a:fillRect/>
+          </a:stretch>
+        </p:blipFill>
+        <p:spPr/>
+      </p:pic>
+      <p:sp>
+        <p:nvSpPr>
+          <p:cNvPr id="6" name="Footer Placeholder 5"/>
+          <p:cNvSpPr>
+            <a:spLocks noGrp="1"/>
+          </p:cNvSpPr>
+          <p:nvPr>
+            <p:ph type="ftr" sz="quarter" idx="11"/>
+          </p:nvPr>
+        </p:nvSpPr>
+        <p:spPr/>
+        <p:txBody>
+          <a:bodyPr/>
+          <a:lstStyle/>
+          <a:p>
+            <a:pPr algn="r"/>
+            <a:r>
+              <a:rPr lang="en-US" smtClean="0"/>
+              <a:t>Laxmikant Kalé and PPL (UIUC) – Parallel Migratable Objects </a:t>
+            </a:r>
+            <a:endParaRPr lang="en-US" dirty="0"/>
+          </a:p>
+        </p:txBody>
+      </p:sp>
+      <p:sp>
+        <p:nvSpPr>
+          <p:cNvPr id="7" name="Slide Number Placeholder 6"/>
+          <p:cNvSpPr>
+            <a:spLocks noGrp="1"/>
+          </p:cNvSpPr>
+          <p:nvPr>
+            <p:ph type="sldNum" sz="quarter" idx="12"/>
+          </p:nvPr>
+        </p:nvSpPr>
+        <p:spPr/>
+        <p:txBody>
+          <a:bodyPr/>
+          <a:lstStyle/>
+          <a:p>
+            <a:fld id="{0CFEC368-1D7A-4F81-ABF6-AE0E36BAF64C}" type="slidenum">
+              <a:rPr lang="en-US" smtClean="0"/>
+              <a:pPr/>
+              <a:t>13</a:t>
+            </a:fld>
+            <a:endParaRPr lang="en-US"/>
+          </a:p>
+        </p:txBody>
+      </p:sp>
+    </p:spTree>
+    <p:extLst>
+      <p:ext uri="{BB962C8B-B14F-4D97-AF65-F5344CB8AC3E}">
+        <p14:creationId xmlns:p14="http://schemas.microsoft.com/office/powerpoint/2010/main" val="3672559181"/>
       </p:ext>
     </p:extLst>
   </p:cSld>
@@ -7977,20 +7886,27 @@
         <p:spPr/>
         <p:txBody>
           <a:bodyPr>
-            <a:normAutofit/>
+            <a:normAutofit fontScale="90000"/>
           </a:bodyPr>
           <a:lstStyle/>
           <a:p>
             <a:r>
-              <a:rPr lang="en-US" dirty="0"/>
-              <a:t>Baseline: 64 objects on 64 processors</a:t>
+              <a:rPr lang="en-US" sz="3600" dirty="0"/>
+              <a:t>Over-decomposition: 1024 objects on 64 processors</a:t>
+            </a:r>
+            <a:br>
+              <a:rPr lang="en-US" sz="3600" dirty="0"/>
+            </a:br>
+            <a:r>
+              <a:rPr lang="en-US" sz="2200" dirty="0"/>
+              <a:t>Benefits from communication/computation overlap</a:t>
             </a:r>
           </a:p>
         </p:txBody>
       </p:sp>
       <p:pic>
         <p:nvPicPr>
-          <p:cNvPr id="4" name="Content Placeholder 3" descr="usageNonVirtual.png"/>
+          <p:cNvPr id="4" name="Content Placeholder 3" descr="usageVirtual.png"/>
           <p:cNvPicPr>
             <a:picLocks noGrp="1" noChangeAspect="1"/>
           </p:cNvPicPr>
@@ -8006,7 +7922,7 @@
               </a:ext>
             </a:extLst>
           </a:blip>
-          <a:srcRect l="-4587" r="-4587"/>
+          <a:srcRect l="-4583" r="-4583"/>
           <a:stretch>
             <a:fillRect/>
           </a:stretch>
@@ -8064,7 +7980,7 @@
     </p:spTree>
     <p:extLst>
       <p:ext uri="{BB962C8B-B14F-4D97-AF65-F5344CB8AC3E}">
-        <p14:creationId xmlns:p14="http://schemas.microsoft.com/office/powerpoint/2010/main" val="3672559181"/>
+        <p14:creationId xmlns:p14="http://schemas.microsoft.com/office/powerpoint/2010/main" val="2963176606"/>
       </p:ext>
     </p:extLst>
   </p:cSld>
@@ -8111,60 +8027,28 @@
         <p:spPr/>
         <p:txBody>
           <a:bodyPr>
-            <a:normAutofit fontScale="90000"/>
+            <a:normAutofit/>
           </a:bodyPr>
           <a:lstStyle/>
           <a:p>
             <a:r>
-              <a:rPr lang="en-US" sz="3600" dirty="0"/>
-              <a:t>Over-decomposition: 1024 objects on 64 processors</a:t>
-            </a:r>
-            <a:br>
-              <a:rPr lang="en-US" sz="3600" dirty="0"/>
-            </a:br>
-            <a:r>
-              <a:rPr lang="en-US" sz="2200" dirty="0"/>
-              <a:t>Benefits from communication/computation overlap</a:t>
-            </a:r>
-          </a:p>
-        </p:txBody>
-      </p:sp>
-      <p:pic>
-        <p:nvPicPr>
-          <p:cNvPr id="4" name="Content Placeholder 3" descr="usageVirtual.png"/>
-          <p:cNvPicPr>
-            <a:picLocks noGrp="1" noChangeAspect="1"/>
-          </p:cNvPicPr>
-          <p:nvPr>
-            <p:ph idx="1"/>
-          </p:nvPr>
-        </p:nvPicPr>
-        <p:blipFill>
-          <a:blip r:embed="rId2">
-            <a:extLst>
-              <a:ext uri="{28A0092B-C50C-407E-A947-70E740481C1C}">
-                <a14:useLocalDpi xmlns:a14="http://schemas.microsoft.com/office/drawing/2010/main" val="0"/>
-              </a:ext>
-            </a:extLst>
-          </a:blip>
-          <a:srcRect l="-4583" r="-4583"/>
-          <a:stretch>
-            <a:fillRect/>
-          </a:stretch>
-        </p:blipFill>
+              <a:rPr lang="en-US" sz="3200" dirty="0"/>
+              <a:t>With Load Balancing: 1024 objects on 64 processors</a:t>
+            </a:r>
+          </a:p>
+        </p:txBody>
+      </p:sp>
+      <p:sp>
+        <p:nvSpPr>
+          <p:cNvPr id="9" name="Footer Placeholder 8"/>
+          <p:cNvSpPr>
+            <a:spLocks noGrp="1"/>
+          </p:cNvSpPr>
+          <p:nvPr>
+            <p:ph type="ftr" sz="quarter" idx="11"/>
+          </p:nvPr>
+        </p:nvSpPr>
         <p:spPr/>
-      </p:pic>
-      <p:sp>
-        <p:nvSpPr>
-          <p:cNvPr id="6" name="Footer Placeholder 5"/>
-          <p:cNvSpPr>
-            <a:spLocks noGrp="1"/>
-          </p:cNvSpPr>
-          <p:nvPr>
-            <p:ph type="ftr" sz="quarter" idx="11"/>
-          </p:nvPr>
-        </p:nvSpPr>
-        <p:spPr/>
         <p:txBody>
           <a:bodyPr/>
           <a:lstStyle/>
@@ -8180,7 +8064,7 @@
       </p:sp>
       <p:sp>
         <p:nvSpPr>
-          <p:cNvPr id="7" name="Slide Number Placeholder 6"/>
+          <p:cNvPr id="10" name="Slide Number Placeholder 9"/>
           <p:cNvSpPr>
             <a:spLocks noGrp="1"/>
           </p:cNvSpPr>
@@ -8197,115 +8081,6 @@
               <a:rPr lang="en-US" smtClean="0"/>
               <a:pPr/>
               <a:t>15</a:t>
-            </a:fld>
-            <a:endParaRPr lang="en-US"/>
-          </a:p>
-        </p:txBody>
-      </p:sp>
-    </p:spTree>
-    <p:extLst>
-      <p:ext uri="{BB962C8B-B14F-4D97-AF65-F5344CB8AC3E}">
-        <p14:creationId xmlns:p14="http://schemas.microsoft.com/office/powerpoint/2010/main" val="2963176606"/>
-      </p:ext>
-    </p:extLst>
-  </p:cSld>
-  <p:clrMapOvr>
-    <a:masterClrMapping/>
-  </p:clrMapOvr>
-  <p:timing>
-    <p:tnLst>
-      <p:par>
-        <p:cTn xmlns:p14="http://schemas.microsoft.com/office/powerpoint/2010/main" id="1" dur="indefinite" restart="never" nodeType="tmRoot"/>
-      </p:par>
-    </p:tnLst>
-  </p:timing>
-</p:sld>
-</file>
-
-<file path=ppt/slides/slide16.xml><?xml version="1.0" encoding="utf-8"?>
-<p:sld xmlns:a="http://schemas.openxmlformats.org/drawingml/2006/main" xmlns:r="http://schemas.openxmlformats.org/officeDocument/2006/relationships" xmlns:p="http://schemas.openxmlformats.org/presentationml/2006/main">
-  <p:cSld>
-    <p:spTree>
-      <p:nvGrpSpPr>
-        <p:cNvPr id="1" name=""/>
-        <p:cNvGrpSpPr/>
-        <p:nvPr/>
-      </p:nvGrpSpPr>
-      <p:grpSpPr>
-        <a:xfrm>
-          <a:off x="0" y="0"/>
-          <a:ext cx="0" cy="0"/>
-          <a:chOff x="0" y="0"/>
-          <a:chExt cx="0" cy="0"/>
-        </a:xfrm>
-      </p:grpSpPr>
-      <p:sp>
-        <p:nvSpPr>
-          <p:cNvPr id="2" name="Title 1"/>
-          <p:cNvSpPr>
-            <a:spLocks noGrp="1"/>
-          </p:cNvSpPr>
-          <p:nvPr>
-            <p:ph type="title"/>
-          </p:nvPr>
-        </p:nvSpPr>
-        <p:spPr/>
-        <p:txBody>
-          <a:bodyPr>
-            <a:normAutofit/>
-          </a:bodyPr>
-          <a:lstStyle/>
-          <a:p>
-            <a:r>
-              <a:rPr lang="en-US" sz="3200" dirty="0"/>
-              <a:t>With Load Balancing: 1024 objects on 64 processors</a:t>
-            </a:r>
-          </a:p>
-        </p:txBody>
-      </p:sp>
-      <p:sp>
-        <p:nvSpPr>
-          <p:cNvPr id="9" name="Footer Placeholder 8"/>
-          <p:cNvSpPr>
-            <a:spLocks noGrp="1"/>
-          </p:cNvSpPr>
-          <p:nvPr>
-            <p:ph type="ftr" sz="quarter" idx="11"/>
-          </p:nvPr>
-        </p:nvSpPr>
-        <p:spPr/>
-        <p:txBody>
-          <a:bodyPr/>
-          <a:lstStyle/>
-          <a:p>
-            <a:pPr algn="r"/>
-            <a:r>
-              <a:rPr lang="en-US" smtClean="0"/>
-              <a:t>Laxmikant Kalé and PPL (UIUC) – Parallel Migratable Objects </a:t>
-            </a:r>
-            <a:endParaRPr lang="en-US" dirty="0"/>
-          </a:p>
-        </p:txBody>
-      </p:sp>
-      <p:sp>
-        <p:nvSpPr>
-          <p:cNvPr id="10" name="Slide Number Placeholder 9"/>
-          <p:cNvSpPr>
-            <a:spLocks noGrp="1"/>
-          </p:cNvSpPr>
-          <p:nvPr>
-            <p:ph type="sldNum" sz="quarter" idx="12"/>
-          </p:nvPr>
-        </p:nvSpPr>
-        <p:spPr/>
-        <p:txBody>
-          <a:bodyPr/>
-          <a:lstStyle/>
-          <a:p>
-            <a:fld id="{0CFEC368-1D7A-4F81-ABF6-AE0E36BAF64C}" type="slidenum">
-              <a:rPr lang="en-US" smtClean="0"/>
-              <a:pPr/>
-              <a:t>16</a:t>
             </a:fld>
             <a:endParaRPr lang="en-US" dirty="0"/>
           </a:p>
@@ -8422,7 +8197,7 @@
 </p:sld>
 </file>
 
-<file path=ppt/slides/slide17.xml><?xml version="1.0" encoding="utf-8"?>
+<file path=ppt/slides/slide16.xml><?xml version="1.0" encoding="utf-8"?>
 <p:sld xmlns:a="http://schemas.openxmlformats.org/drawingml/2006/main" xmlns:r="http://schemas.openxmlformats.org/officeDocument/2006/relationships" xmlns:p="http://schemas.openxmlformats.org/presentationml/2006/main">
   <p:cSld>
     <p:spTree>
@@ -8506,7 +8281,7 @@
             <a:fld id="{0CFEC368-1D7A-4F81-ABF6-AE0E36BAF64C}" type="slidenum">
               <a:rPr lang="en-US" smtClean="0"/>
               <a:pPr/>
-              <a:t>17</a:t>
+              <a:t>16</a:t>
             </a:fld>
             <a:endParaRPr lang="en-US" dirty="0"/>
           </a:p>
@@ -10491,7 +10266,7 @@
           <a:p>
             <a:r>
               <a:rPr lang="en-US" dirty="0" smtClean="0"/>
-              <a:t>Impact on communication</a:t>
+              <a:t>Example Stencil Computation</a:t>
             </a:r>
             <a:endParaRPr lang="en-US" dirty="0"/>
           </a:p>
@@ -10509,25 +10284,17 @@
         </p:nvSpPr>
         <p:spPr/>
         <p:txBody>
-          <a:bodyPr/>
-          <a:lstStyle/>
-          <a:p>
+          <a:bodyPr anchor="t"/>
+          <a:lstStyle/>
+          <a:p>
+            <a:r>
+              <a:rPr lang="en-US" dirty="0" smtClean="0"/>
+              <a:t>Current </a:t>
+            </a:r>
             <a:r>
               <a:rPr lang="en-US" dirty="0"/>
-              <a:t>Current use of communication network</a:t>
-            </a:r>
-          </a:p>
-          <a:p>
-            <a:pPr lvl="1"/>
-            <a:r>
-              <a:rPr lang="en-US" dirty="0" smtClean="0"/>
-              <a:t>Compute</a:t>
-            </a:r>
-            <a:r>
-              <a:rPr lang="en-US" dirty="0"/>
-              <a:t>-communicate cycles in typical MPI apps </a:t>
-            </a:r>
-            <a:endParaRPr lang="en-US" dirty="0" smtClean="0"/>
+              <a:t>use of communication network</a:t>
+            </a:r>
           </a:p>
           <a:p>
             <a:pPr lvl="1"/>
@@ -10543,52 +10310,59 @@
           <a:p>
             <a:pPr lvl="1"/>
             <a:r>
+              <a:rPr lang="en-US" dirty="0"/>
+              <a:t>And is on the critical path</a:t>
+            </a:r>
+          </a:p>
+          <a:p>
+            <a:r>
               <a:rPr lang="en-US" dirty="0" smtClean="0"/>
-              <a:t>And </a:t>
+              <a:t>Hence, current </a:t>
             </a:r>
             <a:r>
               <a:rPr lang="en-US" dirty="0"/>
-              <a:t>is on the critical path</a:t>
-            </a:r>
-          </a:p>
-          <a:p>
+              <a:t>communication networks are over-engineered by necessity</a:t>
+            </a:r>
+          </a:p>
+          <a:p>
+            <a:endParaRPr lang="en-US" dirty="0" smtClean="0"/>
+          </a:p>
+          <a:p>
+            <a:endParaRPr lang="en-US" dirty="0"/>
+          </a:p>
+          <a:p>
+            <a:endParaRPr lang="en-US" dirty="0" smtClean="0"/>
+          </a:p>
+          <a:p>
+            <a:r>
+              <a:rPr lang="en-US" dirty="0" smtClean="0"/>
+              <a:t>Consider </a:t>
+            </a:r>
             <a:r>
               <a:rPr lang="en-US" dirty="0"/>
-              <a:t>Hence, current communication networks are over-engineered by necessity</a:t>
-            </a:r>
-          </a:p>
-          <a:p>
+              <a:t>a simple stencil computation (i.e. MPI-based)</a:t>
+            </a:r>
+          </a:p>
+          <a:p>
+            <a:pPr lvl="1"/>
             <a:r>
               <a:rPr lang="en-US" dirty="0"/>
-              <a:t>With </a:t>
-            </a:r>
-            <a:r>
-              <a:rPr lang="en-US" dirty="0" err="1"/>
-              <a:t>overdecomposition</a:t>
+              <a:t>Each processor has a chunk, which alternates between computing and communicating</a:t>
+            </a:r>
+          </a:p>
+          <a:p>
+            <a:pPr marL="0" indent="0" algn="ctr">
+              <a:buNone/>
+            </a:pPr>
+            <a:r>
+              <a:rPr lang="en-US" dirty="0"/>
+              <a:t>Stencil in MPI: No overlap among computation and </a:t>
+            </a:r>
+            <a:r>
+              <a:rPr lang="en-US" dirty="0" smtClean="0"/>
+              <a:t>communication</a:t>
             </a:r>
             <a:endParaRPr lang="en-US" dirty="0"/>
-          </a:p>
-          <a:p>
-            <a:pPr lvl="1"/>
-            <a:r>
-              <a:rPr lang="en-US" dirty="0" smtClean="0"/>
-              <a:t>Communication </a:t>
-            </a:r>
-            <a:r>
-              <a:rPr lang="en-US" dirty="0"/>
-              <a:t>is spread over an iteration</a:t>
-            </a:r>
-          </a:p>
-          <a:p>
-            <a:pPr lvl="1"/>
-            <a:r>
-              <a:rPr lang="en-US" dirty="0" smtClean="0"/>
-              <a:t>Adaptive </a:t>
-            </a:r>
-            <a:r>
-              <a:rPr lang="en-US" dirty="0"/>
-              <a:t>overlap of communication and computation</a:t>
-            </a:r>
           </a:p>
         </p:txBody>
       </p:sp>
@@ -10635,357 +10409,6 @@
               <a:rPr lang="en-US" smtClean="0"/>
               <a:pPr/>
               <a:t>2</a:t>
-            </a:fld>
-            <a:endParaRPr lang="en-US"/>
-          </a:p>
-        </p:txBody>
-      </p:sp>
-    </p:spTree>
-    <p:extLst>
-      <p:ext uri="{BB962C8B-B14F-4D97-AF65-F5344CB8AC3E}">
-        <p14:creationId xmlns:p14="http://schemas.microsoft.com/office/powerpoint/2010/main" val="3300344165"/>
-      </p:ext>
-    </p:extLst>
-  </p:cSld>
-  <p:clrMapOvr>
-    <a:masterClrMapping/>
-  </p:clrMapOvr>
-  <p:timing>
-    <p:tnLst>
-      <p:par>
-        <p:cTn xmlns:p14="http://schemas.microsoft.com/office/powerpoint/2010/main" id="1" dur="indefinite" restart="never" nodeType="tmRoot">
-          <p:childTnLst>
-            <p:seq concurrent="1" nextAc="seek">
-              <p:cTn id="2" dur="indefinite" nodeType="mainSeq">
-                <p:childTnLst>
-                  <p:par>
-                    <p:cTn id="3" fill="hold">
-                      <p:stCondLst>
-                        <p:cond delay="indefinite"/>
-                      </p:stCondLst>
-                      <p:childTnLst>
-                        <p:par>
-                          <p:cTn id="4" fill="hold">
-                            <p:stCondLst>
-                              <p:cond delay="0"/>
-                            </p:stCondLst>
-                            <p:childTnLst>
-                              <p:par>
-                                <p:cTn id="5" presetID="1" presetClass="entr" presetSubtype="0" fill="hold" nodeType="clickEffect">
-                                  <p:stCondLst>
-                                    <p:cond delay="0"/>
-                                  </p:stCondLst>
-                                  <p:childTnLst>
-                                    <p:set>
-                                      <p:cBhvr>
-                                        <p:cTn id="6" dur="1" fill="hold">
-                                          <p:stCondLst>
-                                            <p:cond delay="0"/>
-                                          </p:stCondLst>
-                                        </p:cTn>
-                                        <p:tgtEl>
-                                          <p:spTgt spid="3">
-                                            <p:txEl>
-                                              <p:pRg st="4" end="4"/>
-                                            </p:txEl>
-                                          </p:spTgt>
-                                        </p:tgtEl>
-                                        <p:attrNameLst>
-                                          <p:attrName>style.visibility</p:attrName>
-                                        </p:attrNameLst>
-                                      </p:cBhvr>
-                                      <p:to>
-                                        <p:strVal val="visible"/>
-                                      </p:to>
-                                    </p:set>
-                                  </p:childTnLst>
-                                </p:cTn>
-                              </p:par>
-                            </p:childTnLst>
-                          </p:cTn>
-                        </p:par>
-                      </p:childTnLst>
-                    </p:cTn>
-                  </p:par>
-                  <p:par>
-                    <p:cTn id="7" fill="hold">
-                      <p:stCondLst>
-                        <p:cond delay="indefinite"/>
-                      </p:stCondLst>
-                      <p:childTnLst>
-                        <p:par>
-                          <p:cTn id="8" fill="hold">
-                            <p:stCondLst>
-                              <p:cond delay="0"/>
-                            </p:stCondLst>
-                            <p:childTnLst>
-                              <p:par>
-                                <p:cTn id="9" presetID="1" presetClass="entr" presetSubtype="0" fill="hold" nodeType="clickEffect">
-                                  <p:stCondLst>
-                                    <p:cond delay="0"/>
-                                  </p:stCondLst>
-                                  <p:childTnLst>
-                                    <p:set>
-                                      <p:cBhvr>
-                                        <p:cTn id="10" dur="1" fill="hold">
-                                          <p:stCondLst>
-                                            <p:cond delay="0"/>
-                                          </p:stCondLst>
-                                        </p:cTn>
-                                        <p:tgtEl>
-                                          <p:spTgt spid="3">
-                                            <p:txEl>
-                                              <p:pRg st="5" end="5"/>
-                                            </p:txEl>
-                                          </p:spTgt>
-                                        </p:tgtEl>
-                                        <p:attrNameLst>
-                                          <p:attrName>style.visibility</p:attrName>
-                                        </p:attrNameLst>
-                                      </p:cBhvr>
-                                      <p:to>
-                                        <p:strVal val="visible"/>
-                                      </p:to>
-                                    </p:set>
-                                  </p:childTnLst>
-                                </p:cTn>
-                              </p:par>
-                              <p:par>
-                                <p:cTn id="11" presetID="1" presetClass="entr" presetSubtype="0" fill="hold" nodeType="withEffect">
-                                  <p:stCondLst>
-                                    <p:cond delay="0"/>
-                                  </p:stCondLst>
-                                  <p:childTnLst>
-                                    <p:set>
-                                      <p:cBhvr>
-                                        <p:cTn id="12" dur="1" fill="hold">
-                                          <p:stCondLst>
-                                            <p:cond delay="0"/>
-                                          </p:stCondLst>
-                                        </p:cTn>
-                                        <p:tgtEl>
-                                          <p:spTgt spid="3">
-                                            <p:txEl>
-                                              <p:pRg st="6" end="6"/>
-                                            </p:txEl>
-                                          </p:spTgt>
-                                        </p:tgtEl>
-                                        <p:attrNameLst>
-                                          <p:attrName>style.visibility</p:attrName>
-                                        </p:attrNameLst>
-                                      </p:cBhvr>
-                                      <p:to>
-                                        <p:strVal val="visible"/>
-                                      </p:to>
-                                    </p:set>
-                                  </p:childTnLst>
-                                </p:cTn>
-                              </p:par>
-                              <p:par>
-                                <p:cTn id="13" presetID="1" presetClass="entr" presetSubtype="0" fill="hold" nodeType="withEffect">
-                                  <p:stCondLst>
-                                    <p:cond delay="0"/>
-                                  </p:stCondLst>
-                                  <p:childTnLst>
-                                    <p:set>
-                                      <p:cBhvr>
-                                        <p:cTn id="14" dur="1" fill="hold">
-                                          <p:stCondLst>
-                                            <p:cond delay="0"/>
-                                          </p:stCondLst>
-                                        </p:cTn>
-                                        <p:tgtEl>
-                                          <p:spTgt spid="3">
-                                            <p:txEl>
-                                              <p:pRg st="7" end="7"/>
-                                            </p:txEl>
-                                          </p:spTgt>
-                                        </p:tgtEl>
-                                        <p:attrNameLst>
-                                          <p:attrName>style.visibility</p:attrName>
-                                        </p:attrNameLst>
-                                      </p:cBhvr>
-                                      <p:to>
-                                        <p:strVal val="visible"/>
-                                      </p:to>
-                                    </p:set>
-                                  </p:childTnLst>
-                                </p:cTn>
-                              </p:par>
-                            </p:childTnLst>
-                          </p:cTn>
-                        </p:par>
-                      </p:childTnLst>
-                    </p:cTn>
-                  </p:par>
-                </p:childTnLst>
-              </p:cTn>
-              <p:prevCondLst>
-                <p:cond evt="onPrev" delay="0">
-                  <p:tgtEl>
-                    <p:sldTgt/>
-                  </p:tgtEl>
-                </p:cond>
-              </p:prevCondLst>
-              <p:nextCondLst>
-                <p:cond evt="onNext" delay="0">
-                  <p:tgtEl>
-                    <p:sldTgt/>
-                  </p:tgtEl>
-                </p:cond>
-              </p:nextCondLst>
-            </p:seq>
-          </p:childTnLst>
-        </p:cTn>
-      </p:par>
-    </p:tnLst>
-  </p:timing>
-</p:sld>
-</file>
-
-<file path=ppt/slides/slide3.xml><?xml version="1.0" encoding="utf-8"?>
-<p:sld xmlns:a="http://schemas.openxmlformats.org/drawingml/2006/main" xmlns:r="http://schemas.openxmlformats.org/officeDocument/2006/relationships" xmlns:p="http://schemas.openxmlformats.org/presentationml/2006/main">
-  <p:cSld>
-    <p:spTree>
-      <p:nvGrpSpPr>
-        <p:cNvPr id="1" name=""/>
-        <p:cNvGrpSpPr/>
-        <p:nvPr/>
-      </p:nvGrpSpPr>
-      <p:grpSpPr>
-        <a:xfrm>
-          <a:off x="0" y="0"/>
-          <a:ext cx="0" cy="0"/>
-          <a:chOff x="0" y="0"/>
-          <a:chExt cx="0" cy="0"/>
-        </a:xfrm>
-      </p:grpSpPr>
-      <p:sp>
-        <p:nvSpPr>
-          <p:cNvPr id="2" name="Title 1"/>
-          <p:cNvSpPr>
-            <a:spLocks noGrp="1"/>
-          </p:cNvSpPr>
-          <p:nvPr>
-            <p:ph type="title"/>
-          </p:nvPr>
-        </p:nvSpPr>
-        <p:spPr/>
-        <p:txBody>
-          <a:bodyPr>
-            <a:normAutofit/>
-          </a:bodyPr>
-          <a:lstStyle/>
-          <a:p>
-            <a:r>
-              <a:rPr lang="en-US" dirty="0" smtClean="0"/>
-              <a:t>Example Stencil Computation</a:t>
-            </a:r>
-            <a:endParaRPr lang="en-US" dirty="0"/>
-          </a:p>
-        </p:txBody>
-      </p:sp>
-      <p:sp>
-        <p:nvSpPr>
-          <p:cNvPr id="3" name="Content Placeholder 2"/>
-          <p:cNvSpPr>
-            <a:spLocks noGrp="1"/>
-          </p:cNvSpPr>
-          <p:nvPr>
-            <p:ph idx="1"/>
-          </p:nvPr>
-        </p:nvSpPr>
-        <p:spPr>
-          <a:xfrm>
-            <a:off x="261865" y="942770"/>
-            <a:ext cx="8615360" cy="2536276"/>
-          </a:xfrm>
-        </p:spPr>
-        <p:txBody>
-          <a:bodyPr/>
-          <a:lstStyle/>
-          <a:p>
-            <a:r>
-              <a:rPr lang="en-US" dirty="0"/>
-              <a:t>Consider a simple stencil computation</a:t>
-            </a:r>
-          </a:p>
-          <a:p>
-            <a:pPr lvl="1"/>
-            <a:r>
-              <a:rPr lang="en-US" dirty="0" smtClean="0"/>
-              <a:t>With </a:t>
-            </a:r>
-            <a:r>
-              <a:rPr lang="en-US" dirty="0"/>
-              <a:t>traditional design based on traditional methods (e.g. MPI-based</a:t>
-            </a:r>
-            <a:r>
-              <a:rPr lang="en-US" dirty="0" smtClean="0"/>
-              <a:t>)</a:t>
-            </a:r>
-          </a:p>
-          <a:p>
-            <a:pPr lvl="2"/>
-            <a:r>
-              <a:rPr lang="en-US" dirty="0" smtClean="0"/>
-              <a:t>Each </a:t>
-            </a:r>
-            <a:r>
-              <a:rPr lang="en-US" dirty="0"/>
-              <a:t>processor has a chunk, which alternates between computing </a:t>
-            </a:r>
-            <a:r>
-              <a:rPr lang="en-US" dirty="0" smtClean="0"/>
-              <a:t>and communicating</a:t>
-            </a:r>
-            <a:endParaRPr lang="en-US" dirty="0"/>
-          </a:p>
-        </p:txBody>
-      </p:sp>
-      <p:sp>
-        <p:nvSpPr>
-          <p:cNvPr id="5" name="Footer Placeholder 4"/>
-          <p:cNvSpPr>
-            <a:spLocks noGrp="1"/>
-          </p:cNvSpPr>
-          <p:nvPr>
-            <p:ph type="ftr" sz="quarter" idx="11"/>
-          </p:nvPr>
-        </p:nvSpPr>
-        <p:spPr/>
-        <p:txBody>
-          <a:bodyPr/>
-          <a:lstStyle/>
-          <a:p>
-            <a:pPr algn="r"/>
-            <a:r>
-              <a:rPr lang="en-US" smtClean="0"/>
-              <a:t>Laxmikant Kalé and PPL (UIUC) – Parallel Migratable Objects </a:t>
-            </a:r>
-            <a:endParaRPr lang="en-US" dirty="0"/>
-          </a:p>
-        </p:txBody>
-      </p:sp>
-      <p:sp>
-        <p:nvSpPr>
-          <p:cNvPr id="6" name="Slide Number Placeholder 5"/>
-          <p:cNvSpPr>
-            <a:spLocks noGrp="1"/>
-          </p:cNvSpPr>
-          <p:nvPr>
-            <p:ph type="sldNum" sz="quarter" idx="12"/>
-          </p:nvPr>
-        </p:nvSpPr>
-        <p:spPr/>
-        <p:txBody>
-          <a:bodyPr/>
-          <a:lstStyle/>
-          <a:p>
-            <a:fld id="{0CFEC368-1D7A-4F81-ABF6-AE0E36BAF64C}" type="slidenum">
-              <a:rPr lang="en-US" smtClean="0"/>
-              <a:pPr/>
-              <a:t>3</a:t>
             </a:fld>
             <a:endParaRPr lang="en-US"/>
           </a:p>
@@ -11008,7 +10431,7 @@
         </p:blipFill>
         <p:spPr>
           <a:xfrm>
-            <a:off x="635939" y="3365169"/>
+            <a:off x="635939" y="2713998"/>
             <a:ext cx="7861011" cy="1894897"/>
           </a:xfrm>
           <a:prstGeom prst="rect">
@@ -11208,10 +10631,6 @@
               <a:buFont typeface="Arial" pitchFamily="34" charset="0"/>
               <a:buNone/>
             </a:pPr>
-            <a:r>
-              <a:rPr lang="en-US" smtClean="0"/>
-              <a:t>Stencil in MPI: No overlap among computation and communication</a:t>
-            </a:r>
             <a:endParaRPr lang="en-US" dirty="0"/>
           </a:p>
         </p:txBody>
@@ -11219,13 +10638,521 @@
     </p:spTree>
     <p:extLst>
       <p:ext uri="{BB962C8B-B14F-4D97-AF65-F5344CB8AC3E}">
-        <p14:creationId xmlns:p14="http://schemas.microsoft.com/office/powerpoint/2010/main" val="3184719720"/>
+        <p14:creationId xmlns:p14="http://schemas.microsoft.com/office/powerpoint/2010/main" val="3742739542"/>
       </p:ext>
     </p:extLst>
   </p:cSld>
   <p:clrMapOvr>
     <a:masterClrMapping/>
   </p:clrMapOvr>
+  <p:timing>
+    <p:tnLst>
+      <p:par>
+        <p:cTn xmlns:p14="http://schemas.microsoft.com/office/powerpoint/2010/main" id="1" dur="indefinite" restart="never" nodeType="tmRoot">
+          <p:childTnLst>
+            <p:seq concurrent="1" nextAc="seek">
+              <p:cTn id="2" dur="indefinite" nodeType="mainSeq">
+                <p:childTnLst>
+                  <p:par>
+                    <p:cTn id="3" fill="hold">
+                      <p:stCondLst>
+                        <p:cond delay="indefinite"/>
+                      </p:stCondLst>
+                      <p:childTnLst>
+                        <p:par>
+                          <p:cTn id="4" fill="hold">
+                            <p:stCondLst>
+                              <p:cond delay="0"/>
+                            </p:stCondLst>
+                            <p:childTnLst>
+                              <p:par>
+                                <p:cTn id="5" presetID="1" presetClass="entr" presetSubtype="0" fill="hold" grpId="0" nodeType="clickEffect">
+                                  <p:stCondLst>
+                                    <p:cond delay="0"/>
+                                  </p:stCondLst>
+                                  <p:childTnLst>
+                                    <p:set>
+                                      <p:cBhvr>
+                                        <p:cTn id="6" dur="1" fill="hold">
+                                          <p:stCondLst>
+                                            <p:cond delay="0"/>
+                                          </p:stCondLst>
+                                        </p:cTn>
+                                        <p:tgtEl>
+                                          <p:spTgt spid="3">
+                                            <p:txEl>
+                                              <p:pRg st="3" end="3"/>
+                                            </p:txEl>
+                                          </p:spTgt>
+                                        </p:tgtEl>
+                                        <p:attrNameLst>
+                                          <p:attrName>style.visibility</p:attrName>
+                                        </p:attrNameLst>
+                                      </p:cBhvr>
+                                      <p:to>
+                                        <p:strVal val="visible"/>
+                                      </p:to>
+                                    </p:set>
+                                  </p:childTnLst>
+                                </p:cTn>
+                              </p:par>
+                            </p:childTnLst>
+                          </p:cTn>
+                        </p:par>
+                      </p:childTnLst>
+                    </p:cTn>
+                  </p:par>
+                  <p:par>
+                    <p:cTn id="7" fill="hold">
+                      <p:stCondLst>
+                        <p:cond delay="indefinite"/>
+                      </p:stCondLst>
+                      <p:childTnLst>
+                        <p:par>
+                          <p:cTn id="8" fill="hold">
+                            <p:stCondLst>
+                              <p:cond delay="0"/>
+                            </p:stCondLst>
+                            <p:childTnLst>
+                              <p:par>
+                                <p:cTn id="9" presetID="1" presetClass="entr" presetSubtype="0" fill="hold" grpId="0" nodeType="clickEffect">
+                                  <p:stCondLst>
+                                    <p:cond delay="0"/>
+                                  </p:stCondLst>
+                                  <p:childTnLst>
+                                    <p:set>
+                                      <p:cBhvr>
+                                        <p:cTn id="10" dur="1" fill="hold">
+                                          <p:stCondLst>
+                                            <p:cond delay="0"/>
+                                          </p:stCondLst>
+                                        </p:cTn>
+                                        <p:tgtEl>
+                                          <p:spTgt spid="3">
+                                            <p:txEl>
+                                              <p:pRg st="7" end="7"/>
+                                            </p:txEl>
+                                          </p:spTgt>
+                                        </p:tgtEl>
+                                        <p:attrNameLst>
+                                          <p:attrName>style.visibility</p:attrName>
+                                        </p:attrNameLst>
+                                      </p:cBhvr>
+                                      <p:to>
+                                        <p:strVal val="visible"/>
+                                      </p:to>
+                                    </p:set>
+                                  </p:childTnLst>
+                                </p:cTn>
+                              </p:par>
+                              <p:par>
+                                <p:cTn id="11" presetID="1" presetClass="entr" presetSubtype="0" fill="hold" grpId="0" nodeType="withEffect">
+                                  <p:stCondLst>
+                                    <p:cond delay="0"/>
+                                  </p:stCondLst>
+                                  <p:childTnLst>
+                                    <p:set>
+                                      <p:cBhvr>
+                                        <p:cTn id="12" dur="1" fill="hold">
+                                          <p:stCondLst>
+                                            <p:cond delay="0"/>
+                                          </p:stCondLst>
+                                        </p:cTn>
+                                        <p:tgtEl>
+                                          <p:spTgt spid="3">
+                                            <p:txEl>
+                                              <p:pRg st="8" end="8"/>
+                                            </p:txEl>
+                                          </p:spTgt>
+                                        </p:tgtEl>
+                                        <p:attrNameLst>
+                                          <p:attrName>style.visibility</p:attrName>
+                                        </p:attrNameLst>
+                                      </p:cBhvr>
+                                      <p:to>
+                                        <p:strVal val="visible"/>
+                                      </p:to>
+                                    </p:set>
+                                  </p:childTnLst>
+                                </p:cTn>
+                              </p:par>
+                              <p:par>
+                                <p:cTn id="13" presetID="1" presetClass="entr" presetSubtype="0" fill="hold" nodeType="withEffect">
+                                  <p:stCondLst>
+                                    <p:cond delay="0"/>
+                                  </p:stCondLst>
+                                  <p:childTnLst>
+                                    <p:set>
+                                      <p:cBhvr>
+                                        <p:cTn id="14" dur="1" fill="hold">
+                                          <p:stCondLst>
+                                            <p:cond delay="0"/>
+                                          </p:stCondLst>
+                                        </p:cTn>
+                                        <p:tgtEl>
+                                          <p:spTgt spid="7"/>
+                                        </p:tgtEl>
+                                        <p:attrNameLst>
+                                          <p:attrName>style.visibility</p:attrName>
+                                        </p:attrNameLst>
+                                      </p:cBhvr>
+                                      <p:to>
+                                        <p:strVal val="visible"/>
+                                      </p:to>
+                                    </p:set>
+                                  </p:childTnLst>
+                                </p:cTn>
+                              </p:par>
+                            </p:childTnLst>
+                          </p:cTn>
+                        </p:par>
+                      </p:childTnLst>
+                    </p:cTn>
+                  </p:par>
+                  <p:par>
+                    <p:cTn id="15" fill="hold">
+                      <p:stCondLst>
+                        <p:cond delay="indefinite"/>
+                      </p:stCondLst>
+                      <p:childTnLst>
+                        <p:par>
+                          <p:cTn id="16" fill="hold">
+                            <p:stCondLst>
+                              <p:cond delay="0"/>
+                            </p:stCondLst>
+                            <p:childTnLst>
+                              <p:par>
+                                <p:cTn id="17" presetID="1" presetClass="entr" presetSubtype="0" fill="hold" grpId="0" nodeType="clickEffect">
+                                  <p:stCondLst>
+                                    <p:cond delay="0"/>
+                                  </p:stCondLst>
+                                  <p:childTnLst>
+                                    <p:set>
+                                      <p:cBhvr>
+                                        <p:cTn id="18" dur="1" fill="hold">
+                                          <p:stCondLst>
+                                            <p:cond delay="0"/>
+                                          </p:stCondLst>
+                                        </p:cTn>
+                                        <p:tgtEl>
+                                          <p:spTgt spid="3">
+                                            <p:txEl>
+                                              <p:pRg st="9" end="9"/>
+                                            </p:txEl>
+                                          </p:spTgt>
+                                        </p:tgtEl>
+                                        <p:attrNameLst>
+                                          <p:attrName>style.visibility</p:attrName>
+                                        </p:attrNameLst>
+                                      </p:cBhvr>
+                                      <p:to>
+                                        <p:strVal val="visible"/>
+                                      </p:to>
+                                    </p:set>
+                                  </p:childTnLst>
+                                </p:cTn>
+                              </p:par>
+                            </p:childTnLst>
+                          </p:cTn>
+                        </p:par>
+                      </p:childTnLst>
+                    </p:cTn>
+                  </p:par>
+                </p:childTnLst>
+              </p:cTn>
+              <p:prevCondLst>
+                <p:cond evt="onPrev" delay="0">
+                  <p:tgtEl>
+                    <p:sldTgt/>
+                  </p:tgtEl>
+                </p:cond>
+              </p:prevCondLst>
+              <p:nextCondLst>
+                <p:cond evt="onNext" delay="0">
+                  <p:tgtEl>
+                    <p:sldTgt/>
+                  </p:tgtEl>
+                </p:cond>
+              </p:nextCondLst>
+            </p:seq>
+          </p:childTnLst>
+        </p:cTn>
+      </p:par>
+    </p:tnLst>
+    <p:bldLst>
+      <p:bldP spid="3" grpId="0" uiExpand="1" build="p"/>
+    </p:bldLst>
+  </p:timing>
+</p:sld>
+</file>
+
+<file path=ppt/slides/slide3.xml><?xml version="1.0" encoding="utf-8"?>
+<p:sld xmlns:a="http://schemas.openxmlformats.org/drawingml/2006/main" xmlns:r="http://schemas.openxmlformats.org/officeDocument/2006/relationships" xmlns:p="http://schemas.openxmlformats.org/presentationml/2006/main">
+  <p:cSld>
+    <p:spTree>
+      <p:nvGrpSpPr>
+        <p:cNvPr id="1" name=""/>
+        <p:cNvGrpSpPr/>
+        <p:nvPr/>
+      </p:nvGrpSpPr>
+      <p:grpSpPr>
+        <a:xfrm>
+          <a:off x="0" y="0"/>
+          <a:ext cx="0" cy="0"/>
+          <a:chOff x="0" y="0"/>
+          <a:chExt cx="0" cy="0"/>
+        </a:xfrm>
+      </p:grpSpPr>
+      <p:sp>
+        <p:nvSpPr>
+          <p:cNvPr id="2" name="Title 1"/>
+          <p:cNvSpPr>
+            <a:spLocks noGrp="1"/>
+          </p:cNvSpPr>
+          <p:nvPr>
+            <p:ph type="title"/>
+          </p:nvPr>
+        </p:nvSpPr>
+        <p:spPr/>
+        <p:txBody>
+          <a:bodyPr>
+            <a:normAutofit/>
+          </a:bodyPr>
+          <a:lstStyle/>
+          <a:p>
+            <a:r>
+              <a:rPr lang="en-US" dirty="0" smtClean="0"/>
+              <a:t>Example Stencil Computation</a:t>
+            </a:r>
+            <a:endParaRPr lang="en-US" dirty="0"/>
+          </a:p>
+        </p:txBody>
+      </p:sp>
+      <p:sp>
+        <p:nvSpPr>
+          <p:cNvPr id="3" name="Content Placeholder 2"/>
+          <p:cNvSpPr>
+            <a:spLocks noGrp="1"/>
+          </p:cNvSpPr>
+          <p:nvPr>
+            <p:ph idx="1"/>
+          </p:nvPr>
+        </p:nvSpPr>
+        <p:spPr/>
+        <p:txBody>
+          <a:bodyPr anchor="t">
+            <a:normAutofit/>
+          </a:bodyPr>
+          <a:lstStyle/>
+          <a:p>
+            <a:r>
+              <a:rPr lang="en-US" dirty="0" smtClean="0"/>
+              <a:t>With </a:t>
+            </a:r>
+            <a:r>
+              <a:rPr lang="en-US" dirty="0"/>
+              <a:t>Charm++</a:t>
+            </a:r>
+          </a:p>
+          <a:p>
+            <a:pPr lvl="1"/>
+            <a:r>
+              <a:rPr lang="en-US" dirty="0" smtClean="0"/>
+              <a:t>Multiple </a:t>
+            </a:r>
+            <a:r>
+              <a:rPr lang="en-US" dirty="0"/>
+              <a:t>chunks on each processor</a:t>
+            </a:r>
+          </a:p>
+          <a:p>
+            <a:pPr lvl="1"/>
+            <a:r>
+              <a:rPr lang="en-US" dirty="0" smtClean="0"/>
+              <a:t>Wait </a:t>
+            </a:r>
+            <a:r>
+              <a:rPr lang="en-US" dirty="0"/>
+              <a:t>time for each chunk overlapped with </a:t>
+            </a:r>
+            <a:r>
+              <a:rPr lang="en-US" dirty="0" smtClean="0"/>
+              <a:t>useful </a:t>
+            </a:r>
+            <a:r>
+              <a:rPr lang="en-US" dirty="0"/>
+              <a:t>computation for </a:t>
+            </a:r>
+            <a:r>
+              <a:rPr lang="en-US" dirty="0" smtClean="0"/>
+              <a:t>others</a:t>
+            </a:r>
+          </a:p>
+          <a:p>
+            <a:pPr lvl="2"/>
+            <a:r>
+              <a:rPr lang="en-US" dirty="0" smtClean="0"/>
+              <a:t>i.e. Adaptive overlap</a:t>
+            </a:r>
+            <a:endParaRPr lang="en-US" dirty="0" smtClean="0"/>
+          </a:p>
+          <a:p>
+            <a:pPr lvl="1"/>
+            <a:r>
+              <a:rPr lang="en-US" dirty="0" smtClean="0"/>
+              <a:t>Communication </a:t>
+            </a:r>
+            <a:r>
+              <a:rPr lang="en-US" dirty="0"/>
+              <a:t>spread over </a:t>
+            </a:r>
+            <a:r>
+              <a:rPr lang="en-US" dirty="0" smtClean="0"/>
+              <a:t>time/iteration</a:t>
+            </a:r>
+            <a:endParaRPr lang="en-US" dirty="0" smtClean="0"/>
+          </a:p>
+          <a:p>
+            <a:pPr lvl="1"/>
+            <a:endParaRPr lang="en-US" dirty="0" smtClean="0"/>
+          </a:p>
+          <a:p>
+            <a:pPr lvl="1"/>
+            <a:endParaRPr lang="en-US" dirty="0" smtClean="0"/>
+          </a:p>
+          <a:p>
+            <a:pPr lvl="1"/>
+            <a:endParaRPr lang="en-US" dirty="0" smtClean="0"/>
+          </a:p>
+          <a:p>
+            <a:pPr lvl="1"/>
+            <a:endParaRPr lang="en-US" dirty="0" smtClean="0"/>
+          </a:p>
+          <a:p>
+            <a:pPr lvl="1"/>
+            <a:endParaRPr lang="en-US" dirty="0" smtClean="0"/>
+          </a:p>
+          <a:p>
+            <a:pPr lvl="1"/>
+            <a:endParaRPr lang="en-US" dirty="0" smtClean="0"/>
+          </a:p>
+          <a:p>
+            <a:pPr marL="274320" lvl="1" indent="0" algn="ctr">
+              <a:buNone/>
+            </a:pPr>
+            <a:endParaRPr lang="en-US" dirty="0" smtClean="0"/>
+          </a:p>
+          <a:p>
+            <a:pPr marL="274320" lvl="1" indent="0" algn="ctr">
+              <a:buNone/>
+            </a:pPr>
+            <a:r>
+              <a:rPr lang="en-US" sz="2400" dirty="0" smtClean="0"/>
+              <a:t>Stencil in Charm: Communication of a </a:t>
+            </a:r>
+            <a:r>
+              <a:rPr lang="en-US" sz="2400" dirty="0" err="1" smtClean="0"/>
+              <a:t>chare</a:t>
+            </a:r>
+            <a:r>
+              <a:rPr lang="en-US" sz="2400" dirty="0" smtClean="0"/>
+              <a:t> overlaps with computation of others</a:t>
+            </a:r>
+            <a:endParaRPr lang="en-US" sz="2400" dirty="0"/>
+          </a:p>
+        </p:txBody>
+      </p:sp>
+      <p:sp>
+        <p:nvSpPr>
+          <p:cNvPr id="5" name="Footer Placeholder 4"/>
+          <p:cNvSpPr>
+            <a:spLocks noGrp="1"/>
+          </p:cNvSpPr>
+          <p:nvPr>
+            <p:ph type="ftr" sz="quarter" idx="11"/>
+          </p:nvPr>
+        </p:nvSpPr>
+        <p:spPr/>
+        <p:txBody>
+          <a:bodyPr/>
+          <a:lstStyle/>
+          <a:p>
+            <a:pPr algn="r"/>
+            <a:r>
+              <a:rPr lang="en-US" smtClean="0"/>
+              <a:t>Laxmikant Kalé and PPL (UIUC) – Parallel Migratable Objects </a:t>
+            </a:r>
+            <a:endParaRPr lang="en-US" dirty="0"/>
+          </a:p>
+        </p:txBody>
+      </p:sp>
+      <p:sp>
+        <p:nvSpPr>
+          <p:cNvPr id="6" name="Slide Number Placeholder 5"/>
+          <p:cNvSpPr>
+            <a:spLocks noGrp="1"/>
+          </p:cNvSpPr>
+          <p:nvPr>
+            <p:ph type="sldNum" sz="quarter" idx="12"/>
+          </p:nvPr>
+        </p:nvSpPr>
+        <p:spPr/>
+        <p:txBody>
+          <a:bodyPr/>
+          <a:lstStyle/>
+          <a:p>
+            <a:fld id="{0CFEC368-1D7A-4F81-ABF6-AE0E36BAF64C}" type="slidenum">
+              <a:rPr lang="en-US" smtClean="0"/>
+              <a:pPr/>
+              <a:t>3</a:t>
+            </a:fld>
+            <a:endParaRPr lang="en-US"/>
+          </a:p>
+        </p:txBody>
+      </p:sp>
+      <p:pic>
+        <p:nvPicPr>
+          <p:cNvPr id="7" name="Content Placeholder 10"/>
+          <p:cNvPicPr>
+            <a:picLocks noChangeAspect="1"/>
+          </p:cNvPicPr>
+          <p:nvPr/>
+        </p:nvPicPr>
+        <p:blipFill>
+          <a:blip r:embed="rId2"/>
+          <a:srcRect t="-6464" b="-6464"/>
+          <a:stretch>
+            <a:fillRect/>
+          </a:stretch>
+        </p:blipFill>
+        <p:spPr>
+          <a:xfrm>
+            <a:off x="242888" y="3006258"/>
+            <a:ext cx="8647112" cy="2019300"/>
+          </a:xfrm>
+          <a:prstGeom prst="rect">
+            <a:avLst/>
+          </a:prstGeom>
+        </p:spPr>
+      </p:pic>
+    </p:spTree>
+    <p:extLst>
+      <p:ext uri="{BB962C8B-B14F-4D97-AF65-F5344CB8AC3E}">
+        <p14:creationId xmlns:p14="http://schemas.microsoft.com/office/powerpoint/2010/main" val="1915091053"/>
+      </p:ext>
+    </p:extLst>
+  </p:cSld>
+  <p:clrMapOvr>
+    <a:masterClrMapping/>
+  </p:clrMapOvr>
+  <mc:AlternateContent xmlns:mc="http://schemas.openxmlformats.org/markup-compatibility/2006">
+    <mc:Choice xmlns:p14="http://schemas.microsoft.com/office/powerpoint/2010/main" Requires="p14">
+      <p:transition spd="slow" p14:dur="2000"/>
+    </mc:Choice>
+    <mc:Fallback>
+      <p:transition xmlns:p14="http://schemas.microsoft.com/office/powerpoint/2010/main" spd="slow"/>
+    </mc:Fallback>
+  </mc:AlternateContent>
   <p:timing>
     <p:tnLst>
       <p:par>
@@ -11272,77 +11199,9 @@
           <a:p>
             <a:r>
               <a:rPr lang="en-US" dirty="0" smtClean="0"/>
-              <a:t>Example Stencil Computation</a:t>
+              <a:t>Modularity and Compositionality</a:t>
             </a:r>
             <a:endParaRPr lang="en-US" dirty="0"/>
-          </a:p>
-        </p:txBody>
-      </p:sp>
-      <p:sp>
-        <p:nvSpPr>
-          <p:cNvPr id="3" name="Content Placeholder 2"/>
-          <p:cNvSpPr>
-            <a:spLocks noGrp="1"/>
-          </p:cNvSpPr>
-          <p:nvPr>
-            <p:ph idx="1"/>
-          </p:nvPr>
-        </p:nvSpPr>
-        <p:spPr>
-          <a:xfrm>
-            <a:off x="261865" y="942770"/>
-            <a:ext cx="8615360" cy="2301578"/>
-          </a:xfrm>
-        </p:spPr>
-        <p:txBody>
-          <a:bodyPr/>
-          <a:lstStyle/>
-          <a:p>
-            <a:r>
-              <a:rPr lang="en-US" dirty="0" smtClean="0"/>
-              <a:t>With </a:t>
-            </a:r>
-            <a:r>
-              <a:rPr lang="en-US" dirty="0"/>
-              <a:t>Charm++</a:t>
-            </a:r>
-          </a:p>
-          <a:p>
-            <a:pPr lvl="1"/>
-            <a:r>
-              <a:rPr lang="en-US" dirty="0" smtClean="0"/>
-              <a:t>Multiple </a:t>
-            </a:r>
-            <a:r>
-              <a:rPr lang="en-US" dirty="0"/>
-              <a:t>chunks on each processor</a:t>
-            </a:r>
-          </a:p>
-          <a:p>
-            <a:pPr lvl="1"/>
-            <a:r>
-              <a:rPr lang="en-US" dirty="0" smtClean="0"/>
-              <a:t>Wait </a:t>
-            </a:r>
-            <a:r>
-              <a:rPr lang="en-US" dirty="0"/>
-              <a:t>time for each chunk overlapped with useful computation for </a:t>
-            </a:r>
-            <a:r>
-              <a:rPr lang="en-US" dirty="0" smtClean="0"/>
-              <a:t>others</a:t>
-            </a:r>
-          </a:p>
-          <a:p>
-            <a:pPr lvl="1"/>
-            <a:r>
-              <a:rPr lang="en-US" dirty="0" smtClean="0"/>
-              <a:t>Communication </a:t>
-            </a:r>
-            <a:r>
-              <a:rPr lang="en-US" dirty="0"/>
-              <a:t>spread over time</a:t>
-            </a:r>
           </a:p>
         </p:txBody>
       </p:sp>
@@ -11389,341 +11248,6 @@
               <a:rPr lang="en-US" smtClean="0"/>
               <a:pPr/>
               <a:t>4</a:t>
-            </a:fld>
-            <a:endParaRPr lang="en-US"/>
-          </a:p>
-        </p:txBody>
-      </p:sp>
-      <p:pic>
-        <p:nvPicPr>
-          <p:cNvPr id="7" name="Content Placeholder 10"/>
-          <p:cNvPicPr>
-            <a:picLocks noChangeAspect="1"/>
-          </p:cNvPicPr>
-          <p:nvPr/>
-        </p:nvPicPr>
-        <p:blipFill>
-          <a:blip r:embed="rId2"/>
-          <a:srcRect t="-6464" b="-6464"/>
-          <a:stretch>
-            <a:fillRect/>
-          </a:stretch>
-        </p:blipFill>
-        <p:spPr>
-          <a:xfrm>
-            <a:off x="242888" y="3155002"/>
-            <a:ext cx="8647112" cy="2019300"/>
-          </a:xfrm>
-          <a:prstGeom prst="rect">
-            <a:avLst/>
-          </a:prstGeom>
-        </p:spPr>
-      </p:pic>
-      <p:sp>
-        <p:nvSpPr>
-          <p:cNvPr id="8" name="Content Placeholder 5"/>
-          <p:cNvSpPr txBox="1">
-            <a:spLocks/>
-          </p:cNvSpPr>
-          <p:nvPr/>
-        </p:nvSpPr>
-        <p:spPr>
-          <a:xfrm>
-            <a:off x="242782" y="5174191"/>
-            <a:ext cx="8646764" cy="877675"/>
-          </a:xfrm>
-          <a:prstGeom prst="rect">
-            <a:avLst/>
-          </a:prstGeom>
-        </p:spPr>
-        <p:txBody>
-          <a:bodyPr/>
-          <a:lstStyle>
-            <a:lvl1pPr marL="182880" indent="-182880" algn="l" defTabSz="914400" rtl="0" eaLnBrk="1" latinLnBrk="0" hangingPunct="1">
-              <a:spcBef>
-                <a:spcPct val="20000"/>
-              </a:spcBef>
-              <a:buClr>
-                <a:schemeClr val="accent1"/>
-              </a:buClr>
-              <a:buSzPct val="85000"/>
-              <a:buFont typeface="Arial" pitchFamily="34" charset="0"/>
-              <a:buChar char="•"/>
-              <a:defRPr sz="2400" kern="1200">
-                <a:solidFill>
-                  <a:schemeClr val="tx1"/>
-                </a:solidFill>
-                <a:latin typeface="Times New Roman"/>
-                <a:ea typeface="+mn-ea"/>
-                <a:cs typeface="Times New Roman"/>
-              </a:defRPr>
-            </a:lvl1pPr>
-            <a:lvl2pPr marL="457200" indent="-182880" algn="l" defTabSz="914400" rtl="0" eaLnBrk="1" latinLnBrk="0" hangingPunct="1">
-              <a:spcBef>
-                <a:spcPct val="20000"/>
-              </a:spcBef>
-              <a:buClr>
-                <a:schemeClr val="accent1"/>
-              </a:buClr>
-              <a:buSzPct val="85000"/>
-              <a:buFont typeface="Wingdings" charset="2"/>
-              <a:buChar char="Ø"/>
-              <a:defRPr sz="2000" kern="1200">
-                <a:solidFill>
-                  <a:schemeClr val="tx1"/>
-                </a:solidFill>
-                <a:latin typeface="Times New Roman"/>
-                <a:ea typeface="+mn-ea"/>
-                <a:cs typeface="Times New Roman"/>
-              </a:defRPr>
-            </a:lvl2pPr>
-            <a:lvl3pPr marL="731520" indent="-182880" algn="l" defTabSz="914400" rtl="0" eaLnBrk="1" latinLnBrk="0" hangingPunct="1">
-              <a:spcBef>
-                <a:spcPct val="20000"/>
-              </a:spcBef>
-              <a:buClr>
-                <a:schemeClr val="accent1"/>
-              </a:buClr>
-              <a:buSzPct val="90000"/>
-              <a:buFont typeface="Wingdings" charset="2"/>
-              <a:buChar char=""/>
-              <a:defRPr sz="1800" kern="1200">
-                <a:solidFill>
-                  <a:schemeClr val="tx1"/>
-                </a:solidFill>
-                <a:latin typeface="Times New Roman"/>
-                <a:ea typeface="+mn-ea"/>
-                <a:cs typeface="Times New Roman"/>
-              </a:defRPr>
-            </a:lvl3pPr>
-            <a:lvl4pPr marL="1005840" indent="-182880" algn="l" defTabSz="914400" rtl="0" eaLnBrk="1" latinLnBrk="0" hangingPunct="1">
-              <a:spcBef>
-                <a:spcPct val="20000"/>
-              </a:spcBef>
-              <a:buClr>
-                <a:schemeClr val="accent1"/>
-              </a:buClr>
-              <a:buFont typeface="Arial"/>
-              <a:buChar char="•"/>
-              <a:defRPr sz="1600" kern="1200">
-                <a:solidFill>
-                  <a:schemeClr val="tx1"/>
-                </a:solidFill>
-                <a:latin typeface="Times New Roman"/>
-                <a:ea typeface="+mn-ea"/>
-                <a:cs typeface="Times New Roman"/>
-              </a:defRPr>
-            </a:lvl4pPr>
-            <a:lvl5pPr marL="1188720" indent="-137160" algn="l" defTabSz="914400" rtl="0" eaLnBrk="1" latinLnBrk="0" hangingPunct="1">
-              <a:spcBef>
-                <a:spcPct val="20000"/>
-              </a:spcBef>
-              <a:buClr>
-                <a:schemeClr val="accent1"/>
-              </a:buClr>
-              <a:buSzPct val="100000"/>
-              <a:buFont typeface="Wingdings" charset="2"/>
-              <a:buChar char="Ø"/>
-              <a:defRPr sz="1400" kern="1200" baseline="0">
-                <a:solidFill>
-                  <a:schemeClr val="tx1"/>
-                </a:solidFill>
-                <a:latin typeface="Times New Roman"/>
-                <a:ea typeface="+mn-ea"/>
-                <a:cs typeface="Times New Roman"/>
-              </a:defRPr>
-            </a:lvl5pPr>
-            <a:lvl6pPr marL="1371600" indent="-182880" algn="l" defTabSz="914400" rtl="0" eaLnBrk="1" latinLnBrk="0" hangingPunct="1">
-              <a:spcBef>
-                <a:spcPct val="20000"/>
-              </a:spcBef>
-              <a:buClr>
-                <a:schemeClr val="accent1"/>
-              </a:buClr>
-              <a:buFont typeface="Arial" pitchFamily="34" charset="0"/>
-              <a:buChar char="•"/>
-              <a:defRPr sz="1300" kern="1200">
-                <a:solidFill>
-                  <a:schemeClr val="tx1"/>
-                </a:solidFill>
-                <a:latin typeface="+mn-lt"/>
-                <a:ea typeface="+mn-ea"/>
-                <a:cs typeface="+mn-cs"/>
-              </a:defRPr>
-            </a:lvl6pPr>
-            <a:lvl7pPr marL="1554480" indent="-182880" algn="l" defTabSz="914400" rtl="0" eaLnBrk="1" latinLnBrk="0" hangingPunct="1">
-              <a:spcBef>
-                <a:spcPct val="20000"/>
-              </a:spcBef>
-              <a:buClr>
-                <a:schemeClr val="accent1"/>
-              </a:buClr>
-              <a:buFont typeface="Arial" pitchFamily="34" charset="0"/>
-              <a:buChar char="•"/>
-              <a:defRPr sz="1300" kern="1200">
-                <a:solidFill>
-                  <a:schemeClr val="tx1"/>
-                </a:solidFill>
-                <a:latin typeface="+mn-lt"/>
-                <a:ea typeface="+mn-ea"/>
-                <a:cs typeface="+mn-cs"/>
-              </a:defRPr>
-            </a:lvl7pPr>
-            <a:lvl8pPr marL="1737360" indent="-182880" algn="l" defTabSz="914400" rtl="0" eaLnBrk="1" latinLnBrk="0" hangingPunct="1">
-              <a:spcBef>
-                <a:spcPct val="20000"/>
-              </a:spcBef>
-              <a:buClr>
-                <a:schemeClr val="accent1"/>
-              </a:buClr>
-              <a:buFont typeface="Arial" pitchFamily="34" charset="0"/>
-              <a:buChar char="•"/>
-              <a:defRPr sz="1300" kern="1200">
-                <a:solidFill>
-                  <a:schemeClr val="tx1"/>
-                </a:solidFill>
-                <a:latin typeface="+mn-lt"/>
-                <a:ea typeface="+mn-ea"/>
-                <a:cs typeface="+mn-cs"/>
-              </a:defRPr>
-            </a:lvl8pPr>
-            <a:lvl9pPr marL="1920240" indent="-182880" algn="l" defTabSz="914400" rtl="0" eaLnBrk="1" latinLnBrk="0" hangingPunct="1">
-              <a:spcBef>
-                <a:spcPct val="20000"/>
-              </a:spcBef>
-              <a:buClr>
-                <a:schemeClr val="accent1"/>
-              </a:buClr>
-              <a:buFont typeface="Arial" pitchFamily="34" charset="0"/>
-              <a:buChar char="•"/>
-              <a:defRPr sz="1300" kern="1200">
-                <a:solidFill>
-                  <a:schemeClr val="tx1"/>
-                </a:solidFill>
-                <a:latin typeface="+mn-lt"/>
-                <a:ea typeface="+mn-ea"/>
-                <a:cs typeface="+mn-cs"/>
-              </a:defRPr>
-            </a:lvl9pPr>
-          </a:lstStyle>
-          <a:p>
-            <a:pPr marL="0" indent="0" algn="ctr">
-              <a:buFont typeface="Arial" pitchFamily="34" charset="0"/>
-              <a:buNone/>
-            </a:pPr>
-            <a:r>
-              <a:rPr lang="en-US" smtClean="0"/>
-              <a:t>Stencil in Charm: Communication of a chare overlaps with computation of others</a:t>
-            </a:r>
-            <a:endParaRPr lang="en-US" dirty="0"/>
-          </a:p>
-        </p:txBody>
-      </p:sp>
-    </p:spTree>
-    <p:extLst>
-      <p:ext uri="{BB962C8B-B14F-4D97-AF65-F5344CB8AC3E}">
-        <p14:creationId xmlns:p14="http://schemas.microsoft.com/office/powerpoint/2010/main" val="239611447"/>
-      </p:ext>
-    </p:extLst>
-  </p:cSld>
-  <p:clrMapOvr>
-    <a:masterClrMapping/>
-  </p:clrMapOvr>
-  <p:timing>
-    <p:tnLst>
-      <p:par>
-        <p:cTn xmlns:p14="http://schemas.microsoft.com/office/powerpoint/2010/main" id="1" dur="indefinite" restart="never" nodeType="tmRoot"/>
-      </p:par>
-    </p:tnLst>
-  </p:timing>
-</p:sld>
-</file>
-
-<file path=ppt/slides/slide5.xml><?xml version="1.0" encoding="utf-8"?>
-<p:sld xmlns:a="http://schemas.openxmlformats.org/drawingml/2006/main" xmlns:r="http://schemas.openxmlformats.org/officeDocument/2006/relationships" xmlns:p="http://schemas.openxmlformats.org/presentationml/2006/main">
-  <p:cSld>
-    <p:spTree>
-      <p:nvGrpSpPr>
-        <p:cNvPr id="1" name=""/>
-        <p:cNvGrpSpPr/>
-        <p:nvPr/>
-      </p:nvGrpSpPr>
-      <p:grpSpPr>
-        <a:xfrm>
-          <a:off x="0" y="0"/>
-          <a:ext cx="0" cy="0"/>
-          <a:chOff x="0" y="0"/>
-          <a:chExt cx="0" cy="0"/>
-        </a:xfrm>
-      </p:grpSpPr>
-      <p:sp>
-        <p:nvSpPr>
-          <p:cNvPr id="2" name="Title 1"/>
-          <p:cNvSpPr>
-            <a:spLocks noGrp="1"/>
-          </p:cNvSpPr>
-          <p:nvPr>
-            <p:ph type="title"/>
-          </p:nvPr>
-        </p:nvSpPr>
-        <p:spPr/>
-        <p:txBody>
-          <a:bodyPr>
-            <a:normAutofit/>
-          </a:bodyPr>
-          <a:lstStyle/>
-          <a:p>
-            <a:r>
-              <a:rPr lang="en-US" dirty="0" smtClean="0"/>
-              <a:t>Modularity and Compositionality</a:t>
-            </a:r>
-            <a:endParaRPr lang="en-US" dirty="0"/>
-          </a:p>
-        </p:txBody>
-      </p:sp>
-      <p:sp>
-        <p:nvSpPr>
-          <p:cNvPr id="5" name="Footer Placeholder 4"/>
-          <p:cNvSpPr>
-            <a:spLocks noGrp="1"/>
-          </p:cNvSpPr>
-          <p:nvPr>
-            <p:ph type="ftr" sz="quarter" idx="11"/>
-          </p:nvPr>
-        </p:nvSpPr>
-        <p:spPr/>
-        <p:txBody>
-          <a:bodyPr/>
-          <a:lstStyle/>
-          <a:p>
-            <a:pPr algn="r"/>
-            <a:r>
-              <a:rPr lang="en-US" smtClean="0"/>
-              <a:t>Laxmikant Kalé and PPL (UIUC) – Parallel Migratable Objects </a:t>
-            </a:r>
-            <a:endParaRPr lang="en-US" dirty="0"/>
-          </a:p>
-        </p:txBody>
-      </p:sp>
-      <p:sp>
-        <p:nvSpPr>
-          <p:cNvPr id="6" name="Slide Number Placeholder 5"/>
-          <p:cNvSpPr>
-            <a:spLocks noGrp="1"/>
-          </p:cNvSpPr>
-          <p:nvPr>
-            <p:ph type="sldNum" sz="quarter" idx="12"/>
-          </p:nvPr>
-        </p:nvSpPr>
-        <p:spPr/>
-        <p:txBody>
-          <a:bodyPr/>
-          <a:lstStyle/>
-          <a:p>
-            <a:fld id="{0CFEC368-1D7A-4F81-ABF6-AE0E36BAF64C}" type="slidenum">
-              <a:rPr lang="en-US" smtClean="0"/>
-              <a:pPr/>
-              <a:t>5</a:t>
             </a:fld>
             <a:endParaRPr lang="en-US" dirty="0"/>
           </a:p>
@@ -11810,7 +11334,7 @@
 </p:sld>
 </file>
 
-<file path=ppt/slides/slide6.xml><?xml version="1.0" encoding="utf-8"?>
+<file path=ppt/slides/slide5.xml><?xml version="1.0" encoding="utf-8"?>
 <p:sld xmlns:a="http://schemas.openxmlformats.org/drawingml/2006/main" xmlns:r="http://schemas.openxmlformats.org/officeDocument/2006/relationships" xmlns:p="http://schemas.openxmlformats.org/presentationml/2006/main">
   <p:cSld>
     <p:spTree>
@@ -11929,7 +11453,7 @@
             <a:fld id="{0CFEC368-1D7A-4F81-ABF6-AE0E36BAF64C}" type="slidenum">
               <a:rPr lang="en-US" smtClean="0"/>
               <a:pPr/>
-              <a:t>6</a:t>
+              <a:t>5</a:t>
             </a:fld>
             <a:endParaRPr lang="en-US"/>
           </a:p>
@@ -11979,6 +11503,219 @@
 </p:sld>
 </file>
 
+<file path=ppt/slides/slide6.xml><?xml version="1.0" encoding="utf-8"?>
+<p:sld xmlns:a="http://schemas.openxmlformats.org/drawingml/2006/main" xmlns:r="http://schemas.openxmlformats.org/officeDocument/2006/relationships" xmlns:p="http://schemas.openxmlformats.org/presentationml/2006/main">
+  <p:cSld>
+    <p:spTree>
+      <p:nvGrpSpPr>
+        <p:cNvPr id="1" name=""/>
+        <p:cNvGrpSpPr/>
+        <p:nvPr/>
+      </p:nvGrpSpPr>
+      <p:grpSpPr>
+        <a:xfrm>
+          <a:off x="0" y="0"/>
+          <a:ext cx="0" cy="0"/>
+          <a:chOff x="0" y="0"/>
+          <a:chExt cx="0" cy="0"/>
+        </a:xfrm>
+      </p:grpSpPr>
+      <p:sp>
+        <p:nvSpPr>
+          <p:cNvPr id="2" name="Title 1"/>
+          <p:cNvSpPr>
+            <a:spLocks noGrp="1"/>
+          </p:cNvSpPr>
+          <p:nvPr>
+            <p:ph type="title"/>
+          </p:nvPr>
+        </p:nvSpPr>
+        <p:spPr/>
+        <p:txBody>
+          <a:bodyPr>
+            <a:normAutofit/>
+          </a:bodyPr>
+          <a:lstStyle/>
+          <a:p>
+            <a:r>
+              <a:rPr lang="en-US" dirty="0" smtClean="0"/>
+              <a:t>Modularity and Compositionality</a:t>
+            </a:r>
+            <a:endParaRPr lang="en-US" dirty="0"/>
+          </a:p>
+        </p:txBody>
+      </p:sp>
+      <p:sp>
+        <p:nvSpPr>
+          <p:cNvPr id="6" name="Footer Placeholder 5"/>
+          <p:cNvSpPr>
+            <a:spLocks noGrp="1"/>
+          </p:cNvSpPr>
+          <p:nvPr>
+            <p:ph type="ftr" sz="quarter" idx="11"/>
+          </p:nvPr>
+        </p:nvSpPr>
+        <p:spPr/>
+        <p:txBody>
+          <a:bodyPr/>
+          <a:lstStyle/>
+          <a:p>
+            <a:pPr algn="r"/>
+            <a:r>
+              <a:rPr lang="en-US" smtClean="0"/>
+              <a:t>Laxmikant Kalé and PPL (UIUC) – Parallel Migratable Objects </a:t>
+            </a:r>
+            <a:endParaRPr lang="en-US" dirty="0"/>
+          </a:p>
+        </p:txBody>
+      </p:sp>
+      <p:sp>
+        <p:nvSpPr>
+          <p:cNvPr id="8" name="Slide Number Placeholder 7"/>
+          <p:cNvSpPr>
+            <a:spLocks noGrp="1"/>
+          </p:cNvSpPr>
+          <p:nvPr>
+            <p:ph type="sldNum" sz="quarter" idx="12"/>
+          </p:nvPr>
+        </p:nvSpPr>
+        <p:spPr/>
+        <p:txBody>
+          <a:bodyPr/>
+          <a:lstStyle/>
+          <a:p>
+            <a:fld id="{0CFEC368-1D7A-4F81-ABF6-AE0E36BAF64C}" type="slidenum">
+              <a:rPr lang="en-US" smtClean="0"/>
+              <a:pPr/>
+              <a:t>6</a:t>
+            </a:fld>
+            <a:endParaRPr lang="en-US" dirty="0"/>
+          </a:p>
+        </p:txBody>
+      </p:sp>
+      <p:sp>
+        <p:nvSpPr>
+          <p:cNvPr id="3" name="Content Placeholder 2"/>
+          <p:cNvSpPr>
+            <a:spLocks noGrp="1"/>
+          </p:cNvSpPr>
+          <p:nvPr>
+            <p:ph sz="quarter" idx="13"/>
+          </p:nvPr>
+        </p:nvSpPr>
+        <p:spPr>
+          <a:xfrm>
+            <a:off x="261865" y="909977"/>
+            <a:ext cx="8615360" cy="546589"/>
+          </a:xfrm>
+        </p:spPr>
+        <p:txBody>
+          <a:bodyPr/>
+          <a:lstStyle/>
+          <a:p>
+            <a:pPr marL="0" indent="0">
+              <a:buNone/>
+            </a:pPr>
+            <a:r>
+              <a:rPr lang="en-US" dirty="0"/>
+              <a:t>Parallel Composition: A1; (B —— C ); A2</a:t>
+            </a:r>
+          </a:p>
+        </p:txBody>
+      </p:sp>
+      <p:pic>
+        <p:nvPicPr>
+          <p:cNvPr id="7" name="Content Placeholder 6"/>
+          <p:cNvPicPr>
+            <a:picLocks noGrp="1" noChangeAspect="1"/>
+          </p:cNvPicPr>
+          <p:nvPr>
+            <p:ph sz="quarter" idx="14"/>
+          </p:nvPr>
+        </p:nvPicPr>
+        <p:blipFill>
+          <a:blip r:embed="rId2"/>
+          <a:srcRect l="-4151" r="-4151"/>
+          <a:stretch>
+            <a:fillRect/>
+          </a:stretch>
+        </p:blipFill>
+        <p:spPr>
+          <a:xfrm>
+            <a:off x="261865" y="1648217"/>
+            <a:ext cx="8615360" cy="3505785"/>
+          </a:xfrm>
+        </p:spPr>
+      </p:pic>
+      <p:sp>
+        <p:nvSpPr>
+          <p:cNvPr id="5" name="Content Placeholder 4"/>
+          <p:cNvSpPr>
+            <a:spLocks noGrp="1"/>
+          </p:cNvSpPr>
+          <p:nvPr>
+            <p:ph sz="quarter" idx="15"/>
+          </p:nvPr>
+        </p:nvSpPr>
+        <p:spPr>
+          <a:xfrm>
+            <a:off x="261865" y="5154003"/>
+            <a:ext cx="8615360" cy="1325849"/>
+          </a:xfrm>
+        </p:spPr>
+        <p:txBody>
+          <a:bodyPr>
+            <a:normAutofit/>
+          </a:bodyPr>
+          <a:lstStyle/>
+          <a:p>
+            <a:pPr marL="0" indent="0">
+              <a:buNone/>
+            </a:pPr>
+            <a:r>
+              <a:rPr lang="en-US" dirty="0" smtClean="0"/>
+              <a:t>Different </a:t>
+            </a:r>
+            <a:r>
+              <a:rPr lang="en-US" dirty="0"/>
+              <a:t>modules, written in </a:t>
+            </a:r>
+            <a:r>
+              <a:rPr lang="en-US" dirty="0" smtClean="0"/>
+              <a:t>different </a:t>
+            </a:r>
+            <a:r>
+              <a:rPr lang="en-US" dirty="0"/>
+              <a:t>languages/paradigms, can overlap in time and on processors, without programmer having to worry about this </a:t>
+            </a:r>
+            <a:r>
+              <a:rPr lang="en-US" dirty="0" smtClean="0"/>
+              <a:t>explicitly</a:t>
+            </a:r>
+            <a:endParaRPr lang="en-US" dirty="0"/>
+          </a:p>
+        </p:txBody>
+      </p:sp>
+    </p:spTree>
+    <p:extLst>
+      <p:ext uri="{BB962C8B-B14F-4D97-AF65-F5344CB8AC3E}">
+        <p14:creationId xmlns:p14="http://schemas.microsoft.com/office/powerpoint/2010/main" val="3033491935"/>
+      </p:ext>
+    </p:extLst>
+  </p:cSld>
+  <p:clrMapOvr>
+    <a:masterClrMapping/>
+  </p:clrMapOvr>
+  <p:timing>
+    <p:tnLst>
+      <p:par>
+        <p:cTn xmlns:p14="http://schemas.microsoft.com/office/powerpoint/2010/main" id="1" dur="indefinite" restart="never" nodeType="tmRoot"/>
+      </p:par>
+    </p:tnLst>
+  </p:timing>
+</p:sld>
+</file>
+
 <file path=ppt/slides/slide7.xml><?xml version="1.0" encoding="utf-8"?>
 <p:sld xmlns:a="http://schemas.openxmlformats.org/drawingml/2006/main" xmlns:r="http://schemas.openxmlformats.org/officeDocument/2006/relationships" xmlns:p="http://schemas.openxmlformats.org/presentationml/2006/main">
   <p:cSld>
@@ -12014,8 +11751,94 @@
           <a:lstStyle/>
           <a:p>
             <a:r>
+              <a:rPr lang="en-US" dirty="0" err="1" smtClean="0"/>
+              <a:t>Migratability</a:t>
+            </a:r>
+            <a:endParaRPr lang="en-US" dirty="0"/>
+          </a:p>
+        </p:txBody>
+      </p:sp>
+      <p:sp>
+        <p:nvSpPr>
+          <p:cNvPr id="3" name="Content Placeholder 2"/>
+          <p:cNvSpPr>
+            <a:spLocks noGrp="1"/>
+          </p:cNvSpPr>
+          <p:nvPr>
+            <p:ph idx="1"/>
+          </p:nvPr>
+        </p:nvSpPr>
+        <p:spPr/>
+        <p:txBody>
+          <a:bodyPr/>
+          <a:lstStyle/>
+          <a:p>
+            <a:r>
+              <a:rPr lang="en-US" dirty="0"/>
+              <a:t>Once the programmer has written the code without reference to processors, all of the communication is expressed among objects</a:t>
+            </a:r>
+          </a:p>
+          <a:p>
+            <a:r>
+              <a:rPr lang="en-US" dirty="0"/>
+              <a:t>The system is free to migrate the objects across processors as and when it pleases</a:t>
+            </a:r>
+          </a:p>
+          <a:p>
+            <a:pPr lvl="1"/>
+            <a:r>
               <a:rPr lang="en-US" dirty="0" smtClean="0"/>
-              <a:t>Modularity and Compositionality</a:t>
+              <a:t>It </a:t>
+            </a:r>
+            <a:r>
+              <a:rPr lang="en-US" dirty="0"/>
+              <a:t>must ensure it can deliver method invocations to the objects, </a:t>
+            </a:r>
+            <a:r>
+              <a:rPr lang="en-US" dirty="0" smtClean="0"/>
+              <a:t>wherever </a:t>
+            </a:r>
+            <a:r>
+              <a:rPr lang="en-US" dirty="0"/>
+              <a:t>they go</a:t>
+            </a:r>
+          </a:p>
+          <a:p>
+            <a:pPr lvl="1"/>
+            <a:r>
+              <a:rPr lang="en-US" dirty="0" smtClean="0"/>
+              <a:t>This </a:t>
+            </a:r>
+            <a:r>
+              <a:rPr lang="en-US" dirty="0" err="1"/>
+              <a:t>migratability</a:t>
+            </a:r>
+            <a:r>
+              <a:rPr lang="en-US" dirty="0"/>
+              <a:t> turns out to be a key attribute for empowering an adaptive runtime system</a:t>
+            </a:r>
+          </a:p>
+        </p:txBody>
+      </p:sp>
+      <p:sp>
+        <p:nvSpPr>
+          <p:cNvPr id="5" name="Footer Placeholder 4"/>
+          <p:cNvSpPr>
+            <a:spLocks noGrp="1"/>
+          </p:cNvSpPr>
+          <p:nvPr>
+            <p:ph type="ftr" sz="quarter" idx="11"/>
+          </p:nvPr>
+        </p:nvSpPr>
+        <p:spPr/>
+        <p:txBody>
+          <a:bodyPr/>
+          <a:lstStyle/>
+          <a:p>
+            <a:pPr algn="r"/>
+            <a:r>
+              <a:rPr lang="en-US" smtClean="0"/>
+              <a:t>Laxmikant Kalé and PPL (UIUC) – Parallel Migratable Objects </a:t>
             </a:r>
             <a:endParaRPr lang="en-US" dirty="0"/>
           </a:p>
@@ -12023,31 +11846,7 @@
       </p:sp>
       <p:sp>
         <p:nvSpPr>
-          <p:cNvPr id="6" name="Footer Placeholder 5"/>
-          <p:cNvSpPr>
-            <a:spLocks noGrp="1"/>
-          </p:cNvSpPr>
-          <p:nvPr>
-            <p:ph type="ftr" sz="quarter" idx="11"/>
-          </p:nvPr>
-        </p:nvSpPr>
-        <p:spPr/>
-        <p:txBody>
-          <a:bodyPr/>
-          <a:lstStyle/>
-          <a:p>
-            <a:pPr algn="r"/>
-            <a:r>
-              <a:rPr lang="en-US" smtClean="0"/>
-              <a:t>Laxmikant Kalé and PPL (UIUC) – Parallel Migratable Objects </a:t>
-            </a:r>
-            <a:endParaRPr lang="en-US" dirty="0"/>
-          </a:p>
-        </p:txBody>
-      </p:sp>
-      <p:sp>
-        <p:nvSpPr>
-          <p:cNvPr id="8" name="Slide Number Placeholder 7"/>
+          <p:cNvPr id="6" name="Slide Number Placeholder 5"/>
           <p:cNvSpPr>
             <a:spLocks noGrp="1"/>
           </p:cNvSpPr>
@@ -12069,113 +11868,10 @@
           </a:p>
         </p:txBody>
       </p:sp>
-      <p:sp>
-        <p:nvSpPr>
-          <p:cNvPr id="3" name="Content Placeholder 2"/>
-          <p:cNvSpPr>
-            <a:spLocks noGrp="1"/>
-          </p:cNvSpPr>
-          <p:nvPr>
-            <p:ph sz="quarter" idx="13"/>
-          </p:nvPr>
-        </p:nvSpPr>
-        <p:spPr>
-          <a:xfrm>
-            <a:off x="261865" y="909977"/>
-            <a:ext cx="8615360" cy="546589"/>
-          </a:xfrm>
-        </p:spPr>
-        <p:txBody>
-          <a:bodyPr/>
-          <a:lstStyle/>
-          <a:p>
-            <a:pPr marL="0" indent="0">
-              <a:buNone/>
-            </a:pPr>
-            <a:r>
-              <a:rPr lang="en-US" dirty="0"/>
-              <a:t>Parallel Composition: A1; (B —— C ); A2</a:t>
-            </a:r>
-          </a:p>
-        </p:txBody>
-      </p:sp>
-      <p:pic>
-        <p:nvPicPr>
-          <p:cNvPr id="7" name="Content Placeholder 6"/>
-          <p:cNvPicPr>
-            <a:picLocks noGrp="1" noChangeAspect="1"/>
-          </p:cNvPicPr>
-          <p:nvPr>
-            <p:ph sz="quarter" idx="14"/>
-          </p:nvPr>
-        </p:nvPicPr>
-        <p:blipFill>
-          <a:blip r:embed="rId2"/>
-          <a:srcRect l="-4151" r="-4151"/>
-          <a:stretch>
-            <a:fillRect/>
-          </a:stretch>
-        </p:blipFill>
-        <p:spPr>
-          <a:xfrm>
-            <a:off x="261865" y="1648217"/>
-            <a:ext cx="8615360" cy="3505785"/>
-          </a:xfrm>
-        </p:spPr>
-      </p:pic>
-      <p:sp>
-        <p:nvSpPr>
-          <p:cNvPr id="5" name="Content Placeholder 4"/>
-          <p:cNvSpPr>
-            <a:spLocks noGrp="1"/>
-          </p:cNvSpPr>
-          <p:nvPr>
-            <p:ph sz="quarter" idx="15"/>
-          </p:nvPr>
-        </p:nvSpPr>
-        <p:spPr>
-          <a:xfrm>
-            <a:off x="261865" y="5154003"/>
-            <a:ext cx="8615360" cy="1325849"/>
-          </a:xfrm>
-        </p:spPr>
-        <p:txBody>
-          <a:bodyPr>
-            <a:normAutofit/>
-          </a:bodyPr>
-          <a:lstStyle/>
-          <a:p>
-            <a:pPr marL="0" indent="0">
-              <a:buNone/>
-            </a:pPr>
-            <a:r>
-              <a:rPr lang="en-US" dirty="0" smtClean="0"/>
-              <a:t>Different </a:t>
-            </a:r>
-            <a:r>
-              <a:rPr lang="en-US" dirty="0"/>
-              <a:t>modules, written in </a:t>
-            </a:r>
-            <a:r>
-              <a:rPr lang="en-US" dirty="0" smtClean="0"/>
-              <a:t>different </a:t>
-            </a:r>
-            <a:r>
-              <a:rPr lang="en-US" dirty="0"/>
-              <a:t>languages/paradigms, can overlap in time and on processors, without programmer having to worry about this </a:t>
-            </a:r>
-            <a:r>
-              <a:rPr lang="en-US" dirty="0" smtClean="0"/>
-              <a:t>explicitly</a:t>
-            </a:r>
-            <a:endParaRPr lang="en-US" dirty="0"/>
-          </a:p>
-        </p:txBody>
-      </p:sp>
     </p:spTree>
     <p:extLst>
       <p:ext uri="{BB962C8B-B14F-4D97-AF65-F5344CB8AC3E}">
-        <p14:creationId xmlns:p14="http://schemas.microsoft.com/office/powerpoint/2010/main" val="3033491935"/>
+        <p14:creationId xmlns:p14="http://schemas.microsoft.com/office/powerpoint/2010/main" val="589172230"/>
       </p:ext>
     </p:extLst>
   </p:cSld>
@@ -12227,8 +11923,12 @@
           <a:lstStyle/>
           <a:p>
             <a:r>
-              <a:rPr lang="en-US" dirty="0" err="1" smtClean="0"/>
-              <a:t>Migratability</a:t>
+              <a:rPr lang="en-US" dirty="0"/>
+              <a:t>Decomposition Independent of </a:t>
+            </a:r>
+            <a:r>
+              <a:rPr lang="en-US" dirty="0" err="1"/>
+              <a:t>numCores</a:t>
             </a:r>
             <a:endParaRPr lang="en-US" dirty="0"/>
           </a:p>
@@ -12236,12 +11936,12 @@
       </p:sp>
       <p:sp>
         <p:nvSpPr>
-          <p:cNvPr id="3" name="Content Placeholder 2"/>
-          <p:cNvSpPr>
-            <a:spLocks noGrp="1"/>
-          </p:cNvSpPr>
-          <p:nvPr>
-            <p:ph idx="1"/>
+          <p:cNvPr id="13" name="Footer Placeholder 12"/>
+          <p:cNvSpPr>
+            <a:spLocks noGrp="1"/>
+          </p:cNvSpPr>
+          <p:nvPr>
+            <p:ph type="ftr" sz="quarter" idx="11"/>
           </p:nvPr>
         </p:nvSpPr>
         <p:spPr/>
@@ -12249,68 +11949,6 @@
           <a:bodyPr/>
           <a:lstStyle/>
           <a:p>
-            <a:r>
-              <a:rPr lang="en-US" dirty="0"/>
-              <a:t>Once the programmer has written the code without reference to processors, all of the communication is expressed among objects</a:t>
-            </a:r>
-          </a:p>
-          <a:p>
-            <a:r>
-              <a:rPr lang="en-US" dirty="0"/>
-              <a:t>The system is free to migrate the objects across processors as and when it pleases</a:t>
-            </a:r>
-          </a:p>
-          <a:p>
-            <a:pPr lvl="1"/>
-            <a:r>
-              <a:rPr lang="en-US" dirty="0" smtClean="0"/>
-              <a:t>It </a:t>
-            </a:r>
-            <a:r>
-              <a:rPr lang="en-US" dirty="0"/>
-              <a:t>must ensure it can deliver method invocations to the objects, </a:t>
-            </a:r>
-            <a:r>
-              <a:rPr lang="en-US" dirty="0" smtClean="0"/>
-              <a:t>wherever </a:t>
-            </a:r>
-            <a:r>
-              <a:rPr lang="en-US" dirty="0"/>
-              <a:t>they go</a:t>
-            </a:r>
-          </a:p>
-          <a:p>
-            <a:pPr lvl="1"/>
-            <a:r>
-              <a:rPr lang="en-US" dirty="0" smtClean="0"/>
-              <a:t>This </a:t>
-            </a:r>
-            <a:r>
-              <a:rPr lang="en-US" dirty="0" err="1"/>
-              <a:t>migratability</a:t>
-            </a:r>
-            <a:r>
-              <a:rPr lang="en-US" dirty="0"/>
-              <a:t> turns out to be a key attribute for empowering an adaptive runtime system</a:t>
-            </a:r>
-          </a:p>
-        </p:txBody>
-      </p:sp>
-      <p:sp>
-        <p:nvSpPr>
-          <p:cNvPr id="5" name="Footer Placeholder 4"/>
-          <p:cNvSpPr>
-            <a:spLocks noGrp="1"/>
-          </p:cNvSpPr>
-          <p:nvPr>
-            <p:ph type="ftr" sz="quarter" idx="11"/>
-          </p:nvPr>
-        </p:nvSpPr>
-        <p:spPr/>
-        <p:txBody>
-          <a:bodyPr/>
-          <a:lstStyle/>
-          <a:p>
             <a:pPr algn="r"/>
             <a:r>
               <a:rPr lang="en-US" smtClean="0"/>
@@ -12322,7 +11960,7 @@
       </p:sp>
       <p:sp>
         <p:nvSpPr>
-          <p:cNvPr id="6" name="Slide Number Placeholder 5"/>
+          <p:cNvPr id="14" name="Slide Number Placeholder 13"/>
           <p:cNvSpPr>
             <a:spLocks noGrp="1"/>
           </p:cNvSpPr>
@@ -12339,120 +11977,6 @@
               <a:rPr lang="en-US" smtClean="0"/>
               <a:pPr/>
               <a:t>8</a:t>
-            </a:fld>
-            <a:endParaRPr lang="en-US" dirty="0"/>
-          </a:p>
-        </p:txBody>
-      </p:sp>
-    </p:spTree>
-    <p:extLst>
-      <p:ext uri="{BB962C8B-B14F-4D97-AF65-F5344CB8AC3E}">
-        <p14:creationId xmlns:p14="http://schemas.microsoft.com/office/powerpoint/2010/main" val="589172230"/>
-      </p:ext>
-    </p:extLst>
-  </p:cSld>
-  <p:clrMapOvr>
-    <a:masterClrMapping/>
-  </p:clrMapOvr>
-  <p:timing>
-    <p:tnLst>
-      <p:par>
-        <p:cTn xmlns:p14="http://schemas.microsoft.com/office/powerpoint/2010/main" id="1" dur="indefinite" restart="never" nodeType="tmRoot"/>
-      </p:par>
-    </p:tnLst>
-  </p:timing>
-</p:sld>
-</file>
-
-<file path=ppt/slides/slide9.xml><?xml version="1.0" encoding="utf-8"?>
-<p:sld xmlns:a="http://schemas.openxmlformats.org/drawingml/2006/main" xmlns:r="http://schemas.openxmlformats.org/officeDocument/2006/relationships" xmlns:p="http://schemas.openxmlformats.org/presentationml/2006/main">
-  <p:cSld>
-    <p:spTree>
-      <p:nvGrpSpPr>
-        <p:cNvPr id="1" name=""/>
-        <p:cNvGrpSpPr/>
-        <p:nvPr/>
-      </p:nvGrpSpPr>
-      <p:grpSpPr>
-        <a:xfrm>
-          <a:off x="0" y="0"/>
-          <a:ext cx="0" cy="0"/>
-          <a:chOff x="0" y="0"/>
-          <a:chExt cx="0" cy="0"/>
-        </a:xfrm>
-      </p:grpSpPr>
-      <p:sp>
-        <p:nvSpPr>
-          <p:cNvPr id="2" name="Title 1"/>
-          <p:cNvSpPr>
-            <a:spLocks noGrp="1"/>
-          </p:cNvSpPr>
-          <p:nvPr>
-            <p:ph type="title"/>
-          </p:nvPr>
-        </p:nvSpPr>
-        <p:spPr/>
-        <p:txBody>
-          <a:bodyPr>
-            <a:normAutofit/>
-          </a:bodyPr>
-          <a:lstStyle/>
-          <a:p>
-            <a:r>
-              <a:rPr lang="en-US" dirty="0"/>
-              <a:t>Decomposition Independent of </a:t>
-            </a:r>
-            <a:r>
-              <a:rPr lang="en-US" dirty="0" err="1"/>
-              <a:t>numCores</a:t>
-            </a:r>
-            <a:endParaRPr lang="en-US" dirty="0"/>
-          </a:p>
-        </p:txBody>
-      </p:sp>
-      <p:sp>
-        <p:nvSpPr>
-          <p:cNvPr id="13" name="Footer Placeholder 12"/>
-          <p:cNvSpPr>
-            <a:spLocks noGrp="1"/>
-          </p:cNvSpPr>
-          <p:nvPr>
-            <p:ph type="ftr" sz="quarter" idx="11"/>
-          </p:nvPr>
-        </p:nvSpPr>
-        <p:spPr/>
-        <p:txBody>
-          <a:bodyPr/>
-          <a:lstStyle/>
-          <a:p>
-            <a:pPr algn="r"/>
-            <a:r>
-              <a:rPr lang="en-US" smtClean="0"/>
-              <a:t>Laxmikant Kalé and PPL (UIUC) – Parallel Migratable Objects </a:t>
-            </a:r>
-            <a:endParaRPr lang="en-US" dirty="0"/>
-          </a:p>
-        </p:txBody>
-      </p:sp>
-      <p:sp>
-        <p:nvSpPr>
-          <p:cNvPr id="14" name="Slide Number Placeholder 13"/>
-          <p:cNvSpPr>
-            <a:spLocks noGrp="1"/>
-          </p:cNvSpPr>
-          <p:nvPr>
-            <p:ph type="sldNum" sz="quarter" idx="12"/>
-          </p:nvPr>
-        </p:nvSpPr>
-        <p:spPr/>
-        <p:txBody>
-          <a:bodyPr/>
-          <a:lstStyle/>
-          <a:p>
-            <a:fld id="{0CFEC368-1D7A-4F81-ABF6-AE0E36BAF64C}" type="slidenum">
-              <a:rPr lang="en-US" smtClean="0"/>
-              <a:pPr/>
-              <a:t>9</a:t>
             </a:fld>
             <a:endParaRPr lang="en-US" dirty="0"/>
           </a:p>
@@ -12976,6 +12500,230 @@
       <p:bldP spid="5" grpId="0" build="p"/>
       <p:bldP spid="7" grpId="0"/>
     </p:bldLst>
+  </p:timing>
+</p:sld>
+</file>
+
+<file path=ppt/slides/slide9.xml><?xml version="1.0" encoding="utf-8"?>
+<p:sld xmlns:a="http://schemas.openxmlformats.org/drawingml/2006/main" xmlns:r="http://schemas.openxmlformats.org/officeDocument/2006/relationships" xmlns:p="http://schemas.openxmlformats.org/presentationml/2006/main">
+  <p:cSld>
+    <p:spTree>
+      <p:nvGrpSpPr>
+        <p:cNvPr id="1" name=""/>
+        <p:cNvGrpSpPr/>
+        <p:nvPr/>
+      </p:nvGrpSpPr>
+      <p:grpSpPr>
+        <a:xfrm>
+          <a:off x="0" y="0"/>
+          <a:ext cx="0" cy="0"/>
+          <a:chOff x="0" y="0"/>
+          <a:chExt cx="0" cy="0"/>
+        </a:xfrm>
+      </p:grpSpPr>
+      <p:sp>
+        <p:nvSpPr>
+          <p:cNvPr id="2" name="Title 1"/>
+          <p:cNvSpPr>
+            <a:spLocks noGrp="1"/>
+          </p:cNvSpPr>
+          <p:nvPr>
+            <p:ph type="title"/>
+          </p:nvPr>
+        </p:nvSpPr>
+        <p:spPr/>
+        <p:txBody>
+          <a:bodyPr>
+            <a:normAutofit fontScale="90000"/>
+          </a:bodyPr>
+          <a:lstStyle/>
+          <a:p>
+            <a:r>
+              <a:rPr lang="en-US" dirty="0"/>
+              <a:t>Utility for Multi-cores, Many-cores, Accelerators</a:t>
+            </a:r>
+          </a:p>
+        </p:txBody>
+      </p:sp>
+      <p:sp>
+        <p:nvSpPr>
+          <p:cNvPr id="3" name="Content Placeholder 2"/>
+          <p:cNvSpPr>
+            <a:spLocks noGrp="1"/>
+          </p:cNvSpPr>
+          <p:nvPr>
+            <p:ph idx="1"/>
+          </p:nvPr>
+        </p:nvSpPr>
+        <p:spPr>
+          <a:xfrm>
+            <a:off x="261865" y="846082"/>
+            <a:ext cx="8615360" cy="2347160"/>
+          </a:xfrm>
+        </p:spPr>
+        <p:txBody>
+          <a:bodyPr/>
+          <a:lstStyle/>
+          <a:p>
+            <a:r>
+              <a:rPr lang="en-US" dirty="0"/>
+              <a:t>Objects connote and promote locality </a:t>
+            </a:r>
+            <a:endParaRPr lang="en-US" dirty="0" smtClean="0"/>
+          </a:p>
+          <a:p>
+            <a:r>
+              <a:rPr lang="en-US" dirty="0" smtClean="0"/>
+              <a:t>Message</a:t>
+            </a:r>
+            <a:r>
+              <a:rPr lang="en-US" dirty="0"/>
+              <a:t>-driven execution is</a:t>
+            </a:r>
+          </a:p>
+          <a:p>
+            <a:pPr lvl="1"/>
+            <a:r>
+              <a:rPr lang="en-US" dirty="0" smtClean="0"/>
+              <a:t>A </a:t>
+            </a:r>
+            <a:r>
+              <a:rPr lang="en-US" dirty="0"/>
+              <a:t>strong principle of prediction for data and code use </a:t>
+            </a:r>
+            <a:endParaRPr lang="en-US" dirty="0" smtClean="0"/>
+          </a:p>
+          <a:p>
+            <a:pPr lvl="1"/>
+            <a:r>
+              <a:rPr lang="en-US" dirty="0" smtClean="0"/>
+              <a:t>Much </a:t>
+            </a:r>
+            <a:r>
+              <a:rPr lang="en-US" dirty="0"/>
+              <a:t>stronger than principle of locality</a:t>
+            </a:r>
+          </a:p>
+          <a:p>
+            <a:pPr lvl="2"/>
+            <a:r>
+              <a:rPr lang="en-US" dirty="0" smtClean="0"/>
+              <a:t>Can </a:t>
+            </a:r>
+            <a:r>
+              <a:rPr lang="en-US" dirty="0"/>
+              <a:t>be used to scale memory wall</a:t>
+            </a:r>
+          </a:p>
+          <a:p>
+            <a:pPr lvl="2"/>
+            <a:r>
+              <a:rPr lang="en-US" dirty="0" smtClean="0"/>
+              <a:t>Prefetching </a:t>
+            </a:r>
+            <a:r>
+              <a:rPr lang="en-US" dirty="0"/>
+              <a:t>of needed data, </a:t>
+            </a:r>
+            <a:r>
+              <a:rPr lang="en-US" dirty="0" err="1"/>
+              <a:t>e.g</a:t>
+            </a:r>
+            <a:r>
+              <a:rPr lang="en-US" dirty="0"/>
+              <a:t>, into scratch pad memories</a:t>
+            </a:r>
+          </a:p>
+        </p:txBody>
+      </p:sp>
+      <p:sp>
+        <p:nvSpPr>
+          <p:cNvPr id="6" name="Footer Placeholder 5"/>
+          <p:cNvSpPr>
+            <a:spLocks noGrp="1"/>
+          </p:cNvSpPr>
+          <p:nvPr>
+            <p:ph type="ftr" sz="quarter" idx="11"/>
+          </p:nvPr>
+        </p:nvSpPr>
+        <p:spPr/>
+        <p:txBody>
+          <a:bodyPr/>
+          <a:lstStyle/>
+          <a:p>
+            <a:pPr algn="r"/>
+            <a:r>
+              <a:rPr lang="en-US" smtClean="0"/>
+              <a:t>Laxmikant Kalé and PPL (UIUC) – Parallel Migratable Objects </a:t>
+            </a:r>
+            <a:endParaRPr lang="en-US" dirty="0"/>
+          </a:p>
+        </p:txBody>
+      </p:sp>
+      <p:sp>
+        <p:nvSpPr>
+          <p:cNvPr id="7" name="Slide Number Placeholder 6"/>
+          <p:cNvSpPr>
+            <a:spLocks noGrp="1"/>
+          </p:cNvSpPr>
+          <p:nvPr>
+            <p:ph type="sldNum" sz="quarter" idx="12"/>
+          </p:nvPr>
+        </p:nvSpPr>
+        <p:spPr/>
+        <p:txBody>
+          <a:bodyPr/>
+          <a:lstStyle/>
+          <a:p>
+            <a:fld id="{0CFEC368-1D7A-4F81-ABF6-AE0E36BAF64C}" type="slidenum">
+              <a:rPr lang="en-US" smtClean="0"/>
+              <a:pPr/>
+              <a:t>9</a:t>
+            </a:fld>
+            <a:endParaRPr lang="en-US"/>
+          </a:p>
+        </p:txBody>
+      </p:sp>
+      <p:pic>
+        <p:nvPicPr>
+          <p:cNvPr id="4" name="Picture 3"/>
+          <p:cNvPicPr>
+            <a:picLocks noChangeAspect="1"/>
+          </p:cNvPicPr>
+          <p:nvPr/>
+        </p:nvPicPr>
+        <p:blipFill>
+          <a:blip r:embed="rId3"/>
+          <a:stretch>
+            <a:fillRect/>
+          </a:stretch>
+        </p:blipFill>
+        <p:spPr>
+          <a:xfrm>
+            <a:off x="1788286" y="3317084"/>
+            <a:ext cx="5625213" cy="2976029"/>
+          </a:xfrm>
+          <a:prstGeom prst="rect">
+            <a:avLst/>
+          </a:prstGeom>
+        </p:spPr>
+      </p:pic>
+    </p:spTree>
+    <p:extLst>
+      <p:ext uri="{BB962C8B-B14F-4D97-AF65-F5344CB8AC3E}">
+        <p14:creationId xmlns:p14="http://schemas.microsoft.com/office/powerpoint/2010/main" val="576997588"/>
+      </p:ext>
+    </p:extLst>
+  </p:cSld>
+  <p:clrMapOvr>
+    <a:masterClrMapping/>
+  </p:clrMapOvr>
+  <p:timing>
+    <p:tnLst>
+      <p:par>
+        <p:cTn xmlns:p14="http://schemas.microsoft.com/office/powerpoint/2010/main" id="1" dur="indefinite" restart="never" nodeType="tmRoot"/>
+      </p:par>
+    </p:tnLst>
   </p:timing>
 </p:sld>
 </file>

</xml_diff>

<commit_message>
tut 3: Fix modularity and compositinality figures animation and alignment
</commit_message>
<xml_diff>
--- a/tutorial-03-benefits.pptx
+++ b/tutorial-03-benefits.pptx
@@ -14,9 +14,9 @@
     <p:sldId id="322" r:id="rId2"/>
     <p:sldId id="347" r:id="rId3"/>
     <p:sldId id="349" r:id="rId4"/>
-    <p:sldId id="331" r:id="rId5"/>
+    <p:sldId id="352" r:id="rId5"/>
     <p:sldId id="332" r:id="rId6"/>
-    <p:sldId id="333" r:id="rId7"/>
+    <p:sldId id="355" r:id="rId7"/>
     <p:sldId id="334" r:id="rId8"/>
     <p:sldId id="335" r:id="rId9"/>
     <p:sldId id="336" r:id="rId10"/>
@@ -11207,7 +11207,40 @@
       </p:sp>
       <p:sp>
         <p:nvSpPr>
-          <p:cNvPr id="5" name="Footer Placeholder 4"/>
+          <p:cNvPr id="3" name="Content Placeholder 2"/>
+          <p:cNvSpPr>
+            <a:spLocks noGrp="1"/>
+          </p:cNvSpPr>
+          <p:nvPr>
+            <p:ph idx="1"/>
+          </p:nvPr>
+        </p:nvSpPr>
+        <p:spPr>
+          <a:xfrm>
+            <a:off x="261865" y="1143000"/>
+            <a:ext cx="8615360" cy="575001"/>
+          </a:xfrm>
+        </p:spPr>
+        <p:txBody>
+          <a:bodyPr>
+            <a:noAutofit/>
+          </a:bodyPr>
+          <a:lstStyle/>
+          <a:p>
+            <a:pPr marL="0" indent="0">
+              <a:buNone/>
+            </a:pPr>
+            <a:r>
+              <a:rPr lang="en-US" dirty="0"/>
+              <a:t>Without message-driven execution (and virtualization), you get either: Space-division</a:t>
+            </a:r>
+            <a:endParaRPr lang="en-US" dirty="0"/>
+          </a:p>
+        </p:txBody>
+      </p:sp>
+      <p:sp>
+        <p:nvSpPr>
+          <p:cNvPr id="6" name="Footer Placeholder 5"/>
           <p:cNvSpPr>
             <a:spLocks noGrp="1"/>
           </p:cNvSpPr>
@@ -11231,7 +11264,7 @@
       </p:sp>
       <p:sp>
         <p:nvSpPr>
-          <p:cNvPr id="6" name="Slide Number Placeholder 5"/>
+          <p:cNvPr id="7" name="Slide Number Placeholder 6"/>
           <p:cNvSpPr>
             <a:spLocks noGrp="1"/>
           </p:cNvSpPr>
@@ -11249,44 +11282,7 @@
               <a:pPr/>
               <a:t>4</a:t>
             </a:fld>
-            <a:endParaRPr lang="en-US" dirty="0"/>
-          </a:p>
-        </p:txBody>
-      </p:sp>
-      <p:sp>
-        <p:nvSpPr>
-          <p:cNvPr id="3" name="Content Placeholder 2"/>
-          <p:cNvSpPr>
-            <a:spLocks noGrp="1"/>
-          </p:cNvSpPr>
-          <p:nvPr>
-            <p:ph sz="quarter" idx="13"/>
-          </p:nvPr>
-        </p:nvSpPr>
-        <p:spPr>
-          <a:xfrm>
-            <a:off x="254000" y="909977"/>
-            <a:ext cx="8763000" cy="1118512"/>
-          </a:xfrm>
-        </p:spPr>
-        <p:txBody>
-          <a:bodyPr>
-            <a:normAutofit/>
-          </a:bodyPr>
-          <a:lstStyle/>
-          <a:p>
-            <a:pPr marL="0" indent="0">
-              <a:buNone/>
-            </a:pPr>
-            <a:r>
-              <a:rPr lang="en-US" dirty="0"/>
-              <a:t>Without message-driven execution (and virtualization), you get either: Space-</a:t>
-            </a:r>
-            <a:r>
-              <a:rPr lang="en-US" dirty="0" smtClean="0"/>
-              <a:t>division</a:t>
-            </a:r>
-            <a:endParaRPr lang="en-US" dirty="0"/>
+            <a:endParaRPr lang="en-US"/>
           </a:p>
         </p:txBody>
       </p:sp>
@@ -11294,11 +11290,9 @@
         <p:nvPicPr>
           <p:cNvPr id="8" name="Content Placeholder 7"/>
           <p:cNvPicPr>
-            <a:picLocks noGrp="1" noChangeAspect="1"/>
+            <a:picLocks noChangeAspect="1"/>
           </p:cNvPicPr>
-          <p:nvPr>
-            <p:ph sz="quarter" idx="14"/>
-          </p:nvPr>
+          <p:nvPr/>
         </p:nvPicPr>
         <p:blipFill>
           <a:blip r:embed="rId2"/>
@@ -11309,15 +11303,18 @@
         </p:blipFill>
         <p:spPr>
           <a:xfrm>
-            <a:off x="261865" y="2198574"/>
-            <a:ext cx="8615360" cy="3678264"/>
+            <a:off x="124574" y="1950016"/>
+            <a:ext cx="8912749" cy="3805232"/>
           </a:xfrm>
+          <a:prstGeom prst="rect">
+            <a:avLst/>
+          </a:prstGeom>
         </p:spPr>
       </p:pic>
     </p:spTree>
     <p:extLst>
       <p:ext uri="{BB962C8B-B14F-4D97-AF65-F5344CB8AC3E}">
-        <p14:creationId xmlns:p14="http://schemas.microsoft.com/office/powerpoint/2010/main" val="1487196641"/>
+        <p14:creationId xmlns:p14="http://schemas.microsoft.com/office/powerpoint/2010/main" val="4215319375"/>
       </p:ext>
     </p:extLst>
   </p:cSld>
@@ -11522,95 +11519,17 @@
       </p:grpSpPr>
       <p:sp>
         <p:nvSpPr>
-          <p:cNvPr id="2" name="Title 1"/>
-          <p:cNvSpPr>
-            <a:spLocks noGrp="1"/>
-          </p:cNvSpPr>
-          <p:nvPr>
-            <p:ph type="title"/>
+          <p:cNvPr id="3" name="Content Placeholder 2"/>
+          <p:cNvSpPr>
+            <a:spLocks noGrp="1"/>
+          </p:cNvSpPr>
+          <p:nvPr>
+            <p:ph idx="1"/>
           </p:nvPr>
         </p:nvSpPr>
         <p:spPr/>
         <p:txBody>
-          <a:bodyPr>
-            <a:normAutofit/>
-          </a:bodyPr>
-          <a:lstStyle/>
-          <a:p>
-            <a:r>
-              <a:rPr lang="en-US" dirty="0" smtClean="0"/>
-              <a:t>Modularity and Compositionality</a:t>
-            </a:r>
-            <a:endParaRPr lang="en-US" dirty="0"/>
-          </a:p>
-        </p:txBody>
-      </p:sp>
-      <p:sp>
-        <p:nvSpPr>
-          <p:cNvPr id="6" name="Footer Placeholder 5"/>
-          <p:cNvSpPr>
-            <a:spLocks noGrp="1"/>
-          </p:cNvSpPr>
-          <p:nvPr>
-            <p:ph type="ftr" sz="quarter" idx="11"/>
-          </p:nvPr>
-        </p:nvSpPr>
-        <p:spPr/>
-        <p:txBody>
-          <a:bodyPr/>
-          <a:lstStyle/>
-          <a:p>
-            <a:pPr algn="r"/>
-            <a:r>
-              <a:rPr lang="en-US" smtClean="0"/>
-              <a:t>Laxmikant Kalé and PPL (UIUC) – Parallel Migratable Objects </a:t>
-            </a:r>
-            <a:endParaRPr lang="en-US" dirty="0"/>
-          </a:p>
-        </p:txBody>
-      </p:sp>
-      <p:sp>
-        <p:nvSpPr>
-          <p:cNvPr id="8" name="Slide Number Placeholder 7"/>
-          <p:cNvSpPr>
-            <a:spLocks noGrp="1"/>
-          </p:cNvSpPr>
-          <p:nvPr>
-            <p:ph type="sldNum" sz="quarter" idx="12"/>
-          </p:nvPr>
-        </p:nvSpPr>
-        <p:spPr/>
-        <p:txBody>
-          <a:bodyPr/>
-          <a:lstStyle/>
-          <a:p>
-            <a:fld id="{0CFEC368-1D7A-4F81-ABF6-AE0E36BAF64C}" type="slidenum">
-              <a:rPr lang="en-US" smtClean="0"/>
-              <a:pPr/>
-              <a:t>6</a:t>
-            </a:fld>
-            <a:endParaRPr lang="en-US" dirty="0"/>
-          </a:p>
-        </p:txBody>
-      </p:sp>
-      <p:sp>
-        <p:nvSpPr>
-          <p:cNvPr id="3" name="Content Placeholder 2"/>
-          <p:cNvSpPr>
-            <a:spLocks noGrp="1"/>
-          </p:cNvSpPr>
-          <p:nvPr>
-            <p:ph sz="quarter" idx="13"/>
-          </p:nvPr>
-        </p:nvSpPr>
-        <p:spPr>
-          <a:xfrm>
-            <a:off x="261865" y="909977"/>
-            <a:ext cx="8615360" cy="546589"/>
-          </a:xfrm>
-        </p:spPr>
-        <p:txBody>
-          <a:bodyPr/>
+          <a:bodyPr anchor="t"/>
           <a:lstStyle/>
           <a:p>
             <a:pPr marL="0" indent="0">
@@ -11620,18 +11539,17 @@
               <a:rPr lang="en-US" dirty="0"/>
               <a:t>Parallel Composition: A1; (B —— C ); A2</a:t>
             </a:r>
+            <a:endParaRPr lang="en-US" dirty="0"/>
           </a:p>
         </p:txBody>
       </p:sp>
       <p:pic>
         <p:nvPicPr>
-          <p:cNvPr id="7" name="Content Placeholder 6"/>
+          <p:cNvPr id="8" name="Content Placeholder 6"/>
           <p:cNvPicPr>
-            <a:picLocks noGrp="1" noChangeAspect="1"/>
+            <a:picLocks noChangeAspect="1"/>
           </p:cNvPicPr>
-          <p:nvPr>
-            <p:ph sz="quarter" idx="14"/>
-          </p:nvPr>
+          <p:nvPr/>
         </p:nvPicPr>
         <p:blipFill>
           <a:blip r:embed="rId2"/>
@@ -11645,73 +11563,2406 @@
             <a:off x="261865" y="1648217"/>
             <a:ext cx="8615360" cy="3505785"/>
           </a:xfrm>
+          <a:prstGeom prst="rect">
+            <a:avLst/>
+          </a:prstGeom>
         </p:spPr>
       </p:pic>
       <p:sp>
         <p:nvSpPr>
-          <p:cNvPr id="5" name="Content Placeholder 4"/>
-          <p:cNvSpPr>
-            <a:spLocks noGrp="1"/>
-          </p:cNvSpPr>
-          <p:nvPr>
-            <p:ph sz="quarter" idx="15"/>
-          </p:nvPr>
+          <p:cNvPr id="4" name="Rectangle 3"/>
+          <p:cNvSpPr/>
+          <p:nvPr/>
+        </p:nvSpPr>
+        <p:spPr>
+          <a:xfrm>
+            <a:off x="3283488" y="1487449"/>
+            <a:ext cx="5777567" cy="2917690"/>
+          </a:xfrm>
+          <a:prstGeom prst="rect">
+            <a:avLst/>
+          </a:prstGeom>
+          <a:solidFill>
+            <a:schemeClr val="bg1"/>
+          </a:solidFill>
+          <a:ln>
+            <a:noFill/>
+          </a:ln>
+          <a:effectLst/>
+        </p:spPr>
+        <p:style>
+          <a:lnRef idx="1">
+            <a:schemeClr val="accent1"/>
+          </a:lnRef>
+          <a:fillRef idx="3">
+            <a:schemeClr val="accent1"/>
+          </a:fillRef>
+          <a:effectRef idx="2">
+            <a:schemeClr val="accent1"/>
+          </a:effectRef>
+          <a:fontRef idx="minor">
+            <a:schemeClr val="lt1"/>
+          </a:fontRef>
+        </p:style>
+        <p:txBody>
+          <a:bodyPr rtlCol="0" anchor="ctr"/>
+          <a:lstStyle/>
+          <a:p>
+            <a:pPr algn="ctr"/>
+            <a:endParaRPr lang="en-US"/>
+          </a:p>
+        </p:txBody>
+      </p:sp>
+      <p:sp>
+        <p:nvSpPr>
+          <p:cNvPr id="9" name="Content Placeholder 4"/>
+          <p:cNvSpPr txBox="1">
+            <a:spLocks/>
+          </p:cNvSpPr>
+          <p:nvPr/>
         </p:nvSpPr>
         <p:spPr>
           <a:xfrm>
             <a:off x="261865" y="5154003"/>
             <a:ext cx="8615360" cy="1325849"/>
           </a:xfrm>
+          <a:prstGeom prst="rect">
+            <a:avLst/>
+          </a:prstGeom>
         </p:spPr>
         <p:txBody>
           <a:bodyPr>
             <a:normAutofit/>
           </a:bodyPr>
-          <a:lstStyle/>
+          <a:lstStyle>
+            <a:lvl1pPr marL="182880" indent="-182880" algn="l" defTabSz="914400" rtl="0" eaLnBrk="1" latinLnBrk="0" hangingPunct="1">
+              <a:spcBef>
+                <a:spcPct val="20000"/>
+              </a:spcBef>
+              <a:buClr>
+                <a:schemeClr val="accent1"/>
+              </a:buClr>
+              <a:buSzPct val="85000"/>
+              <a:buFont typeface="Arial" pitchFamily="34" charset="0"/>
+              <a:buChar char="•"/>
+              <a:defRPr sz="2400" kern="1200">
+                <a:solidFill>
+                  <a:schemeClr val="tx1"/>
+                </a:solidFill>
+                <a:latin typeface="Times New Roman"/>
+                <a:ea typeface="+mn-ea"/>
+                <a:cs typeface="Times New Roman"/>
+              </a:defRPr>
+            </a:lvl1pPr>
+            <a:lvl2pPr marL="457200" indent="-182880" algn="l" defTabSz="914400" rtl="0" eaLnBrk="1" latinLnBrk="0" hangingPunct="1">
+              <a:spcBef>
+                <a:spcPct val="20000"/>
+              </a:spcBef>
+              <a:buClr>
+                <a:schemeClr val="accent1"/>
+              </a:buClr>
+              <a:buSzPct val="85000"/>
+              <a:buFont typeface="Wingdings" charset="2"/>
+              <a:buChar char="Ø"/>
+              <a:defRPr sz="2000" kern="1200">
+                <a:solidFill>
+                  <a:schemeClr val="tx1"/>
+                </a:solidFill>
+                <a:latin typeface="Times New Roman"/>
+                <a:ea typeface="+mn-ea"/>
+                <a:cs typeface="Times New Roman"/>
+              </a:defRPr>
+            </a:lvl2pPr>
+            <a:lvl3pPr marL="731520" indent="-182880" algn="l" defTabSz="914400" rtl="0" eaLnBrk="1" latinLnBrk="0" hangingPunct="1">
+              <a:spcBef>
+                <a:spcPct val="20000"/>
+              </a:spcBef>
+              <a:buClr>
+                <a:schemeClr val="accent1"/>
+              </a:buClr>
+              <a:buSzPct val="90000"/>
+              <a:buFont typeface="Wingdings" charset="2"/>
+              <a:buChar char=""/>
+              <a:defRPr sz="1800" kern="1200">
+                <a:solidFill>
+                  <a:schemeClr val="tx1"/>
+                </a:solidFill>
+                <a:latin typeface="Times New Roman"/>
+                <a:ea typeface="+mn-ea"/>
+                <a:cs typeface="Times New Roman"/>
+              </a:defRPr>
+            </a:lvl3pPr>
+            <a:lvl4pPr marL="1005840" indent="-182880" algn="l" defTabSz="914400" rtl="0" eaLnBrk="1" latinLnBrk="0" hangingPunct="1">
+              <a:spcBef>
+                <a:spcPct val="20000"/>
+              </a:spcBef>
+              <a:buClr>
+                <a:schemeClr val="accent1"/>
+              </a:buClr>
+              <a:buFont typeface="Arial"/>
+              <a:buChar char="•"/>
+              <a:defRPr sz="1600" kern="1200">
+                <a:solidFill>
+                  <a:schemeClr val="tx1"/>
+                </a:solidFill>
+                <a:latin typeface="Times New Roman"/>
+                <a:ea typeface="+mn-ea"/>
+                <a:cs typeface="Times New Roman"/>
+              </a:defRPr>
+            </a:lvl4pPr>
+            <a:lvl5pPr marL="1188720" indent="-137160" algn="l" defTabSz="914400" rtl="0" eaLnBrk="1" latinLnBrk="0" hangingPunct="1">
+              <a:spcBef>
+                <a:spcPct val="20000"/>
+              </a:spcBef>
+              <a:buClr>
+                <a:schemeClr val="accent1"/>
+              </a:buClr>
+              <a:buSzPct val="100000"/>
+              <a:buFont typeface="Wingdings" charset="2"/>
+              <a:buChar char="Ø"/>
+              <a:defRPr sz="1400" kern="1200" baseline="0">
+                <a:solidFill>
+                  <a:schemeClr val="tx1"/>
+                </a:solidFill>
+                <a:latin typeface="Times New Roman"/>
+                <a:ea typeface="+mn-ea"/>
+                <a:cs typeface="Times New Roman"/>
+              </a:defRPr>
+            </a:lvl5pPr>
+            <a:lvl6pPr marL="1371600" indent="-182880" algn="l" defTabSz="914400" rtl="0" eaLnBrk="1" latinLnBrk="0" hangingPunct="1">
+              <a:spcBef>
+                <a:spcPct val="20000"/>
+              </a:spcBef>
+              <a:buClr>
+                <a:schemeClr val="accent1"/>
+              </a:buClr>
+              <a:buFont typeface="Arial" pitchFamily="34" charset="0"/>
+              <a:buChar char="•"/>
+              <a:defRPr sz="1300" kern="1200">
+                <a:solidFill>
+                  <a:schemeClr val="tx1"/>
+                </a:solidFill>
+                <a:latin typeface="+mn-lt"/>
+                <a:ea typeface="+mn-ea"/>
+                <a:cs typeface="+mn-cs"/>
+              </a:defRPr>
+            </a:lvl6pPr>
+            <a:lvl7pPr marL="1554480" indent="-182880" algn="l" defTabSz="914400" rtl="0" eaLnBrk="1" latinLnBrk="0" hangingPunct="1">
+              <a:spcBef>
+                <a:spcPct val="20000"/>
+              </a:spcBef>
+              <a:buClr>
+                <a:schemeClr val="accent1"/>
+              </a:buClr>
+              <a:buFont typeface="Arial" pitchFamily="34" charset="0"/>
+              <a:buChar char="•"/>
+              <a:defRPr sz="1300" kern="1200">
+                <a:solidFill>
+                  <a:schemeClr val="tx1"/>
+                </a:solidFill>
+                <a:latin typeface="+mn-lt"/>
+                <a:ea typeface="+mn-ea"/>
+                <a:cs typeface="+mn-cs"/>
+              </a:defRPr>
+            </a:lvl7pPr>
+            <a:lvl8pPr marL="1737360" indent="-182880" algn="l" defTabSz="914400" rtl="0" eaLnBrk="1" latinLnBrk="0" hangingPunct="1">
+              <a:spcBef>
+                <a:spcPct val="20000"/>
+              </a:spcBef>
+              <a:buClr>
+                <a:schemeClr val="accent1"/>
+              </a:buClr>
+              <a:buFont typeface="Arial" pitchFamily="34" charset="0"/>
+              <a:buChar char="•"/>
+              <a:defRPr sz="1300" kern="1200">
+                <a:solidFill>
+                  <a:schemeClr val="tx1"/>
+                </a:solidFill>
+                <a:latin typeface="+mn-lt"/>
+                <a:ea typeface="+mn-ea"/>
+                <a:cs typeface="+mn-cs"/>
+              </a:defRPr>
+            </a:lvl8pPr>
+            <a:lvl9pPr marL="1920240" indent="-182880" algn="l" defTabSz="914400" rtl="0" eaLnBrk="1" latinLnBrk="0" hangingPunct="1">
+              <a:spcBef>
+                <a:spcPct val="20000"/>
+              </a:spcBef>
+              <a:buClr>
+                <a:schemeClr val="accent1"/>
+              </a:buClr>
+              <a:buFont typeface="Arial" pitchFamily="34" charset="0"/>
+              <a:buChar char="•"/>
+              <a:defRPr sz="1300" kern="1200">
+                <a:solidFill>
+                  <a:schemeClr val="tx1"/>
+                </a:solidFill>
+                <a:latin typeface="+mn-lt"/>
+                <a:ea typeface="+mn-ea"/>
+                <a:cs typeface="+mn-cs"/>
+              </a:defRPr>
+            </a:lvl9pPr>
+          </a:lstStyle>
           <a:p>
             <a:pPr marL="0" indent="0">
+              <a:buFont typeface="Arial" pitchFamily="34" charset="0"/>
               <a:buNone/>
             </a:pPr>
             <a:r>
               <a:rPr lang="en-US" dirty="0" smtClean="0"/>
-              <a:t>Different </a:t>
-            </a:r>
-            <a:r>
-              <a:rPr lang="en-US" dirty="0"/>
-              <a:t>modules, written in </a:t>
-            </a:r>
+              <a:t>Different modules, written in different languages/paradigms, can overlap in time and on processors, without programmer having to worry about this explicitly</a:t>
+            </a:r>
+            <a:endParaRPr lang="en-US" dirty="0"/>
+          </a:p>
+        </p:txBody>
+      </p:sp>
+      <p:sp>
+        <p:nvSpPr>
+          <p:cNvPr id="185" name="Rectangle 184"/>
+          <p:cNvSpPr/>
+          <p:nvPr/>
+        </p:nvSpPr>
+        <p:spPr>
+          <a:xfrm>
+            <a:off x="3543557" y="3211365"/>
+            <a:ext cx="4343400" cy="381000"/>
+          </a:xfrm>
+          <a:prstGeom prst="rect">
+            <a:avLst/>
+          </a:prstGeom>
+          <a:solidFill>
+            <a:srgbClr val="777C84">
+              <a:lumMod val="20000"/>
+              <a:lumOff val="80000"/>
+            </a:srgbClr>
+          </a:solidFill>
+          <a:ln w="25400" cap="flat" cmpd="sng" algn="ctr">
+            <a:solidFill>
+              <a:srgbClr val="777C84">
+                <a:lumMod val="60000"/>
+                <a:lumOff val="40000"/>
+              </a:srgbClr>
+            </a:solidFill>
+            <a:prstDash val="solid"/>
+          </a:ln>
+          <a:effectLst/>
+        </p:spPr>
+        <p:txBody>
+          <a:bodyPr anchor="ctr"/>
+          <a:lstStyle/>
+          <a:p>
+            <a:pPr marL="0" marR="0" lvl="0" indent="0" algn="ctr" defTabSz="914400" eaLnBrk="1" fontAlgn="base" latinLnBrk="0" hangingPunct="1">
+              <a:lnSpc>
+                <a:spcPct val="100000"/>
+              </a:lnSpc>
+              <a:spcBef>
+                <a:spcPct val="0"/>
+              </a:spcBef>
+              <a:spcAft>
+                <a:spcPct val="0"/>
+              </a:spcAft>
+              <a:buClrTx/>
+              <a:buSzTx/>
+              <a:buFontTx/>
+              <a:buNone/>
+              <a:tabLst/>
+              <a:defRPr/>
+            </a:pPr>
+            <a:endParaRPr kumimoji="0" lang="en-US" sz="2400" b="0" i="0" u="none" strike="noStrike" kern="0" cap="none" spc="0" normalizeH="0" baseline="0" noProof="0" dirty="0">
+              <a:ln>
+                <a:noFill/>
+              </a:ln>
+              <a:solidFill>
+                <a:prstClr val="white"/>
+              </a:solidFill>
+              <a:effectLst/>
+              <a:uLnTx/>
+              <a:uFillTx/>
+              <a:latin typeface="Lucida Sans Unicode"/>
+              <a:ea typeface="+mn-ea"/>
+              <a:cs typeface="+mn-cs"/>
+            </a:endParaRPr>
+          </a:p>
+        </p:txBody>
+      </p:sp>
+      <p:sp>
+        <p:nvSpPr>
+          <p:cNvPr id="186" name="Rectangle 185"/>
+          <p:cNvSpPr/>
+          <p:nvPr/>
+        </p:nvSpPr>
+        <p:spPr>
+          <a:xfrm>
+            <a:off x="3543557" y="2525565"/>
+            <a:ext cx="4343400" cy="381000"/>
+          </a:xfrm>
+          <a:prstGeom prst="rect">
+            <a:avLst/>
+          </a:prstGeom>
+          <a:solidFill>
+            <a:srgbClr val="777C84">
+              <a:lumMod val="20000"/>
+              <a:lumOff val="80000"/>
+            </a:srgbClr>
+          </a:solidFill>
+          <a:ln w="25400" cap="flat" cmpd="sng" algn="ctr">
+            <a:solidFill>
+              <a:srgbClr val="777C84">
+                <a:lumMod val="60000"/>
+                <a:lumOff val="40000"/>
+              </a:srgbClr>
+            </a:solidFill>
+            <a:prstDash val="solid"/>
+          </a:ln>
+          <a:effectLst/>
+        </p:spPr>
+        <p:txBody>
+          <a:bodyPr anchor="ctr"/>
+          <a:lstStyle/>
+          <a:p>
+            <a:pPr marL="0" marR="0" lvl="0" indent="0" algn="ctr" defTabSz="914400" eaLnBrk="1" fontAlgn="base" latinLnBrk="0" hangingPunct="1">
+              <a:lnSpc>
+                <a:spcPct val="100000"/>
+              </a:lnSpc>
+              <a:spcBef>
+                <a:spcPct val="0"/>
+              </a:spcBef>
+              <a:spcAft>
+                <a:spcPct val="0"/>
+              </a:spcAft>
+              <a:buClrTx/>
+              <a:buSzTx/>
+              <a:buFontTx/>
+              <a:buNone/>
+              <a:tabLst/>
+              <a:defRPr/>
+            </a:pPr>
+            <a:endParaRPr kumimoji="0" lang="en-US" sz="2400" b="0" i="0" u="none" strike="noStrike" kern="0" cap="none" spc="0" normalizeH="0" baseline="0" noProof="0" dirty="0">
+              <a:ln>
+                <a:noFill/>
+              </a:ln>
+              <a:solidFill>
+                <a:prstClr val="white"/>
+              </a:solidFill>
+              <a:effectLst/>
+              <a:uLnTx/>
+              <a:uFillTx/>
+              <a:latin typeface="Lucida Sans Unicode"/>
+              <a:ea typeface="+mn-ea"/>
+              <a:cs typeface="+mn-cs"/>
+            </a:endParaRPr>
+          </a:p>
+        </p:txBody>
+      </p:sp>
+      <p:sp>
+        <p:nvSpPr>
+          <p:cNvPr id="187" name="Rectangle 186"/>
+          <p:cNvSpPr/>
+          <p:nvPr/>
+        </p:nvSpPr>
+        <p:spPr>
+          <a:xfrm>
+            <a:off x="3543557" y="1382565"/>
+            <a:ext cx="4343400" cy="381000"/>
+          </a:xfrm>
+          <a:prstGeom prst="rect">
+            <a:avLst/>
+          </a:prstGeom>
+          <a:solidFill>
+            <a:srgbClr val="777C84">
+              <a:lumMod val="20000"/>
+              <a:lumOff val="80000"/>
+            </a:srgbClr>
+          </a:solidFill>
+          <a:ln w="25400" cap="flat" cmpd="sng" algn="ctr">
+            <a:solidFill>
+              <a:srgbClr val="777C84">
+                <a:lumMod val="60000"/>
+                <a:lumOff val="40000"/>
+              </a:srgbClr>
+            </a:solidFill>
+            <a:prstDash val="solid"/>
+          </a:ln>
+          <a:effectLst/>
+        </p:spPr>
+        <p:txBody>
+          <a:bodyPr anchor="ctr"/>
+          <a:lstStyle/>
+          <a:p>
+            <a:pPr marL="0" marR="0" lvl="0" indent="0" algn="ctr" defTabSz="914400" eaLnBrk="1" fontAlgn="base" latinLnBrk="0" hangingPunct="1">
+              <a:lnSpc>
+                <a:spcPct val="100000"/>
+              </a:lnSpc>
+              <a:spcBef>
+                <a:spcPct val="0"/>
+              </a:spcBef>
+              <a:spcAft>
+                <a:spcPct val="0"/>
+              </a:spcAft>
+              <a:buClrTx/>
+              <a:buSzTx/>
+              <a:buFontTx/>
+              <a:buNone/>
+              <a:tabLst/>
+              <a:defRPr/>
+            </a:pPr>
+            <a:endParaRPr kumimoji="0" lang="en-US" sz="2400" b="0" i="0" u="none" strike="noStrike" kern="0" cap="none" spc="0" normalizeH="0" baseline="0" noProof="0" dirty="0">
+              <a:ln>
+                <a:noFill/>
+              </a:ln>
+              <a:solidFill>
+                <a:prstClr val="white"/>
+              </a:solidFill>
+              <a:effectLst/>
+              <a:uLnTx/>
+              <a:uFillTx/>
+              <a:latin typeface="Lucida Sans Unicode"/>
+              <a:ea typeface="+mn-ea"/>
+              <a:cs typeface="+mn-cs"/>
+            </a:endParaRPr>
+          </a:p>
+        </p:txBody>
+      </p:sp>
+      <p:sp>
+        <p:nvSpPr>
+          <p:cNvPr id="188" name="Rectangle 187"/>
+          <p:cNvSpPr/>
+          <p:nvPr/>
+        </p:nvSpPr>
+        <p:spPr>
+          <a:xfrm>
+            <a:off x="3543557" y="1992165"/>
+            <a:ext cx="4343400" cy="381000"/>
+          </a:xfrm>
+          <a:prstGeom prst="rect">
+            <a:avLst/>
+          </a:prstGeom>
+          <a:solidFill>
+            <a:srgbClr val="777C84">
+              <a:lumMod val="20000"/>
+              <a:lumOff val="80000"/>
+            </a:srgbClr>
+          </a:solidFill>
+          <a:ln w="25400" cap="flat" cmpd="sng" algn="ctr">
+            <a:solidFill>
+              <a:srgbClr val="777C84">
+                <a:lumMod val="60000"/>
+                <a:lumOff val="40000"/>
+              </a:srgbClr>
+            </a:solidFill>
+            <a:prstDash val="solid"/>
+          </a:ln>
+          <a:effectLst/>
+        </p:spPr>
+        <p:txBody>
+          <a:bodyPr anchor="ctr"/>
+          <a:lstStyle/>
+          <a:p>
+            <a:pPr marL="0" marR="0" lvl="0" indent="0" algn="ctr" defTabSz="914400" eaLnBrk="1" fontAlgn="base" latinLnBrk="0" hangingPunct="1">
+              <a:lnSpc>
+                <a:spcPct val="100000"/>
+              </a:lnSpc>
+              <a:spcBef>
+                <a:spcPct val="0"/>
+              </a:spcBef>
+              <a:spcAft>
+                <a:spcPct val="0"/>
+              </a:spcAft>
+              <a:buClrTx/>
+              <a:buSzTx/>
+              <a:buFontTx/>
+              <a:buNone/>
+              <a:tabLst/>
+              <a:defRPr/>
+            </a:pPr>
+            <a:endParaRPr kumimoji="0" lang="en-US" sz="2400" b="0" i="0" u="none" strike="noStrike" kern="0" cap="none" spc="0" normalizeH="0" baseline="0" noProof="0" dirty="0">
+              <a:ln>
+                <a:noFill/>
+              </a:ln>
+              <a:solidFill>
+                <a:prstClr val="white"/>
+              </a:solidFill>
+              <a:effectLst/>
+              <a:uLnTx/>
+              <a:uFillTx/>
+              <a:latin typeface="Lucida Sans Unicode"/>
+              <a:ea typeface="+mn-ea"/>
+              <a:cs typeface="+mn-cs"/>
+            </a:endParaRPr>
+          </a:p>
+        </p:txBody>
+      </p:sp>
+      <p:sp>
+        <p:nvSpPr>
+          <p:cNvPr id="190" name="Rectangle 189"/>
+          <p:cNvSpPr/>
+          <p:nvPr/>
+        </p:nvSpPr>
+        <p:spPr>
+          <a:xfrm>
+            <a:off x="2552957" y="2220765"/>
+            <a:ext cx="76200" cy="76200"/>
+          </a:xfrm>
+          <a:prstGeom prst="rect">
+            <a:avLst/>
+          </a:prstGeom>
+          <a:solidFill>
+            <a:srgbClr val="FE8637"/>
+          </a:solidFill>
+          <a:ln w="25400" cap="flat" cmpd="sng" algn="ctr">
+            <a:noFill/>
+            <a:prstDash val="solid"/>
+          </a:ln>
+          <a:effectLst/>
+        </p:spPr>
+        <p:txBody>
+          <a:bodyPr anchor="ctr"/>
+          <a:lstStyle/>
+          <a:p>
+            <a:pPr marL="0" marR="0" lvl="0" indent="0" algn="ctr" defTabSz="914400" eaLnBrk="1" fontAlgn="base" latinLnBrk="0" hangingPunct="1">
+              <a:lnSpc>
+                <a:spcPct val="100000"/>
+              </a:lnSpc>
+              <a:spcBef>
+                <a:spcPct val="0"/>
+              </a:spcBef>
+              <a:spcAft>
+                <a:spcPct val="0"/>
+              </a:spcAft>
+              <a:buClrTx/>
+              <a:buSzTx/>
+              <a:buFontTx/>
+              <a:buNone/>
+              <a:tabLst/>
+              <a:defRPr/>
+            </a:pPr>
+            <a:endParaRPr kumimoji="0" lang="en-US" sz="2400" b="0" i="0" u="none" strike="noStrike" kern="0" cap="none" spc="0" normalizeH="0" baseline="0" noProof="0" dirty="0">
+              <a:ln>
+                <a:noFill/>
+              </a:ln>
+              <a:solidFill>
+                <a:prstClr val="white"/>
+              </a:solidFill>
+              <a:effectLst/>
+              <a:uLnTx/>
+              <a:uFillTx/>
+              <a:latin typeface="Lucida Sans Unicode"/>
+              <a:ea typeface="+mn-ea"/>
+              <a:cs typeface="+mn-cs"/>
+            </a:endParaRPr>
+          </a:p>
+        </p:txBody>
+      </p:sp>
+      <p:sp>
+        <p:nvSpPr>
+          <p:cNvPr id="191" name="Rectangle 190"/>
+          <p:cNvSpPr/>
+          <p:nvPr/>
+        </p:nvSpPr>
+        <p:spPr>
+          <a:xfrm>
+            <a:off x="2400557" y="2296965"/>
+            <a:ext cx="76200" cy="76200"/>
+          </a:xfrm>
+          <a:prstGeom prst="rect">
+            <a:avLst/>
+          </a:prstGeom>
+          <a:solidFill>
+            <a:srgbClr val="FE8637"/>
+          </a:solidFill>
+          <a:ln w="25400" cap="flat" cmpd="sng" algn="ctr">
+            <a:noFill/>
+            <a:prstDash val="solid"/>
+          </a:ln>
+          <a:effectLst/>
+        </p:spPr>
+        <p:txBody>
+          <a:bodyPr anchor="ctr"/>
+          <a:lstStyle/>
+          <a:p>
+            <a:pPr marL="0" marR="0" lvl="0" indent="0" algn="ctr" defTabSz="914400" eaLnBrk="1" fontAlgn="base" latinLnBrk="0" hangingPunct="1">
+              <a:lnSpc>
+                <a:spcPct val="100000"/>
+              </a:lnSpc>
+              <a:spcBef>
+                <a:spcPct val="0"/>
+              </a:spcBef>
+              <a:spcAft>
+                <a:spcPct val="0"/>
+              </a:spcAft>
+              <a:buClrTx/>
+              <a:buSzTx/>
+              <a:buFontTx/>
+              <a:buNone/>
+              <a:tabLst/>
+              <a:defRPr/>
+            </a:pPr>
+            <a:endParaRPr kumimoji="0" lang="en-US" sz="2400" b="0" i="0" u="none" strike="noStrike" kern="0" cap="none" spc="0" normalizeH="0" baseline="0" noProof="0" dirty="0">
+              <a:ln>
+                <a:noFill/>
+              </a:ln>
+              <a:solidFill>
+                <a:prstClr val="white"/>
+              </a:solidFill>
+              <a:effectLst/>
+              <a:uLnTx/>
+              <a:uFillTx/>
+              <a:latin typeface="Lucida Sans Unicode"/>
+              <a:ea typeface="+mn-ea"/>
+              <a:cs typeface="+mn-cs"/>
+            </a:endParaRPr>
+          </a:p>
+        </p:txBody>
+      </p:sp>
+      <p:sp>
+        <p:nvSpPr>
+          <p:cNvPr id="192" name="Rectangle 191"/>
+          <p:cNvSpPr/>
+          <p:nvPr/>
+        </p:nvSpPr>
+        <p:spPr>
+          <a:xfrm>
+            <a:off x="2248157" y="2449365"/>
+            <a:ext cx="76200" cy="76200"/>
+          </a:xfrm>
+          <a:prstGeom prst="rect">
+            <a:avLst/>
+          </a:prstGeom>
+          <a:solidFill>
+            <a:srgbClr val="FE8637"/>
+          </a:solidFill>
+          <a:ln w="25400" cap="flat" cmpd="sng" algn="ctr">
+            <a:noFill/>
+            <a:prstDash val="solid"/>
+          </a:ln>
+          <a:effectLst/>
+        </p:spPr>
+        <p:txBody>
+          <a:bodyPr anchor="ctr"/>
+          <a:lstStyle/>
+          <a:p>
+            <a:pPr marL="0" marR="0" lvl="0" indent="0" algn="ctr" defTabSz="914400" eaLnBrk="1" fontAlgn="base" latinLnBrk="0" hangingPunct="1">
+              <a:lnSpc>
+                <a:spcPct val="100000"/>
+              </a:lnSpc>
+              <a:spcBef>
+                <a:spcPct val="0"/>
+              </a:spcBef>
+              <a:spcAft>
+                <a:spcPct val="0"/>
+              </a:spcAft>
+              <a:buClrTx/>
+              <a:buSzTx/>
+              <a:buFontTx/>
+              <a:buNone/>
+              <a:tabLst/>
+              <a:defRPr/>
+            </a:pPr>
+            <a:endParaRPr kumimoji="0" lang="en-US" sz="2400" b="0" i="0" u="none" strike="noStrike" kern="0" cap="none" spc="0" normalizeH="0" baseline="0" noProof="0" dirty="0">
+              <a:ln>
+                <a:noFill/>
+              </a:ln>
+              <a:solidFill>
+                <a:prstClr val="white"/>
+              </a:solidFill>
+              <a:effectLst/>
+              <a:uLnTx/>
+              <a:uFillTx/>
+              <a:latin typeface="Lucida Sans Unicode"/>
+              <a:ea typeface="+mn-ea"/>
+              <a:cs typeface="+mn-cs"/>
+            </a:endParaRPr>
+          </a:p>
+        </p:txBody>
+      </p:sp>
+      <p:sp>
+        <p:nvSpPr>
+          <p:cNvPr id="193" name="Rectangle 192"/>
+          <p:cNvSpPr/>
+          <p:nvPr/>
+        </p:nvSpPr>
+        <p:spPr>
+          <a:xfrm>
+            <a:off x="2248157" y="2677965"/>
+            <a:ext cx="76200" cy="76200"/>
+          </a:xfrm>
+          <a:prstGeom prst="rect">
+            <a:avLst/>
+          </a:prstGeom>
+          <a:solidFill>
+            <a:srgbClr val="FE8637"/>
+          </a:solidFill>
+          <a:ln w="25400" cap="flat" cmpd="sng" algn="ctr">
+            <a:noFill/>
+            <a:prstDash val="solid"/>
+          </a:ln>
+          <a:effectLst/>
+        </p:spPr>
+        <p:txBody>
+          <a:bodyPr anchor="ctr"/>
+          <a:lstStyle/>
+          <a:p>
+            <a:pPr marL="0" marR="0" lvl="0" indent="0" algn="ctr" defTabSz="914400" eaLnBrk="1" fontAlgn="base" latinLnBrk="0" hangingPunct="1">
+              <a:lnSpc>
+                <a:spcPct val="100000"/>
+              </a:lnSpc>
+              <a:spcBef>
+                <a:spcPct val="0"/>
+              </a:spcBef>
+              <a:spcAft>
+                <a:spcPct val="0"/>
+              </a:spcAft>
+              <a:buClrTx/>
+              <a:buSzTx/>
+              <a:buFontTx/>
+              <a:buNone/>
+              <a:tabLst/>
+              <a:defRPr/>
+            </a:pPr>
+            <a:endParaRPr kumimoji="0" lang="en-US" sz="2400" b="0" i="0" u="none" strike="noStrike" kern="0" cap="none" spc="0" normalizeH="0" baseline="0" noProof="0" dirty="0">
+              <a:ln>
+                <a:noFill/>
+              </a:ln>
+              <a:solidFill>
+                <a:prstClr val="white"/>
+              </a:solidFill>
+              <a:effectLst/>
+              <a:uLnTx/>
+              <a:uFillTx/>
+              <a:latin typeface="Lucida Sans Unicode"/>
+              <a:ea typeface="+mn-ea"/>
+              <a:cs typeface="+mn-cs"/>
+            </a:endParaRPr>
+          </a:p>
+        </p:txBody>
+      </p:sp>
+      <p:sp>
+        <p:nvSpPr>
+          <p:cNvPr id="194" name="Rectangle 193"/>
+          <p:cNvSpPr/>
+          <p:nvPr/>
+        </p:nvSpPr>
+        <p:spPr>
+          <a:xfrm>
+            <a:off x="2781557" y="2449365"/>
+            <a:ext cx="76200" cy="76200"/>
+          </a:xfrm>
+          <a:prstGeom prst="rect">
+            <a:avLst/>
+          </a:prstGeom>
+          <a:solidFill>
+            <a:srgbClr val="FE8637"/>
+          </a:solidFill>
+          <a:ln w="25400" cap="flat" cmpd="sng" algn="ctr">
+            <a:noFill/>
+            <a:prstDash val="solid"/>
+          </a:ln>
+          <a:effectLst/>
+        </p:spPr>
+        <p:txBody>
+          <a:bodyPr anchor="ctr"/>
+          <a:lstStyle/>
+          <a:p>
+            <a:pPr marL="0" marR="0" lvl="0" indent="0" algn="ctr" defTabSz="914400" eaLnBrk="1" fontAlgn="base" latinLnBrk="0" hangingPunct="1">
+              <a:lnSpc>
+                <a:spcPct val="100000"/>
+              </a:lnSpc>
+              <a:spcBef>
+                <a:spcPct val="0"/>
+              </a:spcBef>
+              <a:spcAft>
+                <a:spcPct val="0"/>
+              </a:spcAft>
+              <a:buClrTx/>
+              <a:buSzTx/>
+              <a:buFontTx/>
+              <a:buNone/>
+              <a:tabLst/>
+              <a:defRPr/>
+            </a:pPr>
+            <a:endParaRPr kumimoji="0" lang="en-US" sz="2400" b="0" i="0" u="none" strike="noStrike" kern="0" cap="none" spc="0" normalizeH="0" baseline="0" noProof="0" dirty="0">
+              <a:ln>
+                <a:noFill/>
+              </a:ln>
+              <a:solidFill>
+                <a:prstClr val="white"/>
+              </a:solidFill>
+              <a:effectLst/>
+              <a:uLnTx/>
+              <a:uFillTx/>
+              <a:latin typeface="Lucida Sans Unicode"/>
+              <a:ea typeface="+mn-ea"/>
+              <a:cs typeface="+mn-cs"/>
+            </a:endParaRPr>
+          </a:p>
+        </p:txBody>
+      </p:sp>
+      <p:sp>
+        <p:nvSpPr>
+          <p:cNvPr id="195" name="Rectangle 194"/>
+          <p:cNvSpPr/>
+          <p:nvPr/>
+        </p:nvSpPr>
+        <p:spPr>
+          <a:xfrm>
+            <a:off x="2629157" y="2525565"/>
+            <a:ext cx="76200" cy="76200"/>
+          </a:xfrm>
+          <a:prstGeom prst="rect">
+            <a:avLst/>
+          </a:prstGeom>
+          <a:solidFill>
+            <a:srgbClr val="FE8637"/>
+          </a:solidFill>
+          <a:ln w="25400" cap="flat" cmpd="sng" algn="ctr">
+            <a:noFill/>
+            <a:prstDash val="solid"/>
+          </a:ln>
+          <a:effectLst/>
+        </p:spPr>
+        <p:txBody>
+          <a:bodyPr anchor="ctr"/>
+          <a:lstStyle/>
+          <a:p>
+            <a:pPr marL="0" marR="0" lvl="0" indent="0" algn="ctr" defTabSz="914400" eaLnBrk="1" fontAlgn="base" latinLnBrk="0" hangingPunct="1">
+              <a:lnSpc>
+                <a:spcPct val="100000"/>
+              </a:lnSpc>
+              <a:spcBef>
+                <a:spcPct val="0"/>
+              </a:spcBef>
+              <a:spcAft>
+                <a:spcPct val="0"/>
+              </a:spcAft>
+              <a:buClrTx/>
+              <a:buSzTx/>
+              <a:buFontTx/>
+              <a:buNone/>
+              <a:tabLst/>
+              <a:defRPr/>
+            </a:pPr>
+            <a:endParaRPr kumimoji="0" lang="en-US" sz="2400" b="0" i="0" u="none" strike="noStrike" kern="0" cap="none" spc="0" normalizeH="0" baseline="0" noProof="0" dirty="0">
+              <a:ln>
+                <a:noFill/>
+              </a:ln>
+              <a:solidFill>
+                <a:prstClr val="white"/>
+              </a:solidFill>
+              <a:effectLst/>
+              <a:uLnTx/>
+              <a:uFillTx/>
+              <a:latin typeface="Lucida Sans Unicode"/>
+              <a:ea typeface="+mn-ea"/>
+              <a:cs typeface="+mn-cs"/>
+            </a:endParaRPr>
+          </a:p>
+        </p:txBody>
+      </p:sp>
+      <p:sp>
+        <p:nvSpPr>
+          <p:cNvPr id="196" name="Rectangle 195"/>
+          <p:cNvSpPr/>
+          <p:nvPr/>
+        </p:nvSpPr>
+        <p:spPr>
+          <a:xfrm>
+            <a:off x="2552957" y="2677965"/>
+            <a:ext cx="76200" cy="76200"/>
+          </a:xfrm>
+          <a:prstGeom prst="rect">
+            <a:avLst/>
+          </a:prstGeom>
+          <a:solidFill>
+            <a:srgbClr val="FE8637"/>
+          </a:solidFill>
+          <a:ln w="25400" cap="flat" cmpd="sng" algn="ctr">
+            <a:noFill/>
+            <a:prstDash val="solid"/>
+          </a:ln>
+          <a:effectLst/>
+        </p:spPr>
+        <p:txBody>
+          <a:bodyPr anchor="ctr"/>
+          <a:lstStyle/>
+          <a:p>
+            <a:pPr marL="0" marR="0" lvl="0" indent="0" algn="ctr" defTabSz="914400" eaLnBrk="1" fontAlgn="base" latinLnBrk="0" hangingPunct="1">
+              <a:lnSpc>
+                <a:spcPct val="100000"/>
+              </a:lnSpc>
+              <a:spcBef>
+                <a:spcPct val="0"/>
+              </a:spcBef>
+              <a:spcAft>
+                <a:spcPct val="0"/>
+              </a:spcAft>
+              <a:buClrTx/>
+              <a:buSzTx/>
+              <a:buFontTx/>
+              <a:buNone/>
+              <a:tabLst/>
+              <a:defRPr/>
+            </a:pPr>
+            <a:endParaRPr kumimoji="0" lang="en-US" sz="2400" b="0" i="0" u="none" strike="noStrike" kern="0" cap="none" spc="0" normalizeH="0" baseline="0" noProof="0" dirty="0">
+              <a:ln>
+                <a:noFill/>
+              </a:ln>
+              <a:solidFill>
+                <a:prstClr val="white"/>
+              </a:solidFill>
+              <a:effectLst/>
+              <a:uLnTx/>
+              <a:uFillTx/>
+              <a:latin typeface="Lucida Sans Unicode"/>
+              <a:ea typeface="+mn-ea"/>
+              <a:cs typeface="+mn-cs"/>
+            </a:endParaRPr>
+          </a:p>
+        </p:txBody>
+      </p:sp>
+      <p:sp>
+        <p:nvSpPr>
+          <p:cNvPr id="197" name="Rectangle 196"/>
+          <p:cNvSpPr/>
+          <p:nvPr/>
+        </p:nvSpPr>
+        <p:spPr>
+          <a:xfrm>
+            <a:off x="2476757" y="2830365"/>
+            <a:ext cx="76200" cy="76200"/>
+          </a:xfrm>
+          <a:prstGeom prst="rect">
+            <a:avLst/>
+          </a:prstGeom>
+          <a:solidFill>
+            <a:srgbClr val="FE8637"/>
+          </a:solidFill>
+          <a:ln w="25400" cap="flat" cmpd="sng" algn="ctr">
+            <a:noFill/>
+            <a:prstDash val="solid"/>
+          </a:ln>
+          <a:effectLst/>
+        </p:spPr>
+        <p:txBody>
+          <a:bodyPr anchor="ctr"/>
+          <a:lstStyle/>
+          <a:p>
+            <a:pPr marL="0" marR="0" lvl="0" indent="0" algn="ctr" defTabSz="914400" eaLnBrk="1" fontAlgn="base" latinLnBrk="0" hangingPunct="1">
+              <a:lnSpc>
+                <a:spcPct val="100000"/>
+              </a:lnSpc>
+              <a:spcBef>
+                <a:spcPct val="0"/>
+              </a:spcBef>
+              <a:spcAft>
+                <a:spcPct val="0"/>
+              </a:spcAft>
+              <a:buClrTx/>
+              <a:buSzTx/>
+              <a:buFontTx/>
+              <a:buNone/>
+              <a:tabLst/>
+              <a:defRPr/>
+            </a:pPr>
+            <a:endParaRPr kumimoji="0" lang="en-US" sz="2400" b="0" i="0" u="none" strike="noStrike" kern="0" cap="none" spc="0" normalizeH="0" baseline="0" noProof="0" dirty="0">
+              <a:ln>
+                <a:noFill/>
+              </a:ln>
+              <a:solidFill>
+                <a:prstClr val="white"/>
+              </a:solidFill>
+              <a:effectLst/>
+              <a:uLnTx/>
+              <a:uFillTx/>
+              <a:latin typeface="Lucida Sans Unicode"/>
+              <a:ea typeface="+mn-ea"/>
+              <a:cs typeface="+mn-cs"/>
+            </a:endParaRPr>
+          </a:p>
+        </p:txBody>
+      </p:sp>
+      <p:sp>
+        <p:nvSpPr>
+          <p:cNvPr id="198" name="Rectangle 197"/>
+          <p:cNvSpPr/>
+          <p:nvPr/>
+        </p:nvSpPr>
+        <p:spPr>
+          <a:xfrm>
+            <a:off x="2476757" y="3516165"/>
+            <a:ext cx="76200" cy="76200"/>
+          </a:xfrm>
+          <a:prstGeom prst="rect">
+            <a:avLst/>
+          </a:prstGeom>
+          <a:solidFill>
+            <a:srgbClr val="FF0000"/>
+          </a:solidFill>
+          <a:ln w="25400" cap="flat" cmpd="sng" algn="ctr">
+            <a:noFill/>
+            <a:prstDash val="solid"/>
+          </a:ln>
+          <a:effectLst/>
+        </p:spPr>
+        <p:txBody>
+          <a:bodyPr anchor="ctr"/>
+          <a:lstStyle/>
+          <a:p>
+            <a:pPr marL="0" marR="0" lvl="0" indent="0" algn="ctr" defTabSz="914400" eaLnBrk="1" fontAlgn="base" latinLnBrk="0" hangingPunct="1">
+              <a:lnSpc>
+                <a:spcPct val="100000"/>
+              </a:lnSpc>
+              <a:spcBef>
+                <a:spcPct val="0"/>
+              </a:spcBef>
+              <a:spcAft>
+                <a:spcPct val="0"/>
+              </a:spcAft>
+              <a:buClrTx/>
+              <a:buSzTx/>
+              <a:buFontTx/>
+              <a:buNone/>
+              <a:tabLst/>
+              <a:defRPr/>
+            </a:pPr>
+            <a:endParaRPr kumimoji="0" lang="en-US" sz="2400" b="0" i="0" u="none" strike="noStrike" kern="0" cap="none" spc="0" normalizeH="0" baseline="0" noProof="0" dirty="0">
+              <a:ln>
+                <a:noFill/>
+              </a:ln>
+              <a:solidFill>
+                <a:prstClr val="white"/>
+              </a:solidFill>
+              <a:effectLst/>
+              <a:uLnTx/>
+              <a:uFillTx/>
+              <a:latin typeface="Lucida Sans Unicode"/>
+              <a:ea typeface="+mn-ea"/>
+              <a:cs typeface="+mn-cs"/>
+            </a:endParaRPr>
+          </a:p>
+        </p:txBody>
+      </p:sp>
+      <p:sp>
+        <p:nvSpPr>
+          <p:cNvPr id="199" name="Rectangle 198"/>
+          <p:cNvSpPr/>
+          <p:nvPr/>
+        </p:nvSpPr>
+        <p:spPr>
+          <a:xfrm>
+            <a:off x="2248157" y="3973365"/>
+            <a:ext cx="76200" cy="76200"/>
+          </a:xfrm>
+          <a:prstGeom prst="rect">
+            <a:avLst/>
+          </a:prstGeom>
+          <a:solidFill>
+            <a:srgbClr val="FF0000"/>
+          </a:solidFill>
+          <a:ln w="25400" cap="flat" cmpd="sng" algn="ctr">
+            <a:noFill/>
+            <a:prstDash val="solid"/>
+          </a:ln>
+          <a:effectLst/>
+        </p:spPr>
+        <p:txBody>
+          <a:bodyPr anchor="ctr"/>
+          <a:lstStyle/>
+          <a:p>
+            <a:pPr marL="0" marR="0" lvl="0" indent="0" algn="ctr" defTabSz="914400" eaLnBrk="1" fontAlgn="base" latinLnBrk="0" hangingPunct="1">
+              <a:lnSpc>
+                <a:spcPct val="100000"/>
+              </a:lnSpc>
+              <a:spcBef>
+                <a:spcPct val="0"/>
+              </a:spcBef>
+              <a:spcAft>
+                <a:spcPct val="0"/>
+              </a:spcAft>
+              <a:buClrTx/>
+              <a:buSzTx/>
+              <a:buFontTx/>
+              <a:buNone/>
+              <a:tabLst/>
+              <a:defRPr/>
+            </a:pPr>
+            <a:endParaRPr kumimoji="0" lang="en-US" sz="2400" b="0" i="0" u="none" strike="noStrike" kern="0" cap="none" spc="0" normalizeH="0" baseline="0" noProof="0" dirty="0">
+              <a:ln>
+                <a:noFill/>
+              </a:ln>
+              <a:solidFill>
+                <a:prstClr val="white"/>
+              </a:solidFill>
+              <a:effectLst/>
+              <a:uLnTx/>
+              <a:uFillTx/>
+              <a:latin typeface="Lucida Sans Unicode"/>
+              <a:ea typeface="+mn-ea"/>
+              <a:cs typeface="+mn-cs"/>
+            </a:endParaRPr>
+          </a:p>
+        </p:txBody>
+      </p:sp>
+      <p:sp>
+        <p:nvSpPr>
+          <p:cNvPr id="200" name="Rectangle 199"/>
+          <p:cNvSpPr/>
+          <p:nvPr/>
+        </p:nvSpPr>
+        <p:spPr>
+          <a:xfrm>
+            <a:off x="2171957" y="3744765"/>
+            <a:ext cx="76200" cy="76200"/>
+          </a:xfrm>
+          <a:prstGeom prst="rect">
+            <a:avLst/>
+          </a:prstGeom>
+          <a:solidFill>
+            <a:srgbClr val="FF0000"/>
+          </a:solidFill>
+          <a:ln w="25400" cap="flat" cmpd="sng" algn="ctr">
+            <a:noFill/>
+            <a:prstDash val="solid"/>
+          </a:ln>
+          <a:effectLst/>
+        </p:spPr>
+        <p:txBody>
+          <a:bodyPr anchor="ctr"/>
+          <a:lstStyle/>
+          <a:p>
+            <a:pPr marL="0" marR="0" lvl="0" indent="0" algn="ctr" defTabSz="914400" eaLnBrk="1" fontAlgn="base" latinLnBrk="0" hangingPunct="1">
+              <a:lnSpc>
+                <a:spcPct val="100000"/>
+              </a:lnSpc>
+              <a:spcBef>
+                <a:spcPct val="0"/>
+              </a:spcBef>
+              <a:spcAft>
+                <a:spcPct val="0"/>
+              </a:spcAft>
+              <a:buClrTx/>
+              <a:buSzTx/>
+              <a:buFontTx/>
+              <a:buNone/>
+              <a:tabLst/>
+              <a:defRPr/>
+            </a:pPr>
+            <a:endParaRPr kumimoji="0" lang="en-US" sz="2400" b="0" i="0" u="none" strike="noStrike" kern="0" cap="none" spc="0" normalizeH="0" baseline="0" noProof="0" dirty="0">
+              <a:ln>
+                <a:noFill/>
+              </a:ln>
+              <a:solidFill>
+                <a:prstClr val="white"/>
+              </a:solidFill>
+              <a:effectLst/>
+              <a:uLnTx/>
+              <a:uFillTx/>
+              <a:latin typeface="Lucida Sans Unicode"/>
+              <a:ea typeface="+mn-ea"/>
+              <a:cs typeface="+mn-cs"/>
+            </a:endParaRPr>
+          </a:p>
+        </p:txBody>
+      </p:sp>
+      <p:sp>
+        <p:nvSpPr>
+          <p:cNvPr id="201" name="Rectangle 200"/>
+          <p:cNvSpPr/>
+          <p:nvPr/>
+        </p:nvSpPr>
+        <p:spPr>
+          <a:xfrm>
+            <a:off x="2552957" y="3973365"/>
+            <a:ext cx="76200" cy="76200"/>
+          </a:xfrm>
+          <a:prstGeom prst="rect">
+            <a:avLst/>
+          </a:prstGeom>
+          <a:solidFill>
+            <a:srgbClr val="FF0000"/>
+          </a:solidFill>
+          <a:ln w="25400" cap="flat" cmpd="sng" algn="ctr">
+            <a:noFill/>
+            <a:prstDash val="solid"/>
+          </a:ln>
+          <a:effectLst/>
+        </p:spPr>
+        <p:txBody>
+          <a:bodyPr anchor="ctr"/>
+          <a:lstStyle/>
+          <a:p>
+            <a:pPr marL="0" marR="0" lvl="0" indent="0" algn="ctr" defTabSz="914400" eaLnBrk="1" fontAlgn="base" latinLnBrk="0" hangingPunct="1">
+              <a:lnSpc>
+                <a:spcPct val="100000"/>
+              </a:lnSpc>
+              <a:spcBef>
+                <a:spcPct val="0"/>
+              </a:spcBef>
+              <a:spcAft>
+                <a:spcPct val="0"/>
+              </a:spcAft>
+              <a:buClrTx/>
+              <a:buSzTx/>
+              <a:buFontTx/>
+              <a:buNone/>
+              <a:tabLst/>
+              <a:defRPr/>
+            </a:pPr>
+            <a:endParaRPr kumimoji="0" lang="en-US" sz="2400" b="0" i="0" u="none" strike="noStrike" kern="0" cap="none" spc="0" normalizeH="0" baseline="0" noProof="0" dirty="0">
+              <a:ln>
+                <a:noFill/>
+              </a:ln>
+              <a:solidFill>
+                <a:prstClr val="white"/>
+              </a:solidFill>
+              <a:effectLst/>
+              <a:uLnTx/>
+              <a:uFillTx/>
+              <a:latin typeface="Lucida Sans Unicode"/>
+              <a:ea typeface="+mn-ea"/>
+              <a:cs typeface="+mn-cs"/>
+            </a:endParaRPr>
+          </a:p>
+        </p:txBody>
+      </p:sp>
+      <p:sp>
+        <p:nvSpPr>
+          <p:cNvPr id="202" name="Rectangle 201"/>
+          <p:cNvSpPr/>
+          <p:nvPr/>
+        </p:nvSpPr>
+        <p:spPr>
+          <a:xfrm>
+            <a:off x="2324357" y="3592365"/>
+            <a:ext cx="76200" cy="76200"/>
+          </a:xfrm>
+          <a:prstGeom prst="rect">
+            <a:avLst/>
+          </a:prstGeom>
+          <a:solidFill>
+            <a:srgbClr val="FF0000"/>
+          </a:solidFill>
+          <a:ln w="25400" cap="flat" cmpd="sng" algn="ctr">
+            <a:noFill/>
+            <a:prstDash val="solid"/>
+          </a:ln>
+          <a:effectLst/>
+        </p:spPr>
+        <p:txBody>
+          <a:bodyPr anchor="ctr"/>
+          <a:lstStyle/>
+          <a:p>
+            <a:pPr marL="0" marR="0" lvl="0" indent="0" algn="ctr" defTabSz="914400" eaLnBrk="1" fontAlgn="base" latinLnBrk="0" hangingPunct="1">
+              <a:lnSpc>
+                <a:spcPct val="100000"/>
+              </a:lnSpc>
+              <a:spcBef>
+                <a:spcPct val="0"/>
+              </a:spcBef>
+              <a:spcAft>
+                <a:spcPct val="0"/>
+              </a:spcAft>
+              <a:buClrTx/>
+              <a:buSzTx/>
+              <a:buFontTx/>
+              <a:buNone/>
+              <a:tabLst/>
+              <a:defRPr/>
+            </a:pPr>
+            <a:endParaRPr kumimoji="0" lang="en-US" sz="2400" b="0" i="0" u="none" strike="noStrike" kern="0" cap="none" spc="0" normalizeH="0" baseline="0" noProof="0" dirty="0">
+              <a:ln>
+                <a:noFill/>
+              </a:ln>
+              <a:solidFill>
+                <a:prstClr val="white"/>
+              </a:solidFill>
+              <a:effectLst/>
+              <a:uLnTx/>
+              <a:uFillTx/>
+              <a:latin typeface="Lucida Sans Unicode"/>
+              <a:ea typeface="+mn-ea"/>
+              <a:cs typeface="+mn-cs"/>
+            </a:endParaRPr>
+          </a:p>
+        </p:txBody>
+      </p:sp>
+      <p:sp>
+        <p:nvSpPr>
+          <p:cNvPr id="203" name="Rectangle 202"/>
+          <p:cNvSpPr/>
+          <p:nvPr/>
+        </p:nvSpPr>
+        <p:spPr>
+          <a:xfrm>
+            <a:off x="2705357" y="3744765"/>
+            <a:ext cx="76200" cy="76200"/>
+          </a:xfrm>
+          <a:prstGeom prst="rect">
+            <a:avLst/>
+          </a:prstGeom>
+          <a:solidFill>
+            <a:srgbClr val="FF0000"/>
+          </a:solidFill>
+          <a:ln w="25400" cap="flat" cmpd="sng" algn="ctr">
+            <a:noFill/>
+            <a:prstDash val="solid"/>
+          </a:ln>
+          <a:effectLst/>
+        </p:spPr>
+        <p:txBody>
+          <a:bodyPr anchor="ctr"/>
+          <a:lstStyle/>
+          <a:p>
+            <a:pPr marL="0" marR="0" lvl="0" indent="0" algn="ctr" defTabSz="914400" eaLnBrk="1" fontAlgn="base" latinLnBrk="0" hangingPunct="1">
+              <a:lnSpc>
+                <a:spcPct val="100000"/>
+              </a:lnSpc>
+              <a:spcBef>
+                <a:spcPct val="0"/>
+              </a:spcBef>
+              <a:spcAft>
+                <a:spcPct val="0"/>
+              </a:spcAft>
+              <a:buClrTx/>
+              <a:buSzTx/>
+              <a:buFontTx/>
+              <a:buNone/>
+              <a:tabLst/>
+              <a:defRPr/>
+            </a:pPr>
+            <a:endParaRPr kumimoji="0" lang="en-US" sz="2400" b="0" i="0" u="none" strike="noStrike" kern="0" cap="none" spc="0" normalizeH="0" baseline="0" noProof="0" dirty="0">
+              <a:ln>
+                <a:noFill/>
+              </a:ln>
+              <a:solidFill>
+                <a:prstClr val="white"/>
+              </a:solidFill>
+              <a:effectLst/>
+              <a:uLnTx/>
+              <a:uFillTx/>
+              <a:latin typeface="Lucida Sans Unicode"/>
+              <a:ea typeface="+mn-ea"/>
+              <a:cs typeface="+mn-cs"/>
+            </a:endParaRPr>
+          </a:p>
+        </p:txBody>
+      </p:sp>
+      <p:sp>
+        <p:nvSpPr>
+          <p:cNvPr id="204" name="Rectangle 203"/>
+          <p:cNvSpPr/>
+          <p:nvPr/>
+        </p:nvSpPr>
+        <p:spPr>
+          <a:xfrm>
+            <a:off x="2629157" y="3592365"/>
+            <a:ext cx="76200" cy="76200"/>
+          </a:xfrm>
+          <a:prstGeom prst="rect">
+            <a:avLst/>
+          </a:prstGeom>
+          <a:solidFill>
+            <a:srgbClr val="FF0000"/>
+          </a:solidFill>
+          <a:ln w="25400" cap="flat" cmpd="sng" algn="ctr">
+            <a:noFill/>
+            <a:prstDash val="solid"/>
+          </a:ln>
+          <a:effectLst/>
+        </p:spPr>
+        <p:txBody>
+          <a:bodyPr anchor="ctr"/>
+          <a:lstStyle/>
+          <a:p>
+            <a:pPr marL="0" marR="0" lvl="0" indent="0" algn="ctr" defTabSz="914400" eaLnBrk="1" fontAlgn="base" latinLnBrk="0" hangingPunct="1">
+              <a:lnSpc>
+                <a:spcPct val="100000"/>
+              </a:lnSpc>
+              <a:spcBef>
+                <a:spcPct val="0"/>
+              </a:spcBef>
+              <a:spcAft>
+                <a:spcPct val="0"/>
+              </a:spcAft>
+              <a:buClrTx/>
+              <a:buSzTx/>
+              <a:buFontTx/>
+              <a:buNone/>
+              <a:tabLst/>
+              <a:defRPr/>
+            </a:pPr>
+            <a:endParaRPr kumimoji="0" lang="en-US" sz="2400" b="0" i="0" u="none" strike="noStrike" kern="0" cap="none" spc="0" normalizeH="0" baseline="0" noProof="0" dirty="0">
+              <a:ln>
+                <a:noFill/>
+              </a:ln>
+              <a:solidFill>
+                <a:prstClr val="white"/>
+              </a:solidFill>
+              <a:effectLst/>
+              <a:uLnTx/>
+              <a:uFillTx/>
+              <a:latin typeface="Lucida Sans Unicode"/>
+              <a:ea typeface="+mn-ea"/>
+              <a:cs typeface="+mn-cs"/>
+            </a:endParaRPr>
+          </a:p>
+        </p:txBody>
+      </p:sp>
+      <p:sp>
+        <p:nvSpPr>
+          <p:cNvPr id="205" name="Rectangle 204"/>
+          <p:cNvSpPr/>
+          <p:nvPr/>
+        </p:nvSpPr>
+        <p:spPr>
+          <a:xfrm>
+            <a:off x="2400557" y="3820965"/>
+            <a:ext cx="76200" cy="76200"/>
+          </a:xfrm>
+          <a:prstGeom prst="rect">
+            <a:avLst/>
+          </a:prstGeom>
+          <a:solidFill>
+            <a:srgbClr val="FF0000"/>
+          </a:solidFill>
+          <a:ln w="25400" cap="flat" cmpd="sng" algn="ctr">
+            <a:noFill/>
+            <a:prstDash val="solid"/>
+          </a:ln>
+          <a:effectLst/>
+        </p:spPr>
+        <p:txBody>
+          <a:bodyPr anchor="ctr"/>
+          <a:lstStyle/>
+          <a:p>
+            <a:pPr marL="0" marR="0" lvl="0" indent="0" algn="ctr" defTabSz="914400" eaLnBrk="1" fontAlgn="base" latinLnBrk="0" hangingPunct="1">
+              <a:lnSpc>
+                <a:spcPct val="100000"/>
+              </a:lnSpc>
+              <a:spcBef>
+                <a:spcPct val="0"/>
+              </a:spcBef>
+              <a:spcAft>
+                <a:spcPct val="0"/>
+              </a:spcAft>
+              <a:buClrTx/>
+              <a:buSzTx/>
+              <a:buFontTx/>
+              <a:buNone/>
+              <a:tabLst/>
+              <a:defRPr/>
+            </a:pPr>
+            <a:endParaRPr kumimoji="0" lang="en-US" sz="2400" b="0" i="0" u="none" strike="noStrike" kern="0" cap="none" spc="0" normalizeH="0" baseline="0" noProof="0" dirty="0">
+              <a:ln>
+                <a:noFill/>
+              </a:ln>
+              <a:solidFill>
+                <a:prstClr val="white"/>
+              </a:solidFill>
+              <a:effectLst/>
+              <a:uLnTx/>
+              <a:uFillTx/>
+              <a:latin typeface="Lucida Sans Unicode"/>
+              <a:ea typeface="+mn-ea"/>
+              <a:cs typeface="+mn-cs"/>
+            </a:endParaRPr>
+          </a:p>
+        </p:txBody>
+      </p:sp>
+      <p:sp>
+        <p:nvSpPr>
+          <p:cNvPr id="206" name="Rectangle 205"/>
+          <p:cNvSpPr/>
+          <p:nvPr/>
+        </p:nvSpPr>
+        <p:spPr>
+          <a:xfrm>
+            <a:off x="2400557" y="4049565"/>
+            <a:ext cx="76200" cy="76200"/>
+          </a:xfrm>
+          <a:prstGeom prst="rect">
+            <a:avLst/>
+          </a:prstGeom>
+          <a:solidFill>
+            <a:srgbClr val="FF0000"/>
+          </a:solidFill>
+          <a:ln w="25400" cap="flat" cmpd="sng" algn="ctr">
+            <a:noFill/>
+            <a:prstDash val="solid"/>
+          </a:ln>
+          <a:effectLst/>
+        </p:spPr>
+        <p:txBody>
+          <a:bodyPr anchor="ctr"/>
+          <a:lstStyle/>
+          <a:p>
+            <a:pPr marL="0" marR="0" lvl="0" indent="0" algn="ctr" defTabSz="914400" eaLnBrk="1" fontAlgn="base" latinLnBrk="0" hangingPunct="1">
+              <a:lnSpc>
+                <a:spcPct val="100000"/>
+              </a:lnSpc>
+              <a:spcBef>
+                <a:spcPct val="0"/>
+              </a:spcBef>
+              <a:spcAft>
+                <a:spcPct val="0"/>
+              </a:spcAft>
+              <a:buClrTx/>
+              <a:buSzTx/>
+              <a:buFontTx/>
+              <a:buNone/>
+              <a:tabLst/>
+              <a:defRPr/>
+            </a:pPr>
+            <a:endParaRPr kumimoji="0" lang="en-US" sz="2400" b="0" i="0" u="none" strike="noStrike" kern="0" cap="none" spc="0" normalizeH="0" baseline="0" noProof="0" dirty="0">
+              <a:ln>
+                <a:noFill/>
+              </a:ln>
+              <a:solidFill>
+                <a:prstClr val="white"/>
+              </a:solidFill>
+              <a:effectLst/>
+              <a:uLnTx/>
+              <a:uFillTx/>
+              <a:latin typeface="Lucida Sans Unicode"/>
+              <a:ea typeface="+mn-ea"/>
+              <a:cs typeface="+mn-cs"/>
+            </a:endParaRPr>
+          </a:p>
+        </p:txBody>
+      </p:sp>
+      <p:sp>
+        <p:nvSpPr>
+          <p:cNvPr id="207" name="Rectangle 206"/>
+          <p:cNvSpPr/>
+          <p:nvPr/>
+        </p:nvSpPr>
+        <p:spPr>
+          <a:xfrm>
+            <a:off x="2248157" y="3516165"/>
+            <a:ext cx="76200" cy="76200"/>
+          </a:xfrm>
+          <a:prstGeom prst="rect">
+            <a:avLst/>
+          </a:prstGeom>
+          <a:solidFill>
+            <a:srgbClr val="FF0000"/>
+          </a:solidFill>
+          <a:ln w="25400" cap="flat" cmpd="sng" algn="ctr">
+            <a:noFill/>
+            <a:prstDash val="solid"/>
+          </a:ln>
+          <a:effectLst/>
+        </p:spPr>
+        <p:txBody>
+          <a:bodyPr anchor="ctr"/>
+          <a:lstStyle/>
+          <a:p>
+            <a:pPr marL="0" marR="0" lvl="0" indent="0" algn="ctr" defTabSz="914400" eaLnBrk="1" fontAlgn="base" latinLnBrk="0" hangingPunct="1">
+              <a:lnSpc>
+                <a:spcPct val="100000"/>
+              </a:lnSpc>
+              <a:spcBef>
+                <a:spcPct val="0"/>
+              </a:spcBef>
+              <a:spcAft>
+                <a:spcPct val="0"/>
+              </a:spcAft>
+              <a:buClrTx/>
+              <a:buSzTx/>
+              <a:buFontTx/>
+              <a:buNone/>
+              <a:tabLst/>
+              <a:defRPr/>
+            </a:pPr>
+            <a:endParaRPr kumimoji="0" lang="en-US" sz="2400" b="0" i="0" u="none" strike="noStrike" kern="0" cap="none" spc="0" normalizeH="0" baseline="0" noProof="0" dirty="0">
+              <a:ln>
+                <a:noFill/>
+              </a:ln>
+              <a:solidFill>
+                <a:prstClr val="white"/>
+              </a:solidFill>
+              <a:effectLst/>
+              <a:uLnTx/>
+              <a:uFillTx/>
+              <a:latin typeface="Lucida Sans Unicode"/>
+              <a:ea typeface="+mn-ea"/>
+              <a:cs typeface="+mn-cs"/>
+            </a:endParaRPr>
+          </a:p>
+        </p:txBody>
+      </p:sp>
+      <p:sp>
+        <p:nvSpPr>
+          <p:cNvPr id="208" name="Rectangle 207"/>
+          <p:cNvSpPr/>
+          <p:nvPr/>
+        </p:nvSpPr>
+        <p:spPr>
+          <a:xfrm>
+            <a:off x="2324357" y="3668565"/>
+            <a:ext cx="76200" cy="76200"/>
+          </a:xfrm>
+          <a:prstGeom prst="rect">
+            <a:avLst/>
+          </a:prstGeom>
+          <a:solidFill>
+            <a:srgbClr val="FF0000"/>
+          </a:solidFill>
+          <a:ln w="0" cap="flat" cmpd="sng" algn="ctr">
+            <a:noFill/>
+            <a:prstDash val="solid"/>
+          </a:ln>
+          <a:effectLst/>
+        </p:spPr>
+        <p:txBody>
+          <a:bodyPr anchor="ctr"/>
+          <a:lstStyle/>
+          <a:p>
+            <a:pPr marL="0" marR="0" lvl="0" indent="0" algn="ctr" defTabSz="914400" eaLnBrk="1" fontAlgn="base" latinLnBrk="0" hangingPunct="1">
+              <a:lnSpc>
+                <a:spcPct val="100000"/>
+              </a:lnSpc>
+              <a:spcBef>
+                <a:spcPct val="0"/>
+              </a:spcBef>
+              <a:spcAft>
+                <a:spcPct val="0"/>
+              </a:spcAft>
+              <a:buClrTx/>
+              <a:buSzTx/>
+              <a:buFontTx/>
+              <a:buNone/>
+              <a:tabLst/>
+              <a:defRPr/>
+            </a:pPr>
+            <a:endParaRPr kumimoji="0" lang="en-US" sz="2400" b="0" i="0" u="none" strike="noStrike" kern="0" cap="none" spc="0" normalizeH="0" baseline="0" noProof="0" dirty="0">
+              <a:ln>
+                <a:noFill/>
+              </a:ln>
+              <a:solidFill>
+                <a:prstClr val="white"/>
+              </a:solidFill>
+              <a:effectLst/>
+              <a:uLnTx/>
+              <a:uFillTx/>
+              <a:latin typeface="Lucida Sans Unicode"/>
+              <a:ea typeface="+mn-ea"/>
+              <a:cs typeface="+mn-cs"/>
+            </a:endParaRPr>
+          </a:p>
+        </p:txBody>
+      </p:sp>
+      <p:sp>
+        <p:nvSpPr>
+          <p:cNvPr id="209" name="Rectangle 208"/>
+          <p:cNvSpPr/>
+          <p:nvPr/>
+        </p:nvSpPr>
+        <p:spPr>
+          <a:xfrm>
+            <a:off x="2705357" y="3897165"/>
+            <a:ext cx="76200" cy="76200"/>
+          </a:xfrm>
+          <a:prstGeom prst="rect">
+            <a:avLst/>
+          </a:prstGeom>
+          <a:solidFill>
+            <a:srgbClr val="FF0000"/>
+          </a:solidFill>
+          <a:ln w="25400" cap="flat" cmpd="sng" algn="ctr">
+            <a:noFill/>
+            <a:prstDash val="solid"/>
+          </a:ln>
+          <a:effectLst/>
+        </p:spPr>
+        <p:txBody>
+          <a:bodyPr anchor="ctr"/>
+          <a:lstStyle/>
+          <a:p>
+            <a:pPr marL="0" marR="0" lvl="0" indent="0" algn="ctr" defTabSz="914400" eaLnBrk="1" fontAlgn="base" latinLnBrk="0" hangingPunct="1">
+              <a:lnSpc>
+                <a:spcPct val="100000"/>
+              </a:lnSpc>
+              <a:spcBef>
+                <a:spcPct val="0"/>
+              </a:spcBef>
+              <a:spcAft>
+                <a:spcPct val="0"/>
+              </a:spcAft>
+              <a:buClrTx/>
+              <a:buSzTx/>
+              <a:buFontTx/>
+              <a:buNone/>
+              <a:tabLst/>
+              <a:defRPr/>
+            </a:pPr>
+            <a:endParaRPr kumimoji="0" lang="en-US" sz="2400" b="0" i="0" u="none" strike="noStrike" kern="0" cap="none" spc="0" normalizeH="0" baseline="0" noProof="0" dirty="0">
+              <a:ln>
+                <a:noFill/>
+              </a:ln>
+              <a:solidFill>
+                <a:prstClr val="white"/>
+              </a:solidFill>
+              <a:effectLst/>
+              <a:uLnTx/>
+              <a:uFillTx/>
+              <a:latin typeface="Lucida Sans Unicode"/>
+              <a:ea typeface="+mn-ea"/>
+              <a:cs typeface="+mn-cs"/>
+            </a:endParaRPr>
+          </a:p>
+        </p:txBody>
+      </p:sp>
+      <p:sp>
+        <p:nvSpPr>
+          <p:cNvPr id="2" name="Title 1"/>
+          <p:cNvSpPr>
+            <a:spLocks noGrp="1"/>
+          </p:cNvSpPr>
+          <p:nvPr>
+            <p:ph type="title"/>
+          </p:nvPr>
+        </p:nvSpPr>
+        <p:spPr/>
+        <p:txBody>
+          <a:bodyPr>
+            <a:normAutofit/>
+          </a:bodyPr>
+          <a:lstStyle/>
+          <a:p>
             <a:r>
               <a:rPr lang="en-US" dirty="0" smtClean="0"/>
-              <a:t>different </a:t>
-            </a:r>
-            <a:r>
-              <a:rPr lang="en-US" dirty="0"/>
-              <a:t>languages/paradigms, can overlap in time and on processors, without programmer having to worry about this </a:t>
-            </a:r>
-            <a:r>
-              <a:rPr lang="en-US" dirty="0" smtClean="0"/>
-              <a:t>explicitly</a:t>
+              <a:t>Modularity and Compositionality</a:t>
             </a:r>
             <a:endParaRPr lang="en-US" dirty="0"/>
+          </a:p>
+        </p:txBody>
+      </p:sp>
+      <p:sp>
+        <p:nvSpPr>
+          <p:cNvPr id="6" name="Footer Placeholder 5"/>
+          <p:cNvSpPr>
+            <a:spLocks noGrp="1"/>
+          </p:cNvSpPr>
+          <p:nvPr>
+            <p:ph type="ftr" sz="quarter" idx="11"/>
+          </p:nvPr>
+        </p:nvSpPr>
+        <p:spPr/>
+        <p:txBody>
+          <a:bodyPr/>
+          <a:lstStyle/>
+          <a:p>
+            <a:pPr algn="r"/>
+            <a:r>
+              <a:rPr lang="en-US" smtClean="0"/>
+              <a:t>Laxmikant Kalé and PPL (UIUC) – Parallel Migratable Objects </a:t>
+            </a:r>
+            <a:endParaRPr lang="en-US" dirty="0"/>
+          </a:p>
+        </p:txBody>
+      </p:sp>
+      <p:sp>
+        <p:nvSpPr>
+          <p:cNvPr id="7" name="Slide Number Placeholder 6"/>
+          <p:cNvSpPr>
+            <a:spLocks noGrp="1"/>
+          </p:cNvSpPr>
+          <p:nvPr>
+            <p:ph type="sldNum" sz="quarter" idx="12"/>
+          </p:nvPr>
+        </p:nvSpPr>
+        <p:spPr/>
+        <p:txBody>
+          <a:bodyPr/>
+          <a:lstStyle/>
+          <a:p>
+            <a:fld id="{0CFEC368-1D7A-4F81-ABF6-AE0E36BAF64C}" type="slidenum">
+              <a:rPr lang="en-US" smtClean="0"/>
+              <a:pPr/>
+              <a:t>6</a:t>
+            </a:fld>
+            <a:endParaRPr lang="en-US"/>
           </a:p>
         </p:txBody>
       </p:sp>
     </p:spTree>
     <p:extLst>
       <p:ext uri="{BB962C8B-B14F-4D97-AF65-F5344CB8AC3E}">
-        <p14:creationId xmlns:p14="http://schemas.microsoft.com/office/powerpoint/2010/main" val="3033491935"/>
+        <p14:creationId xmlns:p14="http://schemas.microsoft.com/office/powerpoint/2010/main" val="2289081499"/>
       </p:ext>
     </p:extLst>
   </p:cSld>
   <p:clrMapOvr>
     <a:masterClrMapping/>
   </p:clrMapOvr>
+  <mc:AlternateContent xmlns:mc="http://schemas.openxmlformats.org/markup-compatibility/2006">
+    <mc:Choice xmlns:p14="http://schemas.microsoft.com/office/powerpoint/2010/main" Requires="p14">
+      <p:transition spd="slow" p14:dur="2000"/>
+    </mc:Choice>
+    <mc:Fallback>
+      <p:transition xmlns:p14="http://schemas.microsoft.com/office/powerpoint/2010/main" spd="slow"/>
+    </mc:Fallback>
+  </mc:AlternateContent>
   <p:timing>
     <p:tnLst>
       <p:par>
-        <p:cTn xmlns:p14="http://schemas.microsoft.com/office/powerpoint/2010/main" id="1" dur="indefinite" restart="never" nodeType="tmRoot"/>
+        <p:cTn xmlns:p14="http://schemas.microsoft.com/office/powerpoint/2010/main" id="1" dur="indefinite" restart="never" nodeType="tmRoot">
+          <p:childTnLst>
+            <p:seq concurrent="1" nextAc="seek">
+              <p:cTn id="2" dur="indefinite" nodeType="mainSeq">
+                <p:childTnLst>
+                  <p:par>
+                    <p:cTn id="3" fill="hold">
+                      <p:stCondLst>
+                        <p:cond delay="indefinite"/>
+                      </p:stCondLst>
+                      <p:childTnLst>
+                        <p:par>
+                          <p:cTn id="4" fill="hold">
+                            <p:stCondLst>
+                              <p:cond delay="0"/>
+                            </p:stCondLst>
+                            <p:childTnLst>
+                              <p:par>
+                                <p:cTn id="5" presetID="0" presetClass="path" presetSubtype="0" accel="50000" decel="50000" fill="hold" grpId="0" nodeType="clickEffect">
+                                  <p:stCondLst>
+                                    <p:cond delay="0"/>
+                                  </p:stCondLst>
+                                  <p:childTnLst>
+                                    <p:animMotion origin="layout" path="M 6.66667E-6 4.16281E-7 C 0.00591 -0.02035 0.01181 -0.04048 0.02587 -0.07563 C 0.03994 -0.11078 0.06424 -0.18872 0.08386 -0.21046 C 0.10348 -0.2322 0.12327 -0.21901 0.14306 -0.2056 " pathEditMode="relative" ptsTypes="aaaA">
+                                      <p:cBhvr>
+                                        <p:cTn id="6" dur="2000" fill="hold"/>
+                                        <p:tgtEl>
+                                          <p:spTgt spid="198"/>
+                                        </p:tgtEl>
+                                        <p:attrNameLst>
+                                          <p:attrName>ppt_x</p:attrName>
+                                          <p:attrName>ppt_y</p:attrName>
+                                        </p:attrNameLst>
+                                      </p:cBhvr>
+                                    </p:animMotion>
+                                  </p:childTnLst>
+                                </p:cTn>
+                              </p:par>
+                              <p:par>
+                                <p:cTn id="7" presetID="0" presetClass="path" presetSubtype="0" accel="50000" decel="50000" fill="hold" grpId="0" nodeType="withEffect">
+                                  <p:stCondLst>
+                                    <p:cond delay="0"/>
+                                  </p:stCondLst>
+                                  <p:childTnLst>
+                                    <p:animMotion origin="layout" path="M -0.0125 -0.00509 C 0.00139 -0.06042 0.01528 -0.11551 0.03681 -0.1382 C 0.05833 -0.16111 0.08767 -0.15208 0.11701 -0.14306 " pathEditMode="relative" rAng="0" ptsTypes="aaA">
+                                      <p:cBhvr>
+                                        <p:cTn id="8" dur="2000" fill="hold"/>
+                                        <p:tgtEl>
+                                          <p:spTgt spid="204"/>
+                                        </p:tgtEl>
+                                        <p:attrNameLst>
+                                          <p:attrName>ppt_x</p:attrName>
+                                          <p:attrName>ppt_y</p:attrName>
+                                        </p:attrNameLst>
+                                      </p:cBhvr>
+                                      <p:rCtr x="6500" y="-7800"/>
+                                    </p:animMotion>
+                                  </p:childTnLst>
+                                </p:cTn>
+                              </p:par>
+                              <p:par>
+                                <p:cTn id="9" presetID="0" presetClass="path" presetSubtype="0" accel="50000" decel="50000" fill="hold" grpId="0" nodeType="withEffect">
+                                  <p:stCondLst>
+                                    <p:cond delay="0"/>
+                                  </p:stCondLst>
+                                  <p:childTnLst>
+                                    <p:animMotion origin="layout" path="M 0.02083 -0.03032 C 0.02552 -0.03842 0.03021 -0.04629 0.05174 -0.05509 C 0.07326 -0.06389 0.1309 -0.0824 0.15035 -0.08287 C 0.16979 -0.08333 0.16615 -0.06227 0.16892 -0.05833 " pathEditMode="relative" rAng="0" ptsTypes="aaaA">
+                                      <p:cBhvr>
+                                        <p:cTn id="10" dur="2000" fill="hold"/>
+                                        <p:tgtEl>
+                                          <p:spTgt spid="195"/>
+                                        </p:tgtEl>
+                                        <p:attrNameLst>
+                                          <p:attrName>ppt_x</p:attrName>
+                                          <p:attrName>ppt_y</p:attrName>
+                                        </p:attrNameLst>
+                                      </p:cBhvr>
+                                      <p:rCtr x="7400" y="-2700"/>
+                                    </p:animMotion>
+                                  </p:childTnLst>
+                                </p:cTn>
+                              </p:par>
+                              <p:par>
+                                <p:cTn id="11" presetID="0" presetClass="path" presetSubtype="0" accel="50000" decel="50000" fill="hold" grpId="0" nodeType="withEffect">
+                                  <p:stCondLst>
+                                    <p:cond delay="0"/>
+                                  </p:stCondLst>
+                                  <p:childTnLst>
+                                    <p:animMotion origin="layout" path="M 0.01528 -0.05111 C 0.02778 -0.08857 0.04028 -0.12604 0.04497 -0.1531 C 0.04966 -0.18016 0.04445 -0.18293 0.04375 -0.21392 C 0.04306 -0.24491 0.0323 -0.31337 0.04115 -0.33904 C 0.05 -0.36471 0.08577 -0.36656 0.0967 -0.36864 C 0.10764 -0.37072 0.10504 -0.35499 0.1066 -0.35222 " pathEditMode="relative" ptsTypes="aaaaaA">
+                                      <p:cBhvr>
+                                        <p:cTn id="12" dur="2000" fill="hold"/>
+                                        <p:tgtEl>
+                                          <p:spTgt spid="209"/>
+                                        </p:tgtEl>
+                                        <p:attrNameLst>
+                                          <p:attrName>ppt_x</p:attrName>
+                                          <p:attrName>ppt_y</p:attrName>
+                                        </p:attrNameLst>
+                                      </p:cBhvr>
+                                    </p:animMotion>
+                                  </p:childTnLst>
+                                </p:cTn>
+                              </p:par>
+                              <p:par>
+                                <p:cTn id="13" presetID="0" presetClass="path" presetSubtype="0" accel="50000" decel="50000" fill="hold" grpId="0" nodeType="withEffect">
+                                  <p:stCondLst>
+                                    <p:cond delay="0"/>
+                                  </p:stCondLst>
+                                  <p:childTnLst>
+                                    <p:animMotion origin="layout" path="M 0.00174 -0.05989 C 0.01597 -0.0784 0.03021 -0.0969 0.05729 -0.1043 C 0.08438 -0.1117 0.14583 -0.10083 0.16458 -0.1043 C 0.18333 -0.10777 0.17639 -0.11679 0.16962 -0.12557 " pathEditMode="relative" ptsTypes="aaaA">
+                                      <p:cBhvr>
+                                        <p:cTn id="14" dur="2000" fill="hold"/>
+                                        <p:tgtEl>
+                                          <p:spTgt spid="191"/>
+                                        </p:tgtEl>
+                                        <p:attrNameLst>
+                                          <p:attrName>ppt_x</p:attrName>
+                                          <p:attrName>ppt_y</p:attrName>
+                                        </p:attrNameLst>
+                                      </p:cBhvr>
+                                    </p:animMotion>
+                                  </p:childTnLst>
+                                </p:cTn>
+                              </p:par>
+                              <p:par>
+                                <p:cTn id="15" presetID="0" presetClass="path" presetSubtype="0" accel="50000" decel="50000" fill="hold" grpId="1" nodeType="withEffect">
+                                  <p:stCondLst>
+                                    <p:cond delay="0"/>
+                                  </p:stCondLst>
+                                  <p:childTnLst>
+                                    <p:animMotion origin="layout" path="M 0.00417 0.00556 C 0.02552 0.01505 0.04688 0.02454 0.06719 0.02685 C 0.0875 0.02917 0.11111 0.01435 0.12639 0.01875 C 0.14167 0.02315 0.15 0.03819 0.15851 0.05324 " pathEditMode="relative" rAng="0" ptsTypes="aaaA">
+                                      <p:cBhvr>
+                                        <p:cTn id="16" dur="2000" fill="hold"/>
+                                        <p:tgtEl>
+                                          <p:spTgt spid="191"/>
+                                        </p:tgtEl>
+                                        <p:attrNameLst>
+                                          <p:attrName>ppt_x</p:attrName>
+                                          <p:attrName>ppt_y</p:attrName>
+                                        </p:attrNameLst>
+                                      </p:cBhvr>
+                                      <p:rCtr x="7700" y="2400"/>
+                                    </p:animMotion>
+                                  </p:childTnLst>
+                                </p:cTn>
+                              </p:par>
+                              <p:par>
+                                <p:cTn id="17" presetID="0" presetClass="path" presetSubtype="0" accel="50000" decel="50000" fill="hold" grpId="0" nodeType="withEffect">
+                                  <p:stCondLst>
+                                    <p:cond delay="0"/>
+                                  </p:stCondLst>
+                                  <p:childTnLst>
+                                    <p:animMotion origin="layout" path="M 7.5E-6 3.33333E-6 C 0.01442 0.02731 0.02883 0.05463 0.04428 0.07222 C 0.05973 0.08981 0.0724 0.09768 0.09324 0.10555 C 0.11407 0.11342 0.15504 0.11505 0.1698 0.11944 C 0.18455 0.12384 0.18334 0.12778 0.1823 0.13194 " pathEditMode="relative" ptsTypes="aaaaA">
+                                      <p:cBhvr>
+                                        <p:cTn id="18" dur="2000" fill="hold"/>
+                                        <p:tgtEl>
+                                          <p:spTgt spid="192"/>
+                                        </p:tgtEl>
+                                        <p:attrNameLst>
+                                          <p:attrName>ppt_x</p:attrName>
+                                          <p:attrName>ppt_y</p:attrName>
+                                        </p:attrNameLst>
+                                      </p:cBhvr>
+                                    </p:animMotion>
+                                  </p:childTnLst>
+                                </p:cTn>
+                              </p:par>
+                              <p:par>
+                                <p:cTn id="19" presetID="0" presetClass="path" presetSubtype="0" accel="50000" decel="50000" fill="hold" grpId="1" nodeType="withEffect">
+                                  <p:stCondLst>
+                                    <p:cond delay="0"/>
+                                  </p:stCondLst>
+                                  <p:childTnLst>
+                                    <p:animMotion origin="layout" path="M 0.0375 0.00625 C 0.04705 0.00787 0.05677 0.00973 0.07135 0.00973 C 0.08594 0.00973 0.10642 0.00556 0.125 0.00556 C 0.14358 0.00556 0.17413 0.00695 0.18281 0.00903 C 0.19149 0.01111 0.1842 0.01482 0.17708 0.01875 " pathEditMode="relative" rAng="0" ptsTypes="aaaaA">
+                                      <p:cBhvr>
+                                        <p:cTn id="20" dur="2000" fill="hold"/>
+                                        <p:tgtEl>
+                                          <p:spTgt spid="195"/>
+                                        </p:tgtEl>
+                                        <p:attrNameLst>
+                                          <p:attrName>ppt_x</p:attrName>
+                                          <p:attrName>ppt_y</p:attrName>
+                                        </p:attrNameLst>
+                                      </p:cBhvr>
+                                      <p:rCtr x="7700" y="600"/>
+                                    </p:animMotion>
+                                  </p:childTnLst>
+                                </p:cTn>
+                              </p:par>
+                              <p:par>
+                                <p:cTn id="21" presetID="0" presetClass="path" presetSubtype="0" accel="50000" decel="50000" fill="hold" grpId="0" nodeType="withEffect">
+                                  <p:stCondLst>
+                                    <p:cond delay="0"/>
+                                  </p:stCondLst>
+                                  <p:childTnLst>
+                                    <p:animMotion origin="layout" path="M 0.00365 -0.01111 C 0.0066 -0.01528 0.00973 -0.01922 0.01615 -0.02153 C 0.02257 -0.02384 0.02414 -0.02431 0.04271 -0.025 C 0.06129 -0.0257 0.10903 -0.0257 0.12761 -0.0257 C 0.14618 -0.0257 0.15035 -0.0257 0.15469 -0.0257 " pathEditMode="relative" ptsTypes="aaaaA">
+                                      <p:cBhvr>
+                                        <p:cTn id="22" dur="2000" fill="hold"/>
+                                        <p:tgtEl>
+                                          <p:spTgt spid="207"/>
+                                        </p:tgtEl>
+                                        <p:attrNameLst>
+                                          <p:attrName>ppt_x</p:attrName>
+                                          <p:attrName>ppt_y</p:attrName>
+                                        </p:attrNameLst>
+                                      </p:cBhvr>
+                                    </p:animMotion>
+                                  </p:childTnLst>
+                                </p:cTn>
+                              </p:par>
+                              <p:par>
+                                <p:cTn id="23" presetID="0" presetClass="path" presetSubtype="0" accel="50000" decel="50000" fill="hold" grpId="0" nodeType="withEffect">
+                                  <p:stCondLst>
+                                    <p:cond delay="0"/>
+                                  </p:stCondLst>
+                                  <p:childTnLst>
+                                    <p:animMotion origin="layout" path="M -3.33333E-6 6.66667E-6 C 0.00503 -0.00694 0.01007 -0.01365 0.02083 -0.02708 C 0.0316 -0.0405 0.04444 -0.06851 0.06406 -0.08055 C 0.08368 -0.09259 0.12326 -0.08819 0.13802 -0.09861 C 0.15278 -0.10902 0.1526 -0.12615 0.1526 -0.14305 " pathEditMode="relative" ptsTypes="aaaaA">
+                                      <p:cBhvr>
+                                        <p:cTn id="24" dur="2000" fill="hold"/>
+                                        <p:tgtEl>
+                                          <p:spTgt spid="194"/>
+                                        </p:tgtEl>
+                                        <p:attrNameLst>
+                                          <p:attrName>ppt_x</p:attrName>
+                                          <p:attrName>ppt_y</p:attrName>
+                                        </p:attrNameLst>
+                                      </p:cBhvr>
+                                    </p:animMotion>
+                                  </p:childTnLst>
+                                </p:cTn>
+                              </p:par>
+                              <p:par>
+                                <p:cTn id="25" presetID="0" presetClass="path" presetSubtype="0" accel="50000" decel="50000" fill="hold" grpId="0" nodeType="withEffect">
+                                  <p:stCondLst>
+                                    <p:cond delay="0"/>
+                                  </p:stCondLst>
+                                  <p:childTnLst>
+                                    <p:animMotion origin="layout" path="M 0.01355 0.00347 C 0.03907 0.01157 0.06459 0.01967 0.08646 0.02638 C 0.10834 0.0331 0.125 0.03379 0.14532 0.04375 C 0.16563 0.0537 0.19792 0.07754 0.20886 0.08611 C 0.2198 0.09467 0.21528 0.0949 0.21094 0.09513 " pathEditMode="relative" ptsTypes="aaaaA">
+                                      <p:cBhvr>
+                                        <p:cTn id="26" dur="2000" fill="hold"/>
+                                        <p:tgtEl>
+                                          <p:spTgt spid="193"/>
+                                        </p:tgtEl>
+                                        <p:attrNameLst>
+                                          <p:attrName>ppt_x</p:attrName>
+                                          <p:attrName>ppt_y</p:attrName>
+                                        </p:attrNameLst>
+                                      </p:cBhvr>
+                                    </p:animMotion>
+                                  </p:childTnLst>
+                                </p:cTn>
+                              </p:par>
+                              <p:par>
+                                <p:cTn id="27" presetID="0" presetClass="path" presetSubtype="0" accel="50000" decel="50000" fill="hold" grpId="0" nodeType="withEffect">
+                                  <p:stCondLst>
+                                    <p:cond delay="0"/>
+                                  </p:stCondLst>
+                                  <p:childTnLst>
+                                    <p:animMotion origin="layout" path="M 0.02083 -0.00649 C 0.03298 -0.0007 0.04514 0.00532 0.06198 -0.01135 C 0.07882 -0.02801 0.10607 -0.08565 0.12239 -0.10649 C 0.13871 -0.12732 0.14566 -0.1338 0.16041 -0.13635 C 0.17517 -0.13889 0.2033 -0.12917 0.21146 -0.12176 C 0.21961 -0.11436 0.20972 -0.0963 0.20937 -0.09121 " pathEditMode="relative" rAng="0" ptsTypes="aaaaaA">
+                                      <p:cBhvr>
+                                        <p:cTn id="28" dur="2000" fill="hold"/>
+                                        <p:tgtEl>
+                                          <p:spTgt spid="196"/>
+                                        </p:tgtEl>
+                                        <p:attrNameLst>
+                                          <p:attrName>ppt_x</p:attrName>
+                                          <p:attrName>ppt_y</p:attrName>
+                                        </p:attrNameLst>
+                                      </p:cBhvr>
+                                      <p:rCtr x="9900" y="-6000"/>
+                                    </p:animMotion>
+                                  </p:childTnLst>
+                                </p:cTn>
+                              </p:par>
+                              <p:par>
+                                <p:cTn id="29" presetID="0" presetClass="path" presetSubtype="0" accel="50000" decel="50000" fill="hold" grpId="0" nodeType="withEffect">
+                                  <p:stCondLst>
+                                    <p:cond delay="0"/>
+                                  </p:stCondLst>
+                                  <p:childTnLst>
+                                    <p:animMotion origin="layout" path="M 5E-6 1.11111E-6 C 0.0132 -0.00186 0.02657 -0.00348 0.0547 -0.00209 C 0.08282 -0.0007 0.13786 0.00509 0.16876 0.00833 C 0.19966 0.01157 0.22223 0.00648 0.24011 0.01736 C 0.25799 0.02824 0.26668 0.05092 0.27553 0.07361 " pathEditMode="relative" ptsTypes="aaaaA">
+                                      <p:cBhvr>
+                                        <p:cTn id="30" dur="2000" fill="hold"/>
+                                        <p:tgtEl>
+                                          <p:spTgt spid="197"/>
+                                        </p:tgtEl>
+                                        <p:attrNameLst>
+                                          <p:attrName>ppt_x</p:attrName>
+                                          <p:attrName>ppt_y</p:attrName>
+                                        </p:attrNameLst>
+                                      </p:cBhvr>
+                                    </p:animMotion>
+                                  </p:childTnLst>
+                                </p:cTn>
+                              </p:par>
+                              <p:par>
+                                <p:cTn id="31" presetID="0" presetClass="path" presetSubtype="0" accel="50000" decel="50000" fill="hold" grpId="0" nodeType="withEffect">
+                                  <p:stCondLst>
+                                    <p:cond delay="0"/>
+                                  </p:stCondLst>
+                                  <p:childTnLst>
+                                    <p:animMotion origin="layout" path="M -7.5E-6 -2.22222E-6 C 0.04496 -0.00417 0.0901 -0.0081 0.11927 -0.00764 C 0.14843 -0.00717 0.15642 0.00556 0.17552 0.00347 C 0.19461 0.00139 0.22187 -0.01204 0.23385 -0.02014 C 0.24583 -0.02824 0.24652 -0.03704 0.24739 -0.04583 " pathEditMode="relative" ptsTypes="aaaaA">
+                                      <p:cBhvr>
+                                        <p:cTn id="32" dur="2000" fill="hold"/>
+                                        <p:tgtEl>
+                                          <p:spTgt spid="202"/>
+                                        </p:tgtEl>
+                                        <p:attrNameLst>
+                                          <p:attrName>ppt_x</p:attrName>
+                                          <p:attrName>ppt_y</p:attrName>
+                                        </p:attrNameLst>
+                                      </p:cBhvr>
+                                    </p:animMotion>
+                                  </p:childTnLst>
+                                </p:cTn>
+                              </p:par>
+                              <p:par>
+                                <p:cTn id="33" presetID="0" presetClass="path" presetSubtype="0" accel="50000" decel="50000" fill="hold" grpId="0" nodeType="withEffect">
+                                  <p:stCondLst>
+                                    <p:cond delay="0"/>
+                                  </p:stCondLst>
+                                  <p:childTnLst>
+                                    <p:animMotion origin="layout" path="M 0.00416 0.00417 C 0.00573 -0.01296 0.00746 -0.03009 0.01146 -0.04444 C 0.01545 -0.0588 0.00521 -0.07176 0.02812 -0.08264 C 0.05104 -0.09352 0.12326 -0.09861 0.14896 -0.10972 C 0.17465 -0.12083 0.17864 -0.13542 0.18281 -0.15 " pathEditMode="relative" rAng="0" ptsTypes="aaaaA">
+                                      <p:cBhvr>
+                                        <p:cTn id="34" dur="2000" fill="hold"/>
+                                        <p:tgtEl>
+                                          <p:spTgt spid="208"/>
+                                        </p:tgtEl>
+                                        <p:attrNameLst>
+                                          <p:attrName>ppt_x</p:attrName>
+                                          <p:attrName>ppt_y</p:attrName>
+                                        </p:attrNameLst>
+                                      </p:cBhvr>
+                                      <p:rCtr x="8900" y="-7700"/>
+                                    </p:animMotion>
+                                  </p:childTnLst>
+                                </p:cTn>
+                              </p:par>
+                              <p:par>
+                                <p:cTn id="35" presetID="0" presetClass="path" presetSubtype="0" accel="50000" decel="50000" fill="hold" grpId="0" nodeType="withEffect">
+                                  <p:stCondLst>
+                                    <p:cond delay="0"/>
+                                  </p:stCondLst>
+                                  <p:childTnLst>
+                                    <p:animMotion origin="layout" path="M -4.16667E-6 -1.11111E-6 C -4.16667E-6 0.0044 -4.16667E-6 0.00903 0.01459 0.01459 C 0.02917 0.02014 0.06875 0.06459 0.0875 0.03403 C 0.10625 0.00347 0.11129 -0.1125 0.12709 -0.16875 C 0.14289 -0.225 0.17448 -0.27477 0.18282 -0.30347 C 0.19115 -0.33217 0.17796 -0.33426 0.17709 -0.34028 " pathEditMode="relative" ptsTypes="aaaaaA">
+                                      <p:cBhvr>
+                                        <p:cTn id="36" dur="2000" fill="hold"/>
+                                        <p:tgtEl>
+                                          <p:spTgt spid="200"/>
+                                        </p:tgtEl>
+                                        <p:attrNameLst>
+                                          <p:attrName>ppt_x</p:attrName>
+                                          <p:attrName>ppt_y</p:attrName>
+                                        </p:attrNameLst>
+                                      </p:cBhvr>
+                                    </p:animMotion>
+                                  </p:childTnLst>
+                                </p:cTn>
+                              </p:par>
+                              <p:par>
+                                <p:cTn id="37" presetID="0" presetClass="path" presetSubtype="0" accel="50000" decel="50000" fill="hold" grpId="0" nodeType="withEffect">
+                                  <p:stCondLst>
+                                    <p:cond delay="0"/>
+                                  </p:stCondLst>
+                                  <p:childTnLst>
+                                    <p:animMotion origin="layout" path="M 6.66667E-6 5.55556E-6 C 0.00782 -0.0155 0.01563 -0.03078 0.04584 -0.05347 C 0.07605 -0.07615 0.14758 -0.11203 0.18074 -0.13541 C 0.2139 -0.15879 0.24862 -0.1787 0.2448 -0.19374 C 0.24098 -0.20879 0.17535 -0.21666 0.15782 -0.22569 C 0.14028 -0.23472 0.13994 -0.24143 0.13959 -0.24791 " pathEditMode="relative" ptsTypes="aaaaaA">
+                                      <p:cBhvr>
+                                        <p:cTn id="38" dur="2000" fill="hold"/>
+                                        <p:tgtEl>
+                                          <p:spTgt spid="203"/>
+                                        </p:tgtEl>
+                                        <p:attrNameLst>
+                                          <p:attrName>ppt_x</p:attrName>
+                                          <p:attrName>ppt_y</p:attrName>
+                                        </p:attrNameLst>
+                                      </p:cBhvr>
+                                    </p:animMotion>
+                                  </p:childTnLst>
+                                </p:cTn>
+                              </p:par>
+                              <p:par>
+                                <p:cTn id="39" presetID="0" presetClass="path" presetSubtype="0" accel="50000" decel="50000" fill="hold" grpId="1" nodeType="withEffect">
+                                  <p:stCondLst>
+                                    <p:cond delay="0"/>
+                                  </p:stCondLst>
+                                  <p:childTnLst>
+                                    <p:animMotion origin="layout" path="M 0 0 C 0.0184 0.00416 0.03681 0.00833 0.06094 0.00833 C 0.08507 0.00833 0.12674 0.0074 0.14531 0 C 0.16389 -0.00741 0.16267 -0.0051 0.1724 -0.03612 C 0.18212 -0.06713 0.19288 -0.12662 0.20365 -0.18612 " pathEditMode="relative" ptsTypes="aaaaA">
+                                      <p:cBhvr>
+                                        <p:cTn id="40" dur="2000" fill="hold"/>
+                                        <p:tgtEl>
+                                          <p:spTgt spid="209"/>
+                                        </p:tgtEl>
+                                        <p:attrNameLst>
+                                          <p:attrName>ppt_x</p:attrName>
+                                          <p:attrName>ppt_y</p:attrName>
+                                        </p:attrNameLst>
+                                      </p:cBhvr>
+                                    </p:animMotion>
+                                  </p:childTnLst>
+                                </p:cTn>
+                              </p:par>
+                              <p:par>
+                                <p:cTn id="41" presetID="0" presetClass="path" presetSubtype="0" accel="50000" decel="50000" fill="hold" grpId="0" nodeType="withEffect">
+                                  <p:stCondLst>
+                                    <p:cond delay="0"/>
+                                  </p:stCondLst>
+                                  <p:childTnLst>
+                                    <p:animMotion origin="layout" path="M 2.5E-6 2.22222E-6 C -0.01371 -0.01481 -0.02726 -0.0294 -0.03021 -0.08611 C -0.03316 -0.14282 -0.04566 -0.28773 -0.01823 -0.34097 C 0.0092 -0.39421 0.09132 -0.40301 0.1349 -0.40625 C 0.17847 -0.40949 0.22517 -0.36759 0.24323 -0.35972 " pathEditMode="relative" ptsTypes="aaaaA">
+                                      <p:cBhvr>
+                                        <p:cTn id="42" dur="2000" fill="hold"/>
+                                        <p:tgtEl>
+                                          <p:spTgt spid="199"/>
+                                        </p:tgtEl>
+                                        <p:attrNameLst>
+                                          <p:attrName>ppt_x</p:attrName>
+                                          <p:attrName>ppt_y</p:attrName>
+                                        </p:attrNameLst>
+                                      </p:cBhvr>
+                                    </p:animMotion>
+                                  </p:childTnLst>
+                                </p:cTn>
+                              </p:par>
+                              <p:par>
+                                <p:cTn id="43" presetID="0" presetClass="path" presetSubtype="0" accel="50000" decel="50000" fill="hold" grpId="0" nodeType="withEffect">
+                                  <p:stCondLst>
+                                    <p:cond delay="0"/>
+                                  </p:stCondLst>
+                                  <p:childTnLst>
+                                    <p:animMotion origin="layout" path="M 0.00313 0.00902 C 0.04253 0.01157 0.08212 0.01435 0.10833 0.00625 C 0.13455 -0.00186 0.13594 0.00995 0.16042 -0.03959 C 0.1849 -0.08912 0.23906 -0.24908 0.25469 -0.29098 " pathEditMode="relative" ptsTypes="aaaA">
+                                      <p:cBhvr>
+                                        <p:cTn id="44" dur="2000" fill="hold"/>
+                                        <p:tgtEl>
+                                          <p:spTgt spid="206"/>
+                                        </p:tgtEl>
+                                        <p:attrNameLst>
+                                          <p:attrName>ppt_x</p:attrName>
+                                          <p:attrName>ppt_y</p:attrName>
+                                        </p:attrNameLst>
+                                      </p:cBhvr>
+                                    </p:animMotion>
+                                  </p:childTnLst>
+                                </p:cTn>
+                              </p:par>
+                              <p:par>
+                                <p:cTn id="45" presetID="0" presetClass="path" presetSubtype="0" accel="50000" decel="50000" fill="hold" grpId="0" nodeType="withEffect">
+                                  <p:stCondLst>
+                                    <p:cond delay="0"/>
+                                  </p:stCondLst>
+                                  <p:childTnLst>
+                                    <p:animMotion origin="layout" path="M 8.33333E-7 -3.33333E-6 C 0.00729 -0.01528 0.01475 -0.03032 0.02968 -0.04097 C 0.04461 -0.05162 0.0559 -0.05856 0.08906 -0.06319 C 0.12222 -0.06782 0.20486 -0.06157 0.22864 -0.06944 C 0.25243 -0.07731 0.24236 -0.09398 0.23229 -0.11041 " pathEditMode="relative" ptsTypes="aaaaA">
+                                      <p:cBhvr>
+                                        <p:cTn id="46" dur="2000" fill="hold"/>
+                                        <p:tgtEl>
+                                          <p:spTgt spid="190"/>
+                                        </p:tgtEl>
+                                        <p:attrNameLst>
+                                          <p:attrName>ppt_x</p:attrName>
+                                          <p:attrName>ppt_y</p:attrName>
+                                        </p:attrNameLst>
+                                      </p:cBhvr>
+                                    </p:animMotion>
+                                  </p:childTnLst>
+                                </p:cTn>
+                              </p:par>
+                              <p:par>
+                                <p:cTn id="47" presetID="0" presetClass="path" presetSubtype="0" accel="50000" decel="50000" fill="hold" grpId="0" nodeType="withEffect">
+                                  <p:stCondLst>
+                                    <p:cond delay="0"/>
+                                  </p:stCondLst>
+                                  <p:childTnLst>
+                                    <p:animMotion origin="layout" path="M 3.05556E-6 5.18519E-6 C 0.1276 0.00695 0.25538 0.01413 0.30208 -0.02939 C 0.34878 -0.07291 0.28524 -0.22291 0.28073 -0.26064 C 0.27621 -0.29837 0.27534 -0.27684 0.27448 -0.25532 " pathEditMode="relative" ptsTypes="aaaA">
+                                      <p:cBhvr>
+                                        <p:cTn id="48" dur="2000" fill="hold"/>
+                                        <p:tgtEl>
+                                          <p:spTgt spid="205"/>
+                                        </p:tgtEl>
+                                        <p:attrNameLst>
+                                          <p:attrName>ppt_x</p:attrName>
+                                          <p:attrName>ppt_y</p:attrName>
+                                        </p:attrNameLst>
+                                      </p:cBhvr>
+                                    </p:animMotion>
+                                  </p:childTnLst>
+                                </p:cTn>
+                              </p:par>
+                              <p:par>
+                                <p:cTn id="49" presetID="0" presetClass="path" presetSubtype="0" accel="50000" decel="50000" fill="hold" grpId="0" nodeType="withEffect">
+                                  <p:stCondLst>
+                                    <p:cond delay="0"/>
+                                  </p:stCondLst>
+                                  <p:childTnLst>
+                                    <p:animMotion origin="layout" path="M -2.5E-6 2.22222E-6 C 0.0224 -0.00879 0.04496 -0.01736 0.08854 -0.0412 C 0.13212 -0.06504 0.23142 -0.11828 0.26163 -0.14375 C 0.29184 -0.16921 0.28055 -0.18148 0.26927 -0.19352 " pathEditMode="relative" ptsTypes="aaaA">
+                                      <p:cBhvr>
+                                        <p:cTn id="50" dur="3000" fill="hold"/>
+                                        <p:tgtEl>
+                                          <p:spTgt spid="201"/>
+                                        </p:tgtEl>
+                                        <p:attrNameLst>
+                                          <p:attrName>ppt_x</p:attrName>
+                                          <p:attrName>ppt_y</p:attrName>
+                                        </p:attrNameLst>
+                                      </p:cBhvr>
+                                    </p:animMotion>
+                                  </p:childTnLst>
+                                </p:cTn>
+                              </p:par>
+                            </p:childTnLst>
+                          </p:cTn>
+                        </p:par>
+                      </p:childTnLst>
+                    </p:cTn>
+                  </p:par>
+                </p:childTnLst>
+              </p:cTn>
+              <p:prevCondLst>
+                <p:cond evt="onPrev" delay="0">
+                  <p:tgtEl>
+                    <p:sldTgt/>
+                  </p:tgtEl>
+                </p:cond>
+              </p:prevCondLst>
+              <p:nextCondLst>
+                <p:cond evt="onNext" delay="0">
+                  <p:tgtEl>
+                    <p:sldTgt/>
+                  </p:tgtEl>
+                </p:cond>
+              </p:nextCondLst>
+            </p:seq>
+          </p:childTnLst>
+        </p:cTn>
       </p:par>
     </p:tnLst>
+    <p:bldLst>
+      <p:bldP spid="190" grpId="0" animBg="1"/>
+      <p:bldP spid="191" grpId="0" animBg="1"/>
+      <p:bldP spid="191" grpId="1" animBg="1"/>
+      <p:bldP spid="192" grpId="0" animBg="1"/>
+      <p:bldP spid="193" grpId="0" animBg="1"/>
+      <p:bldP spid="194" grpId="0" animBg="1"/>
+      <p:bldP spid="195" grpId="0" animBg="1"/>
+      <p:bldP spid="195" grpId="1" animBg="1"/>
+      <p:bldP spid="196" grpId="0" animBg="1"/>
+      <p:bldP spid="197" grpId="0" animBg="1"/>
+      <p:bldP spid="198" grpId="0" animBg="1"/>
+      <p:bldP spid="199" grpId="0" animBg="1"/>
+      <p:bldP spid="200" grpId="0" animBg="1"/>
+      <p:bldP spid="201" grpId="0" animBg="1"/>
+      <p:bldP spid="202" grpId="0" animBg="1"/>
+      <p:bldP spid="203" grpId="0" animBg="1"/>
+      <p:bldP spid="204" grpId="0" animBg="1"/>
+      <p:bldP spid="205" grpId="0" animBg="1"/>
+      <p:bldP spid="206" grpId="0" animBg="1"/>
+      <p:bldP spid="207" grpId="0" animBg="1"/>
+      <p:bldP spid="208" grpId="0" animBg="1"/>
+      <p:bldP spid="209" grpId="0" animBg="1"/>
+      <p:bldP spid="209" grpId="1" animBg="1"/>
+    </p:bldLst>
   </p:timing>
 </p:sld>
 </file>

</xml_diff>

<commit_message>
tut 3: Capitalize m
</commit_message>
<xml_diff>
--- a/tutorial-03-benefits.pptx
+++ b/tutorial-03-benefits.pptx
@@ -8322,8 +8322,16 @@
           <a:p>
             <a:pPr algn="ctr"/>
             <a:r>
+              <a:rPr lang="en-US" dirty="0"/>
+              <a:t>M</a:t>
+            </a:r>
+            <a:r>
               <a:rPr lang="en-US" sz="1800" dirty="0" smtClean="0"/>
-              <a:t>message-driven execution</a:t>
+              <a:t>essage</a:t>
+            </a:r>
+            <a:r>
+              <a:rPr lang="en-US" sz="1800" dirty="0" smtClean="0"/>
+              <a:t>-driven execution</a:t>
             </a:r>
             <a:endParaRPr lang="en-US" sz="1800" dirty="0"/>
           </a:p>

</xml_diff>